<commit_message>
switching computers to work on pptx at home
</commit_message>
<xml_diff>
--- a/dev/fluor/The AquaDucks/The AquaDucks Presentation.pptx
+++ b/dev/fluor/The AquaDucks/The AquaDucks Presentation.pptx
@@ -7,8 +7,15 @@
   <p:sldIdLst>
     <p:sldId id="256" r:id="rId2"/>
     <p:sldId id="257" r:id="rId3"/>
-    <p:sldId id="258" r:id="rId4"/>
-    <p:sldId id="259" r:id="rId5"/>
+    <p:sldId id="260" r:id="rId4"/>
+    <p:sldId id="261" r:id="rId5"/>
+    <p:sldId id="262" r:id="rId6"/>
+    <p:sldId id="263" r:id="rId7"/>
+    <p:sldId id="264" r:id="rId8"/>
+    <p:sldId id="266" r:id="rId9"/>
+    <p:sldId id="267" r:id="rId10"/>
+    <p:sldId id="265" r:id="rId11"/>
+    <p:sldId id="258" r:id="rId12"/>
   </p:sldIdLst>
   <p:sldSz cx="12192000" cy="6858000"/>
   <p:notesSz cx="6858000" cy="9144000"/>
@@ -107,6 +114,11 @@
       </a:defRPr>
     </a:lvl9pPr>
   </p:defaultTextStyle>
+  <p:extLst>
+    <p:ext uri="{EFAFB233-063F-42B5-8137-9DF3F51BA10A}">
+      <p15:sldGuideLst xmlns:p15="http://schemas.microsoft.com/office/powerpoint/2012/main"/>
+    </p:ext>
+  </p:extLst>
 </p:presentation>
 </file>
 
@@ -257,7 +269,7 @@
           <a:p>
             <a:fld id="{6A1BF488-617C-45ED-ACF4-41A8189FD430}" type="datetimeFigureOut">
               <a:rPr lang="en-US" smtClean="0"/>
-              <a:t>10/24/2019</a:t>
+              <a:t>10/25/19</a:t>
             </a:fld>
             <a:endParaRPr lang="en-US"/>
           </a:p>
@@ -455,7 +467,7 @@
           <a:p>
             <a:fld id="{6A1BF488-617C-45ED-ACF4-41A8189FD430}" type="datetimeFigureOut">
               <a:rPr lang="en-US" smtClean="0"/>
-              <a:t>10/24/2019</a:t>
+              <a:t>10/25/19</a:t>
             </a:fld>
             <a:endParaRPr lang="en-US"/>
           </a:p>
@@ -663,7 +675,7 @@
           <a:p>
             <a:fld id="{6A1BF488-617C-45ED-ACF4-41A8189FD430}" type="datetimeFigureOut">
               <a:rPr lang="en-US" smtClean="0"/>
-              <a:t>10/24/2019</a:t>
+              <a:t>10/25/19</a:t>
             </a:fld>
             <a:endParaRPr lang="en-US"/>
           </a:p>
@@ -861,7 +873,7 @@
           <a:p>
             <a:fld id="{6A1BF488-617C-45ED-ACF4-41A8189FD430}" type="datetimeFigureOut">
               <a:rPr lang="en-US" smtClean="0"/>
-              <a:t>10/24/2019</a:t>
+              <a:t>10/25/19</a:t>
             </a:fld>
             <a:endParaRPr lang="en-US"/>
           </a:p>
@@ -1136,7 +1148,7 @@
           <a:p>
             <a:fld id="{6A1BF488-617C-45ED-ACF4-41A8189FD430}" type="datetimeFigureOut">
               <a:rPr lang="en-US" smtClean="0"/>
-              <a:t>10/24/2019</a:t>
+              <a:t>10/25/19</a:t>
             </a:fld>
             <a:endParaRPr lang="en-US"/>
           </a:p>
@@ -1401,7 +1413,7 @@
           <a:p>
             <a:fld id="{6A1BF488-617C-45ED-ACF4-41A8189FD430}" type="datetimeFigureOut">
               <a:rPr lang="en-US" smtClean="0"/>
-              <a:t>10/24/2019</a:t>
+              <a:t>10/25/19</a:t>
             </a:fld>
             <a:endParaRPr lang="en-US"/>
           </a:p>
@@ -1813,7 +1825,7 @@
           <a:p>
             <a:fld id="{6A1BF488-617C-45ED-ACF4-41A8189FD430}" type="datetimeFigureOut">
               <a:rPr lang="en-US" smtClean="0"/>
-              <a:t>10/24/2019</a:t>
+              <a:t>10/25/19</a:t>
             </a:fld>
             <a:endParaRPr lang="en-US"/>
           </a:p>
@@ -1954,7 +1966,7 @@
           <a:p>
             <a:fld id="{6A1BF488-617C-45ED-ACF4-41A8189FD430}" type="datetimeFigureOut">
               <a:rPr lang="en-US" smtClean="0"/>
-              <a:t>10/24/2019</a:t>
+              <a:t>10/25/19</a:t>
             </a:fld>
             <a:endParaRPr lang="en-US"/>
           </a:p>
@@ -2067,7 +2079,7 @@
           <a:p>
             <a:fld id="{6A1BF488-617C-45ED-ACF4-41A8189FD430}" type="datetimeFigureOut">
               <a:rPr lang="en-US" smtClean="0"/>
-              <a:t>10/24/2019</a:t>
+              <a:t>10/25/19</a:t>
             </a:fld>
             <a:endParaRPr lang="en-US"/>
           </a:p>
@@ -2378,7 +2390,7 @@
           <a:p>
             <a:fld id="{6A1BF488-617C-45ED-ACF4-41A8189FD430}" type="datetimeFigureOut">
               <a:rPr lang="en-US" smtClean="0"/>
-              <a:t>10/24/2019</a:t>
+              <a:t>10/25/19</a:t>
             </a:fld>
             <a:endParaRPr lang="en-US"/>
           </a:p>
@@ -2666,7 +2678,7 @@
           <a:p>
             <a:fld id="{6A1BF488-617C-45ED-ACF4-41A8189FD430}" type="datetimeFigureOut">
               <a:rPr lang="en-US" smtClean="0"/>
-              <a:t>10/24/2019</a:t>
+              <a:t>10/25/19</a:t>
             </a:fld>
             <a:endParaRPr lang="en-US"/>
           </a:p>
@@ -2907,7 +2919,7 @@
           <a:p>
             <a:fld id="{6A1BF488-617C-45ED-ACF4-41A8189FD430}" type="datetimeFigureOut">
               <a:rPr lang="en-US" smtClean="0"/>
-              <a:t>10/24/2019</a:t>
+              <a:t>10/25/19</a:t>
             </a:fld>
             <a:endParaRPr lang="en-US"/>
           </a:p>
@@ -3342,7 +3354,7 @@
         </p:nvSpPr>
         <p:spPr>
           <a:xfrm>
-            <a:off x="1523999" y="300455"/>
+            <a:off x="1524000" y="1343809"/>
             <a:ext cx="9144000" cy="915265"/>
           </a:xfrm>
         </p:spPr>
@@ -3380,8 +3392,8 @@
         </p:nvSpPr>
         <p:spPr>
           <a:xfrm>
-            <a:off x="1025162" y="4915918"/>
-            <a:ext cx="6130647" cy="1655762"/>
+            <a:off x="1065420" y="3390351"/>
+            <a:ext cx="10278518" cy="1655762"/>
           </a:xfrm>
         </p:spPr>
         <p:txBody>
@@ -3438,10 +3450,270 @@
           </a:p>
         </p:txBody>
       </p:sp>
+      <p:pic>
+        <p:nvPicPr>
+          <p:cNvPr id="5" name="Picture 4">
+            <a:extLst>
+              <a:ext uri="{FF2B5EF4-FFF2-40B4-BE49-F238E27FC236}">
+                <a16:creationId xmlns:a16="http://schemas.microsoft.com/office/drawing/2014/main" id="{C7A66275-09A8-3C4D-991D-DED4B8FF59F9}"/>
+              </a:ext>
+            </a:extLst>
+          </p:cNvPr>
+          <p:cNvPicPr>
+            <a:picLocks noChangeAspect="1"/>
+          </p:cNvPicPr>
+          <p:nvPr/>
+        </p:nvPicPr>
+        <p:blipFill rotWithShape="1">
+          <a:blip r:embed="rId2">
+            <a:extLst>
+              <a:ext uri="{28A0092B-C50C-407E-A947-70E740481C1C}">
+                <a14:useLocalDpi xmlns:a14="http://schemas.microsoft.com/office/drawing/2010/main" val="0"/>
+              </a:ext>
+            </a:extLst>
+          </a:blip>
+          <a:srcRect l="22876" t="22340" r="18127" b="18129"/>
+          <a:stretch/>
+        </p:blipFill>
+        <p:spPr>
+          <a:xfrm>
+            <a:off x="203773" y="212532"/>
+            <a:ext cx="1723294" cy="1655762"/>
+          </a:xfrm>
+          <a:prstGeom prst="rect">
+            <a:avLst/>
+          </a:prstGeom>
+        </p:spPr>
+      </p:pic>
+      <p:pic>
+        <p:nvPicPr>
+          <p:cNvPr id="7" name="Picture 6">
+            <a:extLst>
+              <a:ext uri="{FF2B5EF4-FFF2-40B4-BE49-F238E27FC236}">
+                <a16:creationId xmlns:a16="http://schemas.microsoft.com/office/drawing/2014/main" id="{3BB71C58-F40B-6745-BA35-1E8800389644}"/>
+              </a:ext>
+            </a:extLst>
+          </p:cNvPr>
+          <p:cNvPicPr>
+            <a:picLocks noChangeAspect="1"/>
+          </p:cNvPicPr>
+          <p:nvPr/>
+        </p:nvPicPr>
+        <p:blipFill>
+          <a:blip r:embed="rId3">
+            <a:extLst>
+              <a:ext uri="{28A0092B-C50C-407E-A947-70E740481C1C}">
+                <a14:useLocalDpi xmlns:a14="http://schemas.microsoft.com/office/drawing/2010/main" val="0"/>
+              </a:ext>
+            </a:extLst>
+          </a:blip>
+          <a:stretch>
+            <a:fillRect/>
+          </a:stretch>
+        </p:blipFill>
+        <p:spPr>
+          <a:xfrm>
+            <a:off x="8784579" y="573999"/>
+            <a:ext cx="3180199" cy="769810"/>
+          </a:xfrm>
+          <a:prstGeom prst="rect">
+            <a:avLst/>
+          </a:prstGeom>
+        </p:spPr>
+      </p:pic>
     </p:spTree>
     <p:extLst>
       <p:ext uri="{BB962C8B-B14F-4D97-AF65-F5344CB8AC3E}">
         <p14:creationId xmlns:p14="http://schemas.microsoft.com/office/powerpoint/2010/main" val="2538659974"/>
+      </p:ext>
+    </p:extLst>
+  </p:cSld>
+  <p:clrMapOvr>
+    <a:masterClrMapping/>
+  </p:clrMapOvr>
+</p:sld>
+</file>
+
+<file path=ppt/slides/slide10.xml><?xml version="1.0" encoding="utf-8"?>
+<p:sld xmlns:a="http://schemas.openxmlformats.org/drawingml/2006/main" xmlns:r="http://schemas.openxmlformats.org/officeDocument/2006/relationships" xmlns:p="http://schemas.openxmlformats.org/presentationml/2006/main">
+  <p:cSld>
+    <p:spTree>
+      <p:nvGrpSpPr>
+        <p:cNvPr id="1" name=""/>
+        <p:cNvGrpSpPr/>
+        <p:nvPr/>
+      </p:nvGrpSpPr>
+      <p:grpSpPr>
+        <a:xfrm>
+          <a:off x="0" y="0"/>
+          <a:ext cx="0" cy="0"/>
+          <a:chOff x="0" y="0"/>
+          <a:chExt cx="0" cy="0"/>
+        </a:xfrm>
+      </p:grpSpPr>
+      <p:sp>
+        <p:nvSpPr>
+          <p:cNvPr id="2" name="Title 1">
+            <a:extLst>
+              <a:ext uri="{FF2B5EF4-FFF2-40B4-BE49-F238E27FC236}">
+                <a16:creationId xmlns:a16="http://schemas.microsoft.com/office/drawing/2014/main" id="{A6A8ED33-335E-F04F-8005-06EB5DEEB604}"/>
+              </a:ext>
+            </a:extLst>
+          </p:cNvPr>
+          <p:cNvSpPr>
+            <a:spLocks noGrp="1"/>
+          </p:cNvSpPr>
+          <p:nvPr>
+            <p:ph type="title"/>
+          </p:nvPr>
+        </p:nvSpPr>
+        <p:spPr/>
+        <p:txBody>
+          <a:bodyPr/>
+          <a:lstStyle/>
+          <a:p>
+            <a:pPr algn="ctr"/>
+            <a:r>
+              <a:rPr lang="en-US" dirty="0"/>
+              <a:t>Backup Slides</a:t>
+            </a:r>
+          </a:p>
+        </p:txBody>
+      </p:sp>
+    </p:spTree>
+    <p:extLst>
+      <p:ext uri="{BB962C8B-B14F-4D97-AF65-F5344CB8AC3E}">
+        <p14:creationId xmlns:p14="http://schemas.microsoft.com/office/powerpoint/2010/main" val="459446304"/>
+      </p:ext>
+    </p:extLst>
+  </p:cSld>
+  <p:clrMapOvr>
+    <a:masterClrMapping/>
+  </p:clrMapOvr>
+</p:sld>
+</file>
+
+<file path=ppt/slides/slide11.xml><?xml version="1.0" encoding="utf-8"?>
+<p:sld xmlns:a="http://schemas.openxmlformats.org/drawingml/2006/main" xmlns:r="http://schemas.openxmlformats.org/officeDocument/2006/relationships" xmlns:p="http://schemas.openxmlformats.org/presentationml/2006/main">
+  <p:cSld>
+    <p:spTree>
+      <p:nvGrpSpPr>
+        <p:cNvPr id="1" name=""/>
+        <p:cNvGrpSpPr/>
+        <p:nvPr/>
+      </p:nvGrpSpPr>
+      <p:grpSpPr>
+        <a:xfrm>
+          <a:off x="0" y="0"/>
+          <a:ext cx="0" cy="0"/>
+          <a:chOff x="0" y="0"/>
+          <a:chExt cx="0" cy="0"/>
+        </a:xfrm>
+      </p:grpSpPr>
+      <p:sp>
+        <p:nvSpPr>
+          <p:cNvPr id="2" name="Title 1">
+            <a:extLst>
+              <a:ext uri="{FF2B5EF4-FFF2-40B4-BE49-F238E27FC236}">
+                <a16:creationId xmlns:a16="http://schemas.microsoft.com/office/drawing/2014/main" id="{C0C2F9D2-FA0B-41FD-B348-22B3076934FE}"/>
+              </a:ext>
+            </a:extLst>
+          </p:cNvPr>
+          <p:cNvSpPr>
+            <a:spLocks noGrp="1"/>
+          </p:cNvSpPr>
+          <p:nvPr>
+            <p:ph type="title"/>
+          </p:nvPr>
+        </p:nvSpPr>
+        <p:spPr/>
+        <p:txBody>
+          <a:bodyPr/>
+          <a:lstStyle/>
+          <a:p>
+            <a:pPr algn="ctr"/>
+            <a:r>
+              <a:rPr lang="en-US" dirty="0"/>
+              <a:t>Our overall approach</a:t>
+            </a:r>
+          </a:p>
+        </p:txBody>
+      </p:sp>
+      <p:sp>
+        <p:nvSpPr>
+          <p:cNvPr id="3" name="Content Placeholder 2">
+            <a:extLst>
+              <a:ext uri="{FF2B5EF4-FFF2-40B4-BE49-F238E27FC236}">
+                <a16:creationId xmlns:a16="http://schemas.microsoft.com/office/drawing/2014/main" id="{46CEFD87-813E-49BC-AD6A-918D394F9FC2}"/>
+              </a:ext>
+            </a:extLst>
+          </p:cNvPr>
+          <p:cNvSpPr>
+            <a:spLocks noGrp="1"/>
+          </p:cNvSpPr>
+          <p:nvPr>
+            <p:ph idx="1"/>
+          </p:nvPr>
+        </p:nvSpPr>
+        <p:spPr/>
+        <p:txBody>
+          <a:bodyPr/>
+          <a:lstStyle/>
+          <a:p>
+            <a:r>
+              <a:rPr lang="en-US" dirty="0"/>
+              <a:t>Since none of us knew anything about pipelines prior to this project, we knew we would need some type of iterative method to test solutions</a:t>
+            </a:r>
+          </a:p>
+          <a:p>
+            <a:r>
+              <a:rPr lang="en-US" dirty="0"/>
+              <a:t>Iteration requires subgroups – created groups in order of priority:</a:t>
+            </a:r>
+          </a:p>
+          <a:p>
+            <a:pPr marL="914400" lvl="1" indent="-457200">
+              <a:buFont typeface="+mj-lt"/>
+              <a:buAutoNum type="arabicPeriod"/>
+            </a:pPr>
+            <a:r>
+              <a:rPr lang="en-US" dirty="0"/>
+              <a:t>Constancy – what things will not change between designs?</a:t>
+            </a:r>
+          </a:p>
+          <a:p>
+            <a:pPr marL="914400" lvl="1" indent="-457200">
+              <a:buFont typeface="+mj-lt"/>
+              <a:buAutoNum type="arabicPeriod"/>
+            </a:pPr>
+            <a:r>
+              <a:rPr lang="en-US" dirty="0"/>
+              <a:t>Group Size – which groups are smallest? Start with those.</a:t>
+            </a:r>
+          </a:p>
+          <a:p>
+            <a:pPr marL="914400" lvl="1" indent="-457200">
+              <a:buFont typeface="+mj-lt"/>
+              <a:buAutoNum type="arabicPeriod"/>
+            </a:pPr>
+            <a:r>
+              <a:rPr lang="en-US" dirty="0"/>
+              <a:t>Ease of solution – by completing the easiest pieces first, we can minimize the number of places at which to evaluate the difficult components</a:t>
+            </a:r>
+          </a:p>
+          <a:p>
+            <a:pPr marL="914400" lvl="1" indent="-457200">
+              <a:buFont typeface="+mj-lt"/>
+              <a:buAutoNum type="arabicPeriod"/>
+            </a:pPr>
+            <a:endParaRPr lang="en-US" dirty="0"/>
+          </a:p>
+        </p:txBody>
+      </p:sp>
+    </p:spTree>
+    <p:extLst>
+      <p:ext uri="{BB962C8B-B14F-4D97-AF65-F5344CB8AC3E}">
+        <p14:creationId xmlns:p14="http://schemas.microsoft.com/office/powerpoint/2010/main" val="3797191583"/>
       </p:ext>
     </p:extLst>
   </p:cSld>
@@ -3744,7 +4016,7 @@
           <p:cNvPr id="2" name="Title 1">
             <a:extLst>
               <a:ext uri="{FF2B5EF4-FFF2-40B4-BE49-F238E27FC236}">
-                <a16:creationId xmlns:a16="http://schemas.microsoft.com/office/drawing/2014/main" id="{C0C2F9D2-FA0B-41FD-B348-22B3076934FE}"/>
+                <a16:creationId xmlns:a16="http://schemas.microsoft.com/office/drawing/2014/main" id="{F3953578-AC2C-F246-8DAE-6FDE9D406DA9}"/>
               </a:ext>
             </a:extLst>
           </p:cNvPr>
@@ -3763,7 +4035,7 @@
             <a:pPr algn="ctr"/>
             <a:r>
               <a:rPr lang="en-US" dirty="0"/>
-              <a:t>Our overall approach</a:t>
+              <a:t>Time Management</a:t>
             </a:r>
           </a:p>
         </p:txBody>
@@ -3773,7 +4045,7 @@
           <p:cNvPr id="3" name="Content Placeholder 2">
             <a:extLst>
               <a:ext uri="{FF2B5EF4-FFF2-40B4-BE49-F238E27FC236}">
-                <a16:creationId xmlns:a16="http://schemas.microsoft.com/office/drawing/2014/main" id="{46CEFD87-813E-49BC-AD6A-918D394F9FC2}"/>
+                <a16:creationId xmlns:a16="http://schemas.microsoft.com/office/drawing/2014/main" id="{45383E73-4C00-2841-93F9-7B7719B23492}"/>
               </a:ext>
             </a:extLst>
           </p:cNvPr>
@@ -3791,58 +4063,21 @@
           <a:p>
             <a:r>
               <a:rPr lang="en-US" dirty="0"/>
-              <a:t>Since none of us knew anything about pipelines prior to this project, we knew we would need some type of iterative method to test solutions</a:t>
+              <a:t>How long did each section take?</a:t>
             </a:r>
           </a:p>
           <a:p>
             <a:r>
               <a:rPr lang="en-US" dirty="0"/>
-              <a:t>Iteration requires subgroups – created groups in order of priority:</a:t>
-            </a:r>
-          </a:p>
-          <a:p>
-            <a:pPr marL="914400" lvl="1" indent="-457200">
-              <a:buFont typeface="+mj-lt"/>
-              <a:buAutoNum type="arabicPeriod"/>
-            </a:pPr>
-            <a:r>
-              <a:rPr lang="en-US" dirty="0"/>
-              <a:t>Constancy – what things will not change between designs?</a:t>
-            </a:r>
-          </a:p>
-          <a:p>
-            <a:pPr marL="914400" lvl="1" indent="-457200">
-              <a:buFont typeface="+mj-lt"/>
-              <a:buAutoNum type="arabicPeriod"/>
-            </a:pPr>
-            <a:r>
-              <a:rPr lang="en-US" dirty="0"/>
-              <a:t>Group Size – which groups are smallest? Start with those.</a:t>
-            </a:r>
-          </a:p>
-          <a:p>
-            <a:pPr marL="914400" lvl="1" indent="-457200">
-              <a:buFont typeface="+mj-lt"/>
-              <a:buAutoNum type="arabicPeriod"/>
-            </a:pPr>
-            <a:r>
-              <a:rPr lang="en-US" dirty="0"/>
-              <a:t>Ease of solution – by completing the easiest pieces first, we can minimize the number of places at which to evaluate the difficult components</a:t>
-            </a:r>
-          </a:p>
-          <a:p>
-            <a:pPr marL="914400" lvl="1" indent="-457200">
-              <a:buFont typeface="+mj-lt"/>
-              <a:buAutoNum type="arabicPeriod"/>
-            </a:pPr>
-            <a:endParaRPr lang="en-US" dirty="0"/>
+              <a:t>What were the overall steps to solve the problem?</a:t>
+            </a:r>
           </a:p>
         </p:txBody>
       </p:sp>
     </p:spTree>
     <p:extLst>
       <p:ext uri="{BB962C8B-B14F-4D97-AF65-F5344CB8AC3E}">
-        <p14:creationId xmlns:p14="http://schemas.microsoft.com/office/powerpoint/2010/main" val="3797191583"/>
+        <p14:creationId xmlns:p14="http://schemas.microsoft.com/office/powerpoint/2010/main" val="406993690"/>
       </p:ext>
     </p:extLst>
   </p:cSld>
@@ -3871,10 +4106,39 @@
       </p:grpSpPr>
       <p:sp>
         <p:nvSpPr>
+          <p:cNvPr id="2" name="Title 1">
+            <a:extLst>
+              <a:ext uri="{FF2B5EF4-FFF2-40B4-BE49-F238E27FC236}">
+                <a16:creationId xmlns:a16="http://schemas.microsoft.com/office/drawing/2014/main" id="{564562A0-1726-074A-962A-BCD7FC1A442A}"/>
+              </a:ext>
+            </a:extLst>
+          </p:cNvPr>
+          <p:cNvSpPr>
+            <a:spLocks noGrp="1"/>
+          </p:cNvSpPr>
+          <p:nvPr>
+            <p:ph type="title"/>
+          </p:nvPr>
+        </p:nvSpPr>
+        <p:spPr/>
+        <p:txBody>
+          <a:bodyPr/>
+          <a:lstStyle/>
+          <a:p>
+            <a:pPr algn="ctr"/>
+            <a:r>
+              <a:rPr lang="en-US" dirty="0"/>
+              <a:t>Calculations</a:t>
+            </a:r>
+          </a:p>
+        </p:txBody>
+      </p:sp>
+      <p:sp>
+        <p:nvSpPr>
           <p:cNvPr id="3" name="Content Placeholder 2">
             <a:extLst>
               <a:ext uri="{FF2B5EF4-FFF2-40B4-BE49-F238E27FC236}">
-                <a16:creationId xmlns:a16="http://schemas.microsoft.com/office/drawing/2014/main" id="{E5184CDF-D760-4997-AD15-7EBCCA1912B9}"/>
+                <a16:creationId xmlns:a16="http://schemas.microsoft.com/office/drawing/2014/main" id="{23A484A1-8CB2-C44A-ABFF-8826CFB4A700}"/>
               </a:ext>
             </a:extLst>
           </p:cNvPr>
@@ -3885,24 +4149,14 @@
             <p:ph idx="1"/>
           </p:nvPr>
         </p:nvSpPr>
-        <p:spPr>
-          <a:xfrm>
-            <a:off x="2406067" y="2760487"/>
-            <a:ext cx="7379865" cy="1337025"/>
-          </a:xfrm>
-        </p:spPr>
-        <p:txBody>
-          <a:bodyPr>
-            <a:normAutofit/>
-          </a:bodyPr>
-          <a:lstStyle/>
-          <a:p>
-            <a:pPr marL="0" indent="0" algn="ctr">
-              <a:buNone/>
-            </a:pPr>
-            <a:r>
-              <a:rPr lang="en-US" sz="3600" dirty="0"/>
-              <a:t>That’s nice, but what does it mean?!</a:t>
+        <p:spPr/>
+        <p:txBody>
+          <a:bodyPr/>
+          <a:lstStyle/>
+          <a:p>
+            <a:r>
+              <a:rPr lang="en-US" dirty="0"/>
+              <a:t>Summarize results</a:t>
             </a:r>
           </a:p>
         </p:txBody>
@@ -3910,7 +4164,885 @@
     </p:spTree>
     <p:extLst>
       <p:ext uri="{BB962C8B-B14F-4D97-AF65-F5344CB8AC3E}">
-        <p14:creationId xmlns:p14="http://schemas.microsoft.com/office/powerpoint/2010/main" val="2245615265"/>
+        <p14:creationId xmlns:p14="http://schemas.microsoft.com/office/powerpoint/2010/main" val="689369372"/>
+      </p:ext>
+    </p:extLst>
+  </p:cSld>
+  <p:clrMapOvr>
+    <a:masterClrMapping/>
+  </p:clrMapOvr>
+</p:sld>
+</file>
+
+<file path=ppt/slides/slide5.xml><?xml version="1.0" encoding="utf-8"?>
+<p:sld xmlns:a="http://schemas.openxmlformats.org/drawingml/2006/main" xmlns:r="http://schemas.openxmlformats.org/officeDocument/2006/relationships" xmlns:p="http://schemas.openxmlformats.org/presentationml/2006/main">
+  <p:cSld>
+    <p:spTree>
+      <p:nvGrpSpPr>
+        <p:cNvPr id="1" name=""/>
+        <p:cNvGrpSpPr/>
+        <p:nvPr/>
+      </p:nvGrpSpPr>
+      <p:grpSpPr>
+        <a:xfrm>
+          <a:off x="0" y="0"/>
+          <a:ext cx="0" cy="0"/>
+          <a:chOff x="0" y="0"/>
+          <a:chExt cx="0" cy="0"/>
+        </a:xfrm>
+      </p:grpSpPr>
+      <p:sp>
+        <p:nvSpPr>
+          <p:cNvPr id="2" name="Title 1">
+            <a:extLst>
+              <a:ext uri="{FF2B5EF4-FFF2-40B4-BE49-F238E27FC236}">
+                <a16:creationId xmlns:a16="http://schemas.microsoft.com/office/drawing/2014/main" id="{681DED21-DF87-624A-9DFC-CF2538DE2303}"/>
+              </a:ext>
+            </a:extLst>
+          </p:cNvPr>
+          <p:cNvSpPr>
+            <a:spLocks noGrp="1"/>
+          </p:cNvSpPr>
+          <p:nvPr>
+            <p:ph type="title"/>
+          </p:nvPr>
+        </p:nvSpPr>
+        <p:spPr/>
+        <p:txBody>
+          <a:bodyPr/>
+          <a:lstStyle/>
+          <a:p>
+            <a:pPr algn="ctr"/>
+            <a:r>
+              <a:rPr lang="en-US" dirty="0"/>
+              <a:t>Constructability</a:t>
+            </a:r>
+          </a:p>
+        </p:txBody>
+      </p:sp>
+      <p:sp>
+        <p:nvSpPr>
+          <p:cNvPr id="3" name="Content Placeholder 2">
+            <a:extLst>
+              <a:ext uri="{FF2B5EF4-FFF2-40B4-BE49-F238E27FC236}">
+                <a16:creationId xmlns:a16="http://schemas.microsoft.com/office/drawing/2014/main" id="{1F502F02-AB89-9A4F-B1AB-87EAF524B755}"/>
+              </a:ext>
+            </a:extLst>
+          </p:cNvPr>
+          <p:cNvSpPr>
+            <a:spLocks noGrp="1"/>
+          </p:cNvSpPr>
+          <p:nvPr>
+            <p:ph idx="1"/>
+          </p:nvPr>
+        </p:nvSpPr>
+        <p:spPr/>
+        <p:txBody>
+          <a:bodyPr/>
+          <a:lstStyle/>
+          <a:p>
+            <a:r>
+              <a:rPr lang="en-US" dirty="0"/>
+              <a:t>Summary of process</a:t>
+            </a:r>
+          </a:p>
+        </p:txBody>
+      </p:sp>
+    </p:spTree>
+    <p:extLst>
+      <p:ext uri="{BB962C8B-B14F-4D97-AF65-F5344CB8AC3E}">
+        <p14:creationId xmlns:p14="http://schemas.microsoft.com/office/powerpoint/2010/main" val="1544625445"/>
+      </p:ext>
+    </p:extLst>
+  </p:cSld>
+  <p:clrMapOvr>
+    <a:masterClrMapping/>
+  </p:clrMapOvr>
+</p:sld>
+</file>
+
+<file path=ppt/slides/slide6.xml><?xml version="1.0" encoding="utf-8"?>
+<p:sld xmlns:a="http://schemas.openxmlformats.org/drawingml/2006/main" xmlns:r="http://schemas.openxmlformats.org/officeDocument/2006/relationships" xmlns:p="http://schemas.openxmlformats.org/presentationml/2006/main">
+  <p:cSld>
+    <p:spTree>
+      <p:nvGrpSpPr>
+        <p:cNvPr id="1" name=""/>
+        <p:cNvGrpSpPr/>
+        <p:nvPr/>
+      </p:nvGrpSpPr>
+      <p:grpSpPr>
+        <a:xfrm>
+          <a:off x="0" y="0"/>
+          <a:ext cx="0" cy="0"/>
+          <a:chOff x="0" y="0"/>
+          <a:chExt cx="0" cy="0"/>
+        </a:xfrm>
+      </p:grpSpPr>
+      <p:sp>
+        <p:nvSpPr>
+          <p:cNvPr id="2" name="Title 1">
+            <a:extLst>
+              <a:ext uri="{FF2B5EF4-FFF2-40B4-BE49-F238E27FC236}">
+                <a16:creationId xmlns:a16="http://schemas.microsoft.com/office/drawing/2014/main" id="{D06A9ED8-DD87-2140-BEC3-643896B25143}"/>
+              </a:ext>
+            </a:extLst>
+          </p:cNvPr>
+          <p:cNvSpPr>
+            <a:spLocks noGrp="1"/>
+          </p:cNvSpPr>
+          <p:nvPr>
+            <p:ph type="title"/>
+          </p:nvPr>
+        </p:nvSpPr>
+        <p:spPr/>
+        <p:txBody>
+          <a:bodyPr/>
+          <a:lstStyle/>
+          <a:p>
+            <a:pPr algn="ctr"/>
+            <a:r>
+              <a:rPr lang="en-US" dirty="0"/>
+              <a:t>Zero-Based Execution</a:t>
+            </a:r>
+          </a:p>
+        </p:txBody>
+      </p:sp>
+      <p:sp>
+        <p:nvSpPr>
+          <p:cNvPr id="3" name="Content Placeholder 2">
+            <a:extLst>
+              <a:ext uri="{FF2B5EF4-FFF2-40B4-BE49-F238E27FC236}">
+                <a16:creationId xmlns:a16="http://schemas.microsoft.com/office/drawing/2014/main" id="{2FE0C855-EBDC-FB4A-9CD4-96A5ADB6D8CF}"/>
+              </a:ext>
+            </a:extLst>
+          </p:cNvPr>
+          <p:cNvSpPr>
+            <a:spLocks noGrp="1"/>
+          </p:cNvSpPr>
+          <p:nvPr>
+            <p:ph idx="1"/>
+          </p:nvPr>
+        </p:nvSpPr>
+        <p:spPr/>
+        <p:txBody>
+          <a:bodyPr/>
+          <a:lstStyle/>
+          <a:p>
+            <a:r>
+              <a:rPr lang="en-US" dirty="0"/>
+              <a:t>Summary</a:t>
+            </a:r>
+          </a:p>
+        </p:txBody>
+      </p:sp>
+    </p:spTree>
+    <p:extLst>
+      <p:ext uri="{BB962C8B-B14F-4D97-AF65-F5344CB8AC3E}">
+        <p14:creationId xmlns:p14="http://schemas.microsoft.com/office/powerpoint/2010/main" val="2064180662"/>
+      </p:ext>
+    </p:extLst>
+  </p:cSld>
+  <p:clrMapOvr>
+    <a:masterClrMapping/>
+  </p:clrMapOvr>
+</p:sld>
+</file>
+
+<file path=ppt/slides/slide7.xml><?xml version="1.0" encoding="utf-8"?>
+<p:sld xmlns:a="http://schemas.openxmlformats.org/drawingml/2006/main" xmlns:r="http://schemas.openxmlformats.org/officeDocument/2006/relationships" xmlns:p="http://schemas.openxmlformats.org/presentationml/2006/main">
+  <p:cSld>
+    <p:spTree>
+      <p:nvGrpSpPr>
+        <p:cNvPr id="1" name=""/>
+        <p:cNvGrpSpPr/>
+        <p:nvPr/>
+      </p:nvGrpSpPr>
+      <p:grpSpPr>
+        <a:xfrm>
+          <a:off x="0" y="0"/>
+          <a:ext cx="0" cy="0"/>
+          <a:chOff x="0" y="0"/>
+          <a:chExt cx="0" cy="0"/>
+        </a:xfrm>
+      </p:grpSpPr>
+      <p:sp>
+        <p:nvSpPr>
+          <p:cNvPr id="2" name="Title 1">
+            <a:extLst>
+              <a:ext uri="{FF2B5EF4-FFF2-40B4-BE49-F238E27FC236}">
+                <a16:creationId xmlns:a16="http://schemas.microsoft.com/office/drawing/2014/main" id="{B5A84D1F-120D-1F44-8907-5AD5A4F0ED55}"/>
+              </a:ext>
+            </a:extLst>
+          </p:cNvPr>
+          <p:cNvSpPr>
+            <a:spLocks noGrp="1"/>
+          </p:cNvSpPr>
+          <p:nvPr>
+            <p:ph type="title"/>
+          </p:nvPr>
+        </p:nvSpPr>
+        <p:spPr/>
+        <p:txBody>
+          <a:bodyPr/>
+          <a:lstStyle/>
+          <a:p>
+            <a:pPr algn="ctr"/>
+            <a:r>
+              <a:rPr lang="en-US" dirty="0"/>
+              <a:t>Modularization and Risk Assessment</a:t>
+            </a:r>
+          </a:p>
+        </p:txBody>
+      </p:sp>
+      <p:sp>
+        <p:nvSpPr>
+          <p:cNvPr id="3" name="Content Placeholder 2">
+            <a:extLst>
+              <a:ext uri="{FF2B5EF4-FFF2-40B4-BE49-F238E27FC236}">
+                <a16:creationId xmlns:a16="http://schemas.microsoft.com/office/drawing/2014/main" id="{7CB5C8AD-2517-984B-82E9-785FA47419CF}"/>
+              </a:ext>
+            </a:extLst>
+          </p:cNvPr>
+          <p:cNvSpPr>
+            <a:spLocks noGrp="1"/>
+          </p:cNvSpPr>
+          <p:nvPr>
+            <p:ph idx="1"/>
+          </p:nvPr>
+        </p:nvSpPr>
+        <p:spPr/>
+        <p:txBody>
+          <a:bodyPr/>
+          <a:lstStyle/>
+          <a:p>
+            <a:r>
+              <a:rPr lang="en-US" dirty="0"/>
+              <a:t>Modularization seems to reduce costs at the expense of changing risks</a:t>
+            </a:r>
+          </a:p>
+          <a:p>
+            <a:r>
+              <a:rPr lang="en-US" dirty="0"/>
+              <a:t>Risks are decreased</a:t>
+            </a:r>
+          </a:p>
+        </p:txBody>
+      </p:sp>
+    </p:spTree>
+    <p:extLst>
+      <p:ext uri="{BB962C8B-B14F-4D97-AF65-F5344CB8AC3E}">
+        <p14:creationId xmlns:p14="http://schemas.microsoft.com/office/powerpoint/2010/main" val="488885204"/>
+      </p:ext>
+    </p:extLst>
+  </p:cSld>
+  <p:clrMapOvr>
+    <a:masterClrMapping/>
+  </p:clrMapOvr>
+</p:sld>
+</file>
+
+<file path=ppt/slides/slide8.xml><?xml version="1.0" encoding="utf-8"?>
+<p:sld xmlns:a="http://schemas.openxmlformats.org/drawingml/2006/main" xmlns:r="http://schemas.openxmlformats.org/officeDocument/2006/relationships" xmlns:p="http://schemas.openxmlformats.org/presentationml/2006/main">
+  <p:cSld>
+    <p:spTree>
+      <p:nvGrpSpPr>
+        <p:cNvPr id="1" name=""/>
+        <p:cNvGrpSpPr/>
+        <p:nvPr/>
+      </p:nvGrpSpPr>
+      <p:grpSpPr>
+        <a:xfrm>
+          <a:off x="0" y="0"/>
+          <a:ext cx="0" cy="0"/>
+          <a:chOff x="0" y="0"/>
+          <a:chExt cx="0" cy="0"/>
+        </a:xfrm>
+      </p:grpSpPr>
+      <p:sp>
+        <p:nvSpPr>
+          <p:cNvPr id="2" name="Title 1">
+            <a:extLst>
+              <a:ext uri="{FF2B5EF4-FFF2-40B4-BE49-F238E27FC236}">
+                <a16:creationId xmlns:a16="http://schemas.microsoft.com/office/drawing/2014/main" id="{4D18C295-152E-9144-850D-C09E6899CB86}"/>
+              </a:ext>
+            </a:extLst>
+          </p:cNvPr>
+          <p:cNvSpPr>
+            <a:spLocks noGrp="1"/>
+          </p:cNvSpPr>
+          <p:nvPr>
+            <p:ph type="title"/>
+          </p:nvPr>
+        </p:nvSpPr>
+        <p:spPr/>
+        <p:txBody>
+          <a:bodyPr/>
+          <a:lstStyle/>
+          <a:p>
+            <a:pPr algn="ctr"/>
+            <a:r>
+              <a:rPr lang="en-US" dirty="0"/>
+              <a:t>Proposed Innovation Concept</a:t>
+            </a:r>
+          </a:p>
+        </p:txBody>
+      </p:sp>
+      <p:sp>
+        <p:nvSpPr>
+          <p:cNvPr id="3" name="Content Placeholder 2">
+            <a:extLst>
+              <a:ext uri="{FF2B5EF4-FFF2-40B4-BE49-F238E27FC236}">
+                <a16:creationId xmlns:a16="http://schemas.microsoft.com/office/drawing/2014/main" id="{8640F600-B9D9-F246-8924-D74A8E739F38}"/>
+              </a:ext>
+            </a:extLst>
+          </p:cNvPr>
+          <p:cNvSpPr>
+            <a:spLocks noGrp="1"/>
+          </p:cNvSpPr>
+          <p:nvPr>
+            <p:ph idx="1"/>
+          </p:nvPr>
+        </p:nvSpPr>
+        <p:spPr/>
+        <p:txBody>
+          <a:bodyPr/>
+          <a:lstStyle/>
+          <a:p>
+            <a:r>
+              <a:rPr lang="en-US" dirty="0"/>
+              <a:t>One large pump creates a large pressure increase</a:t>
+            </a:r>
+          </a:p>
+          <a:p>
+            <a:pPr lvl="1"/>
+            <a:r>
+              <a:rPr lang="en-US" dirty="0"/>
+              <a:t>This corresponds to a requirement for thicker walls</a:t>
+            </a:r>
+          </a:p>
+        </p:txBody>
+      </p:sp>
+      <p:cxnSp>
+        <p:nvCxnSpPr>
+          <p:cNvPr id="5" name="Straight Connector 4">
+            <a:extLst>
+              <a:ext uri="{FF2B5EF4-FFF2-40B4-BE49-F238E27FC236}">
+                <a16:creationId xmlns:a16="http://schemas.microsoft.com/office/drawing/2014/main" id="{0CCDAD2F-BD99-5749-A7D4-18E863D4806F}"/>
+              </a:ext>
+            </a:extLst>
+          </p:cNvPr>
+          <p:cNvCxnSpPr/>
+          <p:nvPr/>
+        </p:nvCxnSpPr>
+        <p:spPr>
+          <a:xfrm>
+            <a:off x="1847461" y="3097861"/>
+            <a:ext cx="0" cy="3079102"/>
+          </a:xfrm>
+          <a:prstGeom prst="line">
+            <a:avLst/>
+          </a:prstGeom>
+          <a:ln>
+            <a:solidFill>
+              <a:schemeClr val="tx1"/>
+            </a:solidFill>
+          </a:ln>
+        </p:spPr>
+        <p:style>
+          <a:lnRef idx="1">
+            <a:schemeClr val="accent1"/>
+          </a:lnRef>
+          <a:fillRef idx="0">
+            <a:schemeClr val="accent1"/>
+          </a:fillRef>
+          <a:effectRef idx="0">
+            <a:schemeClr val="accent1"/>
+          </a:effectRef>
+          <a:fontRef idx="minor">
+            <a:schemeClr val="tx1"/>
+          </a:fontRef>
+        </p:style>
+      </p:cxnSp>
+      <p:cxnSp>
+        <p:nvCxnSpPr>
+          <p:cNvPr id="6" name="Straight Connector 5">
+            <a:extLst>
+              <a:ext uri="{FF2B5EF4-FFF2-40B4-BE49-F238E27FC236}">
+                <a16:creationId xmlns:a16="http://schemas.microsoft.com/office/drawing/2014/main" id="{2132654E-E379-E146-A510-BC00E07AB25B}"/>
+              </a:ext>
+            </a:extLst>
+          </p:cNvPr>
+          <p:cNvCxnSpPr>
+            <a:cxnSpLocks/>
+          </p:cNvCxnSpPr>
+          <p:nvPr/>
+        </p:nvCxnSpPr>
+        <p:spPr>
+          <a:xfrm flipH="1">
+            <a:off x="1847461" y="6176963"/>
+            <a:ext cx="7725747" cy="0"/>
+          </a:xfrm>
+          <a:prstGeom prst="line">
+            <a:avLst/>
+          </a:prstGeom>
+          <a:ln>
+            <a:solidFill>
+              <a:schemeClr val="tx1"/>
+            </a:solidFill>
+          </a:ln>
+        </p:spPr>
+        <p:style>
+          <a:lnRef idx="1">
+            <a:schemeClr val="accent1"/>
+          </a:lnRef>
+          <a:fillRef idx="0">
+            <a:schemeClr val="accent1"/>
+          </a:fillRef>
+          <a:effectRef idx="0">
+            <a:schemeClr val="accent1"/>
+          </a:effectRef>
+          <a:fontRef idx="minor">
+            <a:schemeClr val="tx1"/>
+          </a:fontRef>
+        </p:style>
+      </p:cxnSp>
+      <p:cxnSp>
+        <p:nvCxnSpPr>
+          <p:cNvPr id="9" name="Straight Connector 8">
+            <a:extLst>
+              <a:ext uri="{FF2B5EF4-FFF2-40B4-BE49-F238E27FC236}">
+                <a16:creationId xmlns:a16="http://schemas.microsoft.com/office/drawing/2014/main" id="{D1D94DF8-0C8B-AC43-A1DE-C9D87588A10B}"/>
+              </a:ext>
+            </a:extLst>
+          </p:cNvPr>
+          <p:cNvCxnSpPr>
+            <a:cxnSpLocks/>
+          </p:cNvCxnSpPr>
+          <p:nvPr/>
+        </p:nvCxnSpPr>
+        <p:spPr>
+          <a:xfrm flipH="1" flipV="1">
+            <a:off x="1852127" y="4900273"/>
+            <a:ext cx="1004596" cy="268886"/>
+          </a:xfrm>
+          <a:prstGeom prst="line">
+            <a:avLst/>
+          </a:prstGeom>
+          <a:ln w="38100"/>
+        </p:spPr>
+        <p:style>
+          <a:lnRef idx="1">
+            <a:schemeClr val="dk1"/>
+          </a:lnRef>
+          <a:fillRef idx="0">
+            <a:schemeClr val="dk1"/>
+          </a:fillRef>
+          <a:effectRef idx="0">
+            <a:schemeClr val="dk1"/>
+          </a:effectRef>
+          <a:fontRef idx="minor">
+            <a:schemeClr val="tx1"/>
+          </a:fontRef>
+        </p:style>
+      </p:cxnSp>
+      <p:cxnSp>
+        <p:nvCxnSpPr>
+          <p:cNvPr id="12" name="Straight Connector 11">
+            <a:extLst>
+              <a:ext uri="{FF2B5EF4-FFF2-40B4-BE49-F238E27FC236}">
+                <a16:creationId xmlns:a16="http://schemas.microsoft.com/office/drawing/2014/main" id="{AC51D2C7-FC24-1E41-AB8B-E868B08535D8}"/>
+              </a:ext>
+            </a:extLst>
+          </p:cNvPr>
+          <p:cNvCxnSpPr>
+            <a:cxnSpLocks/>
+          </p:cNvCxnSpPr>
+          <p:nvPr/>
+        </p:nvCxnSpPr>
+        <p:spPr>
+          <a:xfrm flipV="1">
+            <a:off x="2856723" y="3265714"/>
+            <a:ext cx="0" cy="1903445"/>
+          </a:xfrm>
+          <a:prstGeom prst="line">
+            <a:avLst/>
+          </a:prstGeom>
+          <a:ln w="38100"/>
+        </p:spPr>
+        <p:style>
+          <a:lnRef idx="1">
+            <a:schemeClr val="dk1"/>
+          </a:lnRef>
+          <a:fillRef idx="0">
+            <a:schemeClr val="dk1"/>
+          </a:fillRef>
+          <a:effectRef idx="0">
+            <a:schemeClr val="dk1"/>
+          </a:effectRef>
+          <a:fontRef idx="minor">
+            <a:schemeClr val="tx1"/>
+          </a:fontRef>
+        </p:style>
+      </p:cxnSp>
+      <p:cxnSp>
+        <p:nvCxnSpPr>
+          <p:cNvPr id="15" name="Straight Connector 14">
+            <a:extLst>
+              <a:ext uri="{FF2B5EF4-FFF2-40B4-BE49-F238E27FC236}">
+                <a16:creationId xmlns:a16="http://schemas.microsoft.com/office/drawing/2014/main" id="{56285797-C98B-9240-BCF5-74D39B5170D2}"/>
+              </a:ext>
+            </a:extLst>
+          </p:cNvPr>
+          <p:cNvCxnSpPr>
+            <a:cxnSpLocks/>
+          </p:cNvCxnSpPr>
+          <p:nvPr/>
+        </p:nvCxnSpPr>
+        <p:spPr>
+          <a:xfrm flipH="1" flipV="1">
+            <a:off x="2856723" y="3268841"/>
+            <a:ext cx="6100665" cy="1765875"/>
+          </a:xfrm>
+          <a:prstGeom prst="line">
+            <a:avLst/>
+          </a:prstGeom>
+          <a:ln w="38100"/>
+        </p:spPr>
+        <p:style>
+          <a:lnRef idx="1">
+            <a:schemeClr val="dk1"/>
+          </a:lnRef>
+          <a:fillRef idx="0">
+            <a:schemeClr val="dk1"/>
+          </a:fillRef>
+          <a:effectRef idx="0">
+            <a:schemeClr val="dk1"/>
+          </a:effectRef>
+          <a:fontRef idx="minor">
+            <a:schemeClr val="tx1"/>
+          </a:fontRef>
+        </p:style>
+      </p:cxnSp>
+      <p:cxnSp>
+        <p:nvCxnSpPr>
+          <p:cNvPr id="18" name="Straight Connector 17">
+            <a:extLst>
+              <a:ext uri="{FF2B5EF4-FFF2-40B4-BE49-F238E27FC236}">
+                <a16:creationId xmlns:a16="http://schemas.microsoft.com/office/drawing/2014/main" id="{A80D34C9-64DA-E84F-872A-6D1E32F97633}"/>
+              </a:ext>
+            </a:extLst>
+          </p:cNvPr>
+          <p:cNvCxnSpPr>
+            <a:cxnSpLocks/>
+          </p:cNvCxnSpPr>
+          <p:nvPr/>
+        </p:nvCxnSpPr>
+        <p:spPr>
+          <a:xfrm flipV="1">
+            <a:off x="2856723" y="2996829"/>
+            <a:ext cx="0" cy="3180134"/>
+          </a:xfrm>
+          <a:prstGeom prst="line">
+            <a:avLst/>
+          </a:prstGeom>
+          <a:ln w="19050">
+            <a:solidFill>
+              <a:srgbClr val="0070C0"/>
+            </a:solidFill>
+            <a:prstDash val="dash"/>
+          </a:ln>
+        </p:spPr>
+        <p:style>
+          <a:lnRef idx="1">
+            <a:schemeClr val="dk1"/>
+          </a:lnRef>
+          <a:fillRef idx="0">
+            <a:schemeClr val="dk1"/>
+          </a:fillRef>
+          <a:effectRef idx="0">
+            <a:schemeClr val="dk1"/>
+          </a:effectRef>
+          <a:fontRef idx="minor">
+            <a:schemeClr val="tx1"/>
+          </a:fontRef>
+        </p:style>
+      </p:cxnSp>
+      <p:cxnSp>
+        <p:nvCxnSpPr>
+          <p:cNvPr id="20" name="Straight Connector 19">
+            <a:extLst>
+              <a:ext uri="{FF2B5EF4-FFF2-40B4-BE49-F238E27FC236}">
+                <a16:creationId xmlns:a16="http://schemas.microsoft.com/office/drawing/2014/main" id="{067749D8-AC3F-994C-B5D5-6BE4C222FD2C}"/>
+              </a:ext>
+            </a:extLst>
+          </p:cNvPr>
+          <p:cNvCxnSpPr>
+            <a:cxnSpLocks/>
+          </p:cNvCxnSpPr>
+          <p:nvPr/>
+        </p:nvCxnSpPr>
+        <p:spPr>
+          <a:xfrm>
+            <a:off x="1847461" y="5034716"/>
+            <a:ext cx="7940351" cy="0"/>
+          </a:xfrm>
+          <a:prstGeom prst="line">
+            <a:avLst/>
+          </a:prstGeom>
+          <a:ln w="19050">
+            <a:solidFill>
+              <a:srgbClr val="FF0000"/>
+            </a:solidFill>
+            <a:prstDash val="dash"/>
+          </a:ln>
+        </p:spPr>
+        <p:style>
+          <a:lnRef idx="1">
+            <a:schemeClr val="dk1"/>
+          </a:lnRef>
+          <a:fillRef idx="0">
+            <a:schemeClr val="dk1"/>
+          </a:fillRef>
+          <a:effectRef idx="0">
+            <a:schemeClr val="dk1"/>
+          </a:effectRef>
+          <a:fontRef idx="minor">
+            <a:schemeClr val="tx1"/>
+          </a:fontRef>
+        </p:style>
+      </p:cxnSp>
+      <p:sp>
+        <p:nvSpPr>
+          <p:cNvPr id="24" name="TextBox 23">
+            <a:extLst>
+              <a:ext uri="{FF2B5EF4-FFF2-40B4-BE49-F238E27FC236}">
+                <a16:creationId xmlns:a16="http://schemas.microsoft.com/office/drawing/2014/main" id="{B9B85174-7840-734A-BEE8-DD70EF076005}"/>
+              </a:ext>
+            </a:extLst>
+          </p:cNvPr>
+          <p:cNvSpPr txBox="1"/>
+          <p:nvPr/>
+        </p:nvSpPr>
+        <p:spPr>
+          <a:xfrm rot="16200000">
+            <a:off x="836400" y="4317265"/>
+            <a:ext cx="1643463" cy="369332"/>
+          </a:xfrm>
+          <a:prstGeom prst="rect">
+            <a:avLst/>
+          </a:prstGeom>
+          <a:noFill/>
+        </p:spPr>
+        <p:txBody>
+          <a:bodyPr wrap="none" rtlCol="0">
+            <a:spAutoFit/>
+          </a:bodyPr>
+          <a:lstStyle/>
+          <a:p>
+            <a:r>
+              <a:rPr lang="en-US" dirty="0"/>
+              <a:t>Gauge Pressure</a:t>
+            </a:r>
+          </a:p>
+        </p:txBody>
+      </p:sp>
+      <p:sp>
+        <p:nvSpPr>
+          <p:cNvPr id="25" name="TextBox 24">
+            <a:extLst>
+              <a:ext uri="{FF2B5EF4-FFF2-40B4-BE49-F238E27FC236}">
+                <a16:creationId xmlns:a16="http://schemas.microsoft.com/office/drawing/2014/main" id="{6943D52C-C481-E940-9F60-78D5768FFD2C}"/>
+              </a:ext>
+            </a:extLst>
+          </p:cNvPr>
+          <p:cNvSpPr txBox="1"/>
+          <p:nvPr/>
+        </p:nvSpPr>
+        <p:spPr>
+          <a:xfrm>
+            <a:off x="5108806" y="6160678"/>
+            <a:ext cx="987193" cy="369332"/>
+          </a:xfrm>
+          <a:prstGeom prst="rect">
+            <a:avLst/>
+          </a:prstGeom>
+          <a:noFill/>
+        </p:spPr>
+        <p:txBody>
+          <a:bodyPr wrap="none" rtlCol="0">
+            <a:spAutoFit/>
+          </a:bodyPr>
+          <a:lstStyle/>
+          <a:p>
+            <a:r>
+              <a:rPr lang="en-US" dirty="0"/>
+              <a:t>Distance</a:t>
+            </a:r>
+          </a:p>
+        </p:txBody>
+      </p:sp>
+      <p:sp>
+        <p:nvSpPr>
+          <p:cNvPr id="26" name="TextBox 25">
+            <a:extLst>
+              <a:ext uri="{FF2B5EF4-FFF2-40B4-BE49-F238E27FC236}">
+                <a16:creationId xmlns:a16="http://schemas.microsoft.com/office/drawing/2014/main" id="{3D47ACEB-CCD5-2849-8BE6-A2B2580DC7C7}"/>
+              </a:ext>
+            </a:extLst>
+          </p:cNvPr>
+          <p:cNvSpPr txBox="1"/>
+          <p:nvPr/>
+        </p:nvSpPr>
+        <p:spPr>
+          <a:xfrm>
+            <a:off x="4788456" y="5026573"/>
+            <a:ext cx="3673442" cy="369332"/>
+          </a:xfrm>
+          <a:prstGeom prst="rect">
+            <a:avLst/>
+          </a:prstGeom>
+          <a:noFill/>
+        </p:spPr>
+        <p:txBody>
+          <a:bodyPr wrap="none" rtlCol="0">
+            <a:spAutoFit/>
+          </a:bodyPr>
+          <a:lstStyle/>
+          <a:p>
+            <a:r>
+              <a:rPr lang="en-US" dirty="0">
+                <a:solidFill>
+                  <a:srgbClr val="FF0000"/>
+                </a:solidFill>
+              </a:rPr>
+              <a:t>Minimum required pressure at outlet</a:t>
+            </a:r>
+          </a:p>
+        </p:txBody>
+      </p:sp>
+      <p:sp>
+        <p:nvSpPr>
+          <p:cNvPr id="27" name="TextBox 26">
+            <a:extLst>
+              <a:ext uri="{FF2B5EF4-FFF2-40B4-BE49-F238E27FC236}">
+                <a16:creationId xmlns:a16="http://schemas.microsoft.com/office/drawing/2014/main" id="{3C455EF3-1A89-4E41-819A-6B1CE604C87B}"/>
+              </a:ext>
+            </a:extLst>
+          </p:cNvPr>
+          <p:cNvSpPr txBox="1"/>
+          <p:nvPr/>
+        </p:nvSpPr>
+        <p:spPr>
+          <a:xfrm>
+            <a:off x="2856723" y="5639251"/>
+            <a:ext cx="1581651" cy="369332"/>
+          </a:xfrm>
+          <a:prstGeom prst="rect">
+            <a:avLst/>
+          </a:prstGeom>
+          <a:noFill/>
+        </p:spPr>
+        <p:txBody>
+          <a:bodyPr wrap="none" rtlCol="0">
+            <a:spAutoFit/>
+          </a:bodyPr>
+          <a:lstStyle/>
+          <a:p>
+            <a:r>
+              <a:rPr lang="en-US" dirty="0">
+                <a:solidFill>
+                  <a:srgbClr val="0070C0"/>
+                </a:solidFill>
+              </a:rPr>
+              <a:t>Pump Location</a:t>
+            </a:r>
+          </a:p>
+        </p:txBody>
+      </p:sp>
+    </p:spTree>
+    <p:extLst>
+      <p:ext uri="{BB962C8B-B14F-4D97-AF65-F5344CB8AC3E}">
+        <p14:creationId xmlns:p14="http://schemas.microsoft.com/office/powerpoint/2010/main" val="3482469565"/>
+      </p:ext>
+    </p:extLst>
+  </p:cSld>
+  <p:clrMapOvr>
+    <a:masterClrMapping/>
+  </p:clrMapOvr>
+</p:sld>
+</file>
+
+<file path=ppt/slides/slide9.xml><?xml version="1.0" encoding="utf-8"?>
+<p:sld xmlns:a="http://schemas.openxmlformats.org/drawingml/2006/main" xmlns:r="http://schemas.openxmlformats.org/officeDocument/2006/relationships" xmlns:p="http://schemas.openxmlformats.org/presentationml/2006/main">
+  <p:cSld>
+    <p:spTree>
+      <p:nvGrpSpPr>
+        <p:cNvPr id="1" name=""/>
+        <p:cNvGrpSpPr/>
+        <p:nvPr/>
+      </p:nvGrpSpPr>
+      <p:grpSpPr>
+        <a:xfrm>
+          <a:off x="0" y="0"/>
+          <a:ext cx="0" cy="0"/>
+          <a:chOff x="0" y="0"/>
+          <a:chExt cx="0" cy="0"/>
+        </a:xfrm>
+      </p:grpSpPr>
+      <p:sp>
+        <p:nvSpPr>
+          <p:cNvPr id="2" name="Title 1">
+            <a:extLst>
+              <a:ext uri="{FF2B5EF4-FFF2-40B4-BE49-F238E27FC236}">
+                <a16:creationId xmlns:a16="http://schemas.microsoft.com/office/drawing/2014/main" id="{EAE224F5-7B45-F145-9CC5-F38D9D49C32A}"/>
+              </a:ext>
+            </a:extLst>
+          </p:cNvPr>
+          <p:cNvSpPr>
+            <a:spLocks noGrp="1"/>
+          </p:cNvSpPr>
+          <p:nvPr>
+            <p:ph type="title"/>
+          </p:nvPr>
+        </p:nvSpPr>
+        <p:spPr/>
+        <p:txBody>
+          <a:bodyPr/>
+          <a:lstStyle/>
+          <a:p>
+            <a:endParaRPr lang="en-US"/>
+          </a:p>
+        </p:txBody>
+      </p:sp>
+      <p:sp>
+        <p:nvSpPr>
+          <p:cNvPr id="3" name="Content Placeholder 2">
+            <a:extLst>
+              <a:ext uri="{FF2B5EF4-FFF2-40B4-BE49-F238E27FC236}">
+                <a16:creationId xmlns:a16="http://schemas.microsoft.com/office/drawing/2014/main" id="{BCB64847-6D84-1E41-B7E2-C51F07969D1D}"/>
+              </a:ext>
+            </a:extLst>
+          </p:cNvPr>
+          <p:cNvSpPr>
+            <a:spLocks noGrp="1"/>
+          </p:cNvSpPr>
+          <p:nvPr>
+            <p:ph idx="1"/>
+          </p:nvPr>
+        </p:nvSpPr>
+        <p:spPr/>
+        <p:txBody>
+          <a:bodyPr/>
+          <a:lstStyle/>
+          <a:p>
+            <a:endParaRPr lang="en-US"/>
+          </a:p>
+        </p:txBody>
+      </p:sp>
+    </p:spTree>
+    <p:extLst>
+      <p:ext uri="{BB962C8B-B14F-4D97-AF65-F5344CB8AC3E}">
+        <p14:creationId xmlns:p14="http://schemas.microsoft.com/office/powerpoint/2010/main" val="2848671031"/>
       </p:ext>
     </p:extLst>
   </p:cSld>

</xml_diff>

<commit_message>
switching computers to work on presentation
</commit_message>
<xml_diff>
--- a/dev/fluor/The AquaDucks/The AquaDucks Presentation.pptx
+++ b/dev/fluor/The AquaDucks/The AquaDucks Presentation.pptx
@@ -5,7 +5,7 @@
     <p:sldMasterId id="2147483648" r:id="rId1"/>
   </p:sldMasterIdLst>
   <p:notesMasterIdLst>
-    <p:notesMasterId r:id="rId21"/>
+    <p:notesMasterId r:id="rId22"/>
   </p:notesMasterIdLst>
   <p:sldIdLst>
     <p:sldId id="256" r:id="rId2"/>
@@ -14,19 +14,20 @@
     <p:sldId id="263" r:id="rId5"/>
     <p:sldId id="271" r:id="rId6"/>
     <p:sldId id="264" r:id="rId7"/>
-    <p:sldId id="266" r:id="rId8"/>
-    <p:sldId id="267" r:id="rId9"/>
-    <p:sldId id="265" r:id="rId10"/>
-    <p:sldId id="272" r:id="rId11"/>
-    <p:sldId id="273" r:id="rId12"/>
-    <p:sldId id="274" r:id="rId13"/>
-    <p:sldId id="275" r:id="rId14"/>
-    <p:sldId id="258" r:id="rId15"/>
-    <p:sldId id="260" r:id="rId16"/>
-    <p:sldId id="261" r:id="rId17"/>
-    <p:sldId id="270" r:id="rId18"/>
-    <p:sldId id="262" r:id="rId19"/>
-    <p:sldId id="268" r:id="rId20"/>
+    <p:sldId id="267" r:id="rId8"/>
+    <p:sldId id="276" r:id="rId9"/>
+    <p:sldId id="266" r:id="rId10"/>
+    <p:sldId id="265" r:id="rId11"/>
+    <p:sldId id="272" r:id="rId12"/>
+    <p:sldId id="273" r:id="rId13"/>
+    <p:sldId id="274" r:id="rId14"/>
+    <p:sldId id="275" r:id="rId15"/>
+    <p:sldId id="258" r:id="rId16"/>
+    <p:sldId id="260" r:id="rId17"/>
+    <p:sldId id="261" r:id="rId18"/>
+    <p:sldId id="270" r:id="rId19"/>
+    <p:sldId id="262" r:id="rId20"/>
+    <p:sldId id="268" r:id="rId21"/>
   </p:sldIdLst>
   <p:sldSz cx="12192000" cy="6858000"/>
   <p:notesSz cx="6858000" cy="9144000"/>
@@ -215,7 +216,7 @@
           <a:p>
             <a:fld id="{573A1935-CFF3-4744-B5A7-358890B8B075}" type="datetimeFigureOut">
               <a:rPr lang="en-US" smtClean="0"/>
-              <a:t>10/26/2019</a:t>
+              <a:t>10/28/19</a:t>
             </a:fld>
             <a:endParaRPr lang="en-US"/>
           </a:p>
@@ -810,6 +811,107 @@
           <a:bodyPr/>
           <a:lstStyle/>
           <a:p>
+            <a:r>
+              <a:rPr lang="en-US" dirty="0"/>
+              <a:t>The most important risk that has a major tie in on total cost is the combination of pipe thicknesses. Specifically the exact location in which the pipe thicknesses change. If incorrect calculations are used to determine thickness change points, the overall cost of the project can fluctuate by millions of dollars. To mitigate this risk we have implemented an N choose K combinatorial function into our code.</a:t>
+            </a:r>
+          </a:p>
+          <a:p>
+            <a:r>
+              <a:rPr lang="en-US" dirty="0"/>
+              <a:t>Following pipe </a:t>
+            </a:r>
+            <a:r>
+              <a:rPr lang="en-US" dirty="0" err="1"/>
+              <a:t>thickenss</a:t>
+            </a:r>
+            <a:r>
+              <a:rPr lang="en-US" dirty="0"/>
+              <a:t> in level of importance in regards to risk is the selected pump placement</a:t>
+            </a:r>
+          </a:p>
+        </p:txBody>
+      </p:sp>
+      <p:sp>
+        <p:nvSpPr>
+          <p:cNvPr id="4" name="Slide Number Placeholder 3"/>
+          <p:cNvSpPr>
+            <a:spLocks noGrp="1"/>
+          </p:cNvSpPr>
+          <p:nvPr>
+            <p:ph type="sldNum" sz="quarter" idx="5"/>
+          </p:nvPr>
+        </p:nvSpPr>
+        <p:spPr/>
+        <p:txBody>
+          <a:bodyPr/>
+          <a:lstStyle/>
+          <a:p>
+            <a:fld id="{A7B072B7-FC31-4FD7-B929-F7282CCB0C55}" type="slidenum">
+              <a:rPr lang="en-US" smtClean="0"/>
+              <a:t>8</a:t>
+            </a:fld>
+            <a:endParaRPr lang="en-US"/>
+          </a:p>
+        </p:txBody>
+      </p:sp>
+    </p:spTree>
+    <p:extLst>
+      <p:ext uri="{BB962C8B-B14F-4D97-AF65-F5344CB8AC3E}">
+        <p14:creationId xmlns:p14="http://schemas.microsoft.com/office/powerpoint/2010/main" val="1554120257"/>
+      </p:ext>
+    </p:extLst>
+  </p:cSld>
+  <p:clrMapOvr>
+    <a:masterClrMapping/>
+  </p:clrMapOvr>
+</p:notes>
+</file>
+
+<file path=ppt/notesSlides/notesSlide5.xml><?xml version="1.0" encoding="utf-8"?>
+<p:notes xmlns:a="http://schemas.openxmlformats.org/drawingml/2006/main" xmlns:r="http://schemas.openxmlformats.org/officeDocument/2006/relationships" xmlns:p="http://schemas.openxmlformats.org/presentationml/2006/main">
+  <p:cSld>
+    <p:spTree>
+      <p:nvGrpSpPr>
+        <p:cNvPr id="1" name=""/>
+        <p:cNvGrpSpPr/>
+        <p:nvPr/>
+      </p:nvGrpSpPr>
+      <p:grpSpPr>
+        <a:xfrm>
+          <a:off x="0" y="0"/>
+          <a:ext cx="0" cy="0"/>
+          <a:chOff x="0" y="0"/>
+          <a:chExt cx="0" cy="0"/>
+        </a:xfrm>
+      </p:grpSpPr>
+      <p:sp>
+        <p:nvSpPr>
+          <p:cNvPr id="2" name="Slide Image Placeholder 1"/>
+          <p:cNvSpPr>
+            <a:spLocks noGrp="1" noRot="1" noChangeAspect="1"/>
+          </p:cNvSpPr>
+          <p:nvPr>
+            <p:ph type="sldImg"/>
+          </p:nvPr>
+        </p:nvSpPr>
+        <p:spPr/>
+      </p:sp>
+      <p:sp>
+        <p:nvSpPr>
+          <p:cNvPr id="3" name="Notes Placeholder 2"/>
+          <p:cNvSpPr>
+            <a:spLocks noGrp="1"/>
+          </p:cNvSpPr>
+          <p:nvPr>
+            <p:ph type="body" idx="1"/>
+          </p:nvPr>
+        </p:nvSpPr>
+        <p:spPr/>
+        <p:txBody>
+          <a:bodyPr/>
+          <a:lstStyle/>
+          <a:p>
             <a:pPr marL="0" marR="0" lvl="0" indent="0" algn="l" defTabSz="914400" rtl="0" eaLnBrk="1" fontAlgn="auto" latinLnBrk="0" hangingPunct="1">
               <a:lnSpc>
                 <a:spcPct val="100000"/>
@@ -855,7 +957,7 @@
           <a:p>
             <a:fld id="{A7B072B7-FC31-4FD7-B929-F7282CCB0C55}" type="slidenum">
               <a:rPr lang="en-US" smtClean="0"/>
-              <a:t>7</a:t>
+              <a:t>9</a:t>
             </a:fld>
             <a:endParaRPr lang="en-US"/>
           </a:p>
@@ -1021,7 +1123,7 @@
           <a:p>
             <a:fld id="{6A1BF488-617C-45ED-ACF4-41A8189FD430}" type="datetimeFigureOut">
               <a:rPr lang="en-US" smtClean="0"/>
-              <a:t>10/25/2019</a:t>
+              <a:t>10/28/19</a:t>
             </a:fld>
             <a:endParaRPr lang="en-US"/>
           </a:p>
@@ -1219,7 +1321,7 @@
           <a:p>
             <a:fld id="{6A1BF488-617C-45ED-ACF4-41A8189FD430}" type="datetimeFigureOut">
               <a:rPr lang="en-US" smtClean="0"/>
-              <a:t>10/25/2019</a:t>
+              <a:t>10/28/19</a:t>
             </a:fld>
             <a:endParaRPr lang="en-US"/>
           </a:p>
@@ -1427,7 +1529,7 @@
           <a:p>
             <a:fld id="{6A1BF488-617C-45ED-ACF4-41A8189FD430}" type="datetimeFigureOut">
               <a:rPr lang="en-US" smtClean="0"/>
-              <a:t>10/25/2019</a:t>
+              <a:t>10/28/19</a:t>
             </a:fld>
             <a:endParaRPr lang="en-US"/>
           </a:p>
@@ -1625,7 +1727,7 @@
           <a:p>
             <a:fld id="{6A1BF488-617C-45ED-ACF4-41A8189FD430}" type="datetimeFigureOut">
               <a:rPr lang="en-US" smtClean="0"/>
-              <a:t>10/25/2019</a:t>
+              <a:t>10/28/19</a:t>
             </a:fld>
             <a:endParaRPr lang="en-US"/>
           </a:p>
@@ -1900,7 +2002,7 @@
           <a:p>
             <a:fld id="{6A1BF488-617C-45ED-ACF4-41A8189FD430}" type="datetimeFigureOut">
               <a:rPr lang="en-US" smtClean="0"/>
-              <a:t>10/25/2019</a:t>
+              <a:t>10/28/19</a:t>
             </a:fld>
             <a:endParaRPr lang="en-US"/>
           </a:p>
@@ -2165,7 +2267,7 @@
           <a:p>
             <a:fld id="{6A1BF488-617C-45ED-ACF4-41A8189FD430}" type="datetimeFigureOut">
               <a:rPr lang="en-US" smtClean="0"/>
-              <a:t>10/25/2019</a:t>
+              <a:t>10/28/19</a:t>
             </a:fld>
             <a:endParaRPr lang="en-US"/>
           </a:p>
@@ -2577,7 +2679,7 @@
           <a:p>
             <a:fld id="{6A1BF488-617C-45ED-ACF4-41A8189FD430}" type="datetimeFigureOut">
               <a:rPr lang="en-US" smtClean="0"/>
-              <a:t>10/25/2019</a:t>
+              <a:t>10/28/19</a:t>
             </a:fld>
             <a:endParaRPr lang="en-US"/>
           </a:p>
@@ -2718,7 +2820,7 @@
           <a:p>
             <a:fld id="{6A1BF488-617C-45ED-ACF4-41A8189FD430}" type="datetimeFigureOut">
               <a:rPr lang="en-US" smtClean="0"/>
-              <a:t>10/25/2019</a:t>
+              <a:t>10/28/19</a:t>
             </a:fld>
             <a:endParaRPr lang="en-US"/>
           </a:p>
@@ -2831,7 +2933,7 @@
           <a:p>
             <a:fld id="{6A1BF488-617C-45ED-ACF4-41A8189FD430}" type="datetimeFigureOut">
               <a:rPr lang="en-US" smtClean="0"/>
-              <a:t>10/25/2019</a:t>
+              <a:t>10/28/19</a:t>
             </a:fld>
             <a:endParaRPr lang="en-US"/>
           </a:p>
@@ -3142,7 +3244,7 @@
           <a:p>
             <a:fld id="{6A1BF488-617C-45ED-ACF4-41A8189FD430}" type="datetimeFigureOut">
               <a:rPr lang="en-US" smtClean="0"/>
-              <a:t>10/25/2019</a:t>
+              <a:t>10/28/19</a:t>
             </a:fld>
             <a:endParaRPr lang="en-US"/>
           </a:p>
@@ -3430,7 +3532,7 @@
           <a:p>
             <a:fld id="{6A1BF488-617C-45ED-ACF4-41A8189FD430}" type="datetimeFigureOut">
               <a:rPr lang="en-US" smtClean="0"/>
-              <a:t>10/25/2019</a:t>
+              <a:t>10/28/19</a:t>
             </a:fld>
             <a:endParaRPr lang="en-US"/>
           </a:p>
@@ -3671,7 +3773,7 @@
           <a:p>
             <a:fld id="{6A1BF488-617C-45ED-ACF4-41A8189FD430}" type="datetimeFigureOut">
               <a:rPr lang="en-US" smtClean="0"/>
-              <a:t>10/25/2019</a:t>
+              <a:t>10/28/19</a:t>
             </a:fld>
             <a:endParaRPr lang="en-US"/>
           </a:p>
@@ -4361,75 +4463,31 @@
           <a:chExt cx="0" cy="0"/>
         </a:xfrm>
       </p:grpSpPr>
-      <p:pic>
-        <p:nvPicPr>
-          <p:cNvPr id="5" name="Content Placeholder 4">
-            <a:extLst>
-              <a:ext uri="{FF2B5EF4-FFF2-40B4-BE49-F238E27FC236}">
-                <a16:creationId xmlns:a16="http://schemas.microsoft.com/office/drawing/2014/main" id="{DBB28017-099D-4984-8E96-35BE20699C1F}"/>
-              </a:ext>
-            </a:extLst>
-          </p:cNvPr>
-          <p:cNvPicPr>
-            <a:picLocks noGrp="1" noChangeAspect="1"/>
-          </p:cNvPicPr>
+      <p:sp>
+        <p:nvSpPr>
+          <p:cNvPr id="2" name="Title 1">
+            <a:extLst>
+              <a:ext uri="{FF2B5EF4-FFF2-40B4-BE49-F238E27FC236}">
+                <a16:creationId xmlns:a16="http://schemas.microsoft.com/office/drawing/2014/main" id="{A6A8ED33-335E-F04F-8005-06EB5DEEB604}"/>
+              </a:ext>
+            </a:extLst>
+          </p:cNvPr>
+          <p:cNvSpPr>
+            <a:spLocks noGrp="1"/>
+          </p:cNvSpPr>
           <p:nvPr>
-            <p:ph idx="1"/>
+            <p:ph type="title"/>
           </p:nvPr>
-        </p:nvPicPr>
-        <p:blipFill>
-          <a:blip r:embed="rId2">
-            <a:extLst>
-              <a:ext uri="{28A0092B-C50C-407E-A947-70E740481C1C}">
-                <a14:useLocalDpi xmlns:a14="http://schemas.microsoft.com/office/drawing/2010/main" val="0"/>
-              </a:ext>
-            </a:extLst>
-          </a:blip>
-          <a:stretch>
-            <a:fillRect/>
-          </a:stretch>
-        </p:blipFill>
-        <p:spPr>
-          <a:xfrm>
-            <a:off x="491847" y="0"/>
-            <a:ext cx="11208306" cy="6858000"/>
-          </a:xfrm>
-        </p:spPr>
-      </p:pic>
-      <p:sp>
-        <p:nvSpPr>
-          <p:cNvPr id="6" name="TextBox 5">
-            <a:extLst>
-              <a:ext uri="{FF2B5EF4-FFF2-40B4-BE49-F238E27FC236}">
-                <a16:creationId xmlns:a16="http://schemas.microsoft.com/office/drawing/2014/main" id="{C4A9336C-831B-4FEE-B9C9-7D5E2AD70A3E}"/>
-              </a:ext>
-            </a:extLst>
-          </p:cNvPr>
-          <p:cNvSpPr txBox="1"/>
-          <p:nvPr/>
-        </p:nvSpPr>
-        <p:spPr>
-          <a:xfrm>
-            <a:off x="6923314" y="5682343"/>
-            <a:ext cx="4258492" cy="646331"/>
-          </a:xfrm>
-          <a:prstGeom prst="rect">
-            <a:avLst/>
-          </a:prstGeom>
-          <a:solidFill>
-            <a:schemeClr val="bg1"/>
-          </a:solidFill>
-        </p:spPr>
-        <p:txBody>
-          <a:bodyPr wrap="square" rtlCol="0">
-            <a:spAutoFit/>
-          </a:bodyPr>
+        </p:nvSpPr>
+        <p:spPr/>
+        <p:txBody>
+          <a:bodyPr/>
           <a:lstStyle/>
           <a:p>
             <a:pPr algn="ctr"/>
             <a:r>
-              <a:rPr lang="en-US" sz="3600" dirty="0"/>
-              <a:t>Excavation Volumes</a:t>
+              <a:rPr lang="en-US" dirty="0"/>
+              <a:t>Backup Slides</a:t>
             </a:r>
           </a:p>
         </p:txBody>
@@ -4437,7 +4495,7 @@
     </p:spTree>
     <p:extLst>
       <p:ext uri="{BB962C8B-B14F-4D97-AF65-F5344CB8AC3E}">
-        <p14:creationId xmlns:p14="http://schemas.microsoft.com/office/powerpoint/2010/main" val="1400174381"/>
+        <p14:creationId xmlns:p14="http://schemas.microsoft.com/office/powerpoint/2010/main" val="459446304"/>
       </p:ext>
     </p:extLst>
   </p:cSld>
@@ -4469,7 +4527,7 @@
           <p:cNvPr id="5" name="Content Placeholder 4">
             <a:extLst>
               <a:ext uri="{FF2B5EF4-FFF2-40B4-BE49-F238E27FC236}">
-                <a16:creationId xmlns:a16="http://schemas.microsoft.com/office/drawing/2014/main" id="{C52A6993-5B13-4376-8FDB-5BF90FEAE378}"/>
+                <a16:creationId xmlns:a16="http://schemas.microsoft.com/office/drawing/2014/main" id="{DBB28017-099D-4984-8E96-35BE20699C1F}"/>
               </a:ext>
             </a:extLst>
           </p:cNvPr>
@@ -4494,27 +4552,27 @@
         </p:blipFill>
         <p:spPr>
           <a:xfrm>
-            <a:off x="72731" y="0"/>
-            <a:ext cx="12046538" cy="6858000"/>
+            <a:off x="491847" y="0"/>
+            <a:ext cx="11208306" cy="6858000"/>
           </a:xfrm>
         </p:spPr>
       </p:pic>
       <p:sp>
         <p:nvSpPr>
-          <p:cNvPr id="6" name="Rectangle 5">
-            <a:extLst>
-              <a:ext uri="{FF2B5EF4-FFF2-40B4-BE49-F238E27FC236}">
-                <a16:creationId xmlns:a16="http://schemas.microsoft.com/office/drawing/2014/main" id="{4FF2203E-1DDF-4892-A609-0DEB8AEFEE23}"/>
-              </a:ext>
-            </a:extLst>
-          </p:cNvPr>
-          <p:cNvSpPr/>
+          <p:cNvPr id="6" name="TextBox 5">
+            <a:extLst>
+              <a:ext uri="{FF2B5EF4-FFF2-40B4-BE49-F238E27FC236}">
+                <a16:creationId xmlns:a16="http://schemas.microsoft.com/office/drawing/2014/main" id="{C4A9336C-831B-4FEE-B9C9-7D5E2AD70A3E}"/>
+              </a:ext>
+            </a:extLst>
+          </p:cNvPr>
+          <p:cNvSpPr txBox="1"/>
           <p:nvPr/>
         </p:nvSpPr>
         <p:spPr>
           <a:xfrm>
-            <a:off x="5264331" y="731520"/>
-            <a:ext cx="6152606" cy="1031966"/>
+            <a:off x="6923314" y="5682343"/>
+            <a:ext cx="4258492" cy="646331"/>
           </a:xfrm>
           <a:prstGeom prst="rect">
             <a:avLst/>
@@ -4523,34 +4581,16 @@
             <a:schemeClr val="bg1"/>
           </a:solidFill>
         </p:spPr>
-        <p:style>
-          <a:lnRef idx="2">
-            <a:schemeClr val="accent1">
-              <a:shade val="50000"/>
-            </a:schemeClr>
-          </a:lnRef>
-          <a:fillRef idx="1">
-            <a:schemeClr val="accent1"/>
-          </a:fillRef>
-          <a:effectRef idx="0">
-            <a:schemeClr val="accent1"/>
-          </a:effectRef>
-          <a:fontRef idx="minor">
-            <a:schemeClr val="lt1"/>
-          </a:fontRef>
-        </p:style>
-        <p:txBody>
-          <a:bodyPr rtlCol="0" anchor="ctr"/>
+        <p:txBody>
+          <a:bodyPr wrap="square" rtlCol="0">
+            <a:spAutoFit/>
+          </a:bodyPr>
           <a:lstStyle/>
           <a:p>
             <a:pPr algn="ctr"/>
             <a:r>
-              <a:rPr lang="en-US" sz="3600" dirty="0">
-                <a:solidFill>
-                  <a:schemeClr val="tx1"/>
-                </a:solidFill>
-              </a:rPr>
-              <a:t>Equipment Costs</a:t>
+              <a:rPr lang="en-US" sz="3600" dirty="0"/>
+              <a:t>Excavation Volumes</a:t>
             </a:r>
           </a:p>
         </p:txBody>
@@ -4558,7 +4598,7 @@
     </p:spTree>
     <p:extLst>
       <p:ext uri="{BB962C8B-B14F-4D97-AF65-F5344CB8AC3E}">
-        <p14:creationId xmlns:p14="http://schemas.microsoft.com/office/powerpoint/2010/main" val="1937689426"/>
+        <p14:creationId xmlns:p14="http://schemas.microsoft.com/office/powerpoint/2010/main" val="1400174381"/>
       </p:ext>
     </p:extLst>
   </p:cSld>
@@ -4590,7 +4630,7 @@
           <p:cNvPr id="5" name="Content Placeholder 4">
             <a:extLst>
               <a:ext uri="{FF2B5EF4-FFF2-40B4-BE49-F238E27FC236}">
-                <a16:creationId xmlns:a16="http://schemas.microsoft.com/office/drawing/2014/main" id="{BF8C68BF-EE88-434E-B962-9E75DBE30AA6}"/>
+                <a16:creationId xmlns:a16="http://schemas.microsoft.com/office/drawing/2014/main" id="{C52A6993-5B13-4376-8FDB-5BF90FEAE378}"/>
               </a:ext>
             </a:extLst>
           </p:cNvPr>
@@ -4615,209 +4655,71 @@
         </p:blipFill>
         <p:spPr>
           <a:xfrm>
-            <a:off x="6575553" y="4415246"/>
-            <a:ext cx="6050804" cy="1607959"/>
+            <a:off x="72731" y="0"/>
+            <a:ext cx="12046538" cy="6858000"/>
           </a:xfrm>
         </p:spPr>
       </p:pic>
-      <p:pic>
-        <p:nvPicPr>
-          <p:cNvPr id="7" name="Picture 6">
-            <a:extLst>
-              <a:ext uri="{FF2B5EF4-FFF2-40B4-BE49-F238E27FC236}">
-                <a16:creationId xmlns:a16="http://schemas.microsoft.com/office/drawing/2014/main" id="{6FD9204E-0EC5-4AFB-BE85-ADD423E48402}"/>
-              </a:ext>
-            </a:extLst>
-          </p:cNvPr>
-          <p:cNvPicPr>
-            <a:picLocks noChangeAspect="1"/>
-          </p:cNvPicPr>
+      <p:sp>
+        <p:nvSpPr>
+          <p:cNvPr id="6" name="Rectangle 5">
+            <a:extLst>
+              <a:ext uri="{FF2B5EF4-FFF2-40B4-BE49-F238E27FC236}">
+                <a16:creationId xmlns:a16="http://schemas.microsoft.com/office/drawing/2014/main" id="{4FF2203E-1DDF-4892-A609-0DEB8AEFEE23}"/>
+              </a:ext>
+            </a:extLst>
+          </p:cNvPr>
+          <p:cNvSpPr/>
           <p:nvPr/>
-        </p:nvPicPr>
-        <p:blipFill>
-          <a:blip r:embed="rId3">
-            <a:extLst>
-              <a:ext uri="{28A0092B-C50C-407E-A947-70E740481C1C}">
-                <a14:useLocalDpi xmlns:a14="http://schemas.microsoft.com/office/drawing/2010/main" val="0"/>
-              </a:ext>
-            </a:extLst>
-          </a:blip>
-          <a:stretch>
-            <a:fillRect/>
-          </a:stretch>
-        </p:blipFill>
+        </p:nvSpPr>
         <p:spPr>
           <a:xfrm>
-            <a:off x="0" y="0"/>
-            <a:ext cx="6366548" cy="6858000"/>
+            <a:off x="5264331" y="731520"/>
+            <a:ext cx="6152606" cy="1031966"/>
           </a:xfrm>
           <a:prstGeom prst="rect">
             <a:avLst/>
           </a:prstGeom>
-        </p:spPr>
-      </p:pic>
-      <p:sp>
-        <p:nvSpPr>
-          <p:cNvPr id="8" name="TextBox 7">
-            <a:extLst>
-              <a:ext uri="{FF2B5EF4-FFF2-40B4-BE49-F238E27FC236}">
-                <a16:creationId xmlns:a16="http://schemas.microsoft.com/office/drawing/2014/main" id="{1ACDD1F7-FDE5-4422-8699-824D26FD923C}"/>
-              </a:ext>
-            </a:extLst>
-          </p:cNvPr>
-          <p:cNvSpPr txBox="1"/>
-          <p:nvPr/>
-        </p:nvSpPr>
-        <p:spPr>
-          <a:xfrm>
-            <a:off x="7328263" y="653143"/>
-            <a:ext cx="3185103" cy="461665"/>
-          </a:xfrm>
-          <a:prstGeom prst="rect">
-            <a:avLst/>
-          </a:prstGeom>
-          <a:noFill/>
-        </p:spPr>
-        <p:txBody>
-          <a:bodyPr wrap="none" rtlCol="0">
-            <a:spAutoFit/>
-          </a:bodyPr>
-          <a:lstStyle/>
-          <a:p>
-            <a:r>
-              <a:rPr lang="en-US" sz="2400" dirty="0"/>
-              <a:t>Foundation Calculations</a:t>
-            </a:r>
-          </a:p>
-        </p:txBody>
-      </p:sp>
-      <p:cxnSp>
-        <p:nvCxnSpPr>
-          <p:cNvPr id="10" name="Straight Arrow Connector 9">
-            <a:extLst>
-              <a:ext uri="{FF2B5EF4-FFF2-40B4-BE49-F238E27FC236}">
-                <a16:creationId xmlns:a16="http://schemas.microsoft.com/office/drawing/2014/main" id="{9CB1C0CD-3A13-4859-9777-045BEEFEF8CF}"/>
-              </a:ext>
-            </a:extLst>
-          </p:cNvPr>
-          <p:cNvCxnSpPr>
-            <a:cxnSpLocks/>
-          </p:cNvCxnSpPr>
-          <p:nvPr/>
-        </p:nvCxnSpPr>
-        <p:spPr>
-          <a:xfrm flipH="1">
-            <a:off x="6575553" y="883975"/>
-            <a:ext cx="752710" cy="0"/>
-          </a:xfrm>
-          <a:prstGeom prst="straightConnector1">
-            <a:avLst/>
-          </a:prstGeom>
-          <a:ln w="38100">
-            <a:solidFill>
-              <a:srgbClr val="FF0000"/>
-            </a:solidFill>
-            <a:tailEnd type="triangle"/>
-          </a:ln>
+          <a:solidFill>
+            <a:schemeClr val="bg1"/>
+          </a:solidFill>
         </p:spPr>
         <p:style>
-          <a:lnRef idx="1">
-            <a:schemeClr val="accent1"/>
+          <a:lnRef idx="2">
+            <a:schemeClr val="accent1">
+              <a:shade val="50000"/>
+            </a:schemeClr>
           </a:lnRef>
-          <a:fillRef idx="0">
+          <a:fillRef idx="1">
             <a:schemeClr val="accent1"/>
           </a:fillRef>
           <a:effectRef idx="0">
             <a:schemeClr val="accent1"/>
           </a:effectRef>
           <a:fontRef idx="minor">
-            <a:schemeClr val="tx1"/>
+            <a:schemeClr val="lt1"/>
           </a:fontRef>
         </p:style>
-      </p:cxnSp>
-      <p:sp>
-        <p:nvSpPr>
-          <p:cNvPr id="13" name="TextBox 12">
-            <a:extLst>
-              <a:ext uri="{FF2B5EF4-FFF2-40B4-BE49-F238E27FC236}">
-                <a16:creationId xmlns:a16="http://schemas.microsoft.com/office/drawing/2014/main" id="{4BF4E68E-6313-43E9-9863-55EF20F7BF25}"/>
-              </a:ext>
-            </a:extLst>
-          </p:cNvPr>
-          <p:cNvSpPr txBox="1"/>
-          <p:nvPr/>
-        </p:nvSpPr>
-        <p:spPr>
-          <a:xfrm>
-            <a:off x="7889966" y="2403566"/>
-            <a:ext cx="2989601" cy="461665"/>
-          </a:xfrm>
-          <a:prstGeom prst="rect">
-            <a:avLst/>
-          </a:prstGeom>
-          <a:noFill/>
-        </p:spPr>
-        <p:txBody>
-          <a:bodyPr wrap="none" rtlCol="0">
-            <a:spAutoFit/>
-          </a:bodyPr>
+        <p:txBody>
+          <a:bodyPr rtlCol="0" anchor="ctr"/>
           <a:lstStyle/>
           <a:p>
-            <a:r>
-              <a:rPr lang="en-US" sz="2400" dirty="0"/>
-              <a:t>Pump viability checker</a:t>
-            </a:r>
-          </a:p>
-        </p:txBody>
-      </p:sp>
-      <p:cxnSp>
-        <p:nvCxnSpPr>
-          <p:cNvPr id="14" name="Straight Arrow Connector 13">
-            <a:extLst>
-              <a:ext uri="{FF2B5EF4-FFF2-40B4-BE49-F238E27FC236}">
-                <a16:creationId xmlns:a16="http://schemas.microsoft.com/office/drawing/2014/main" id="{6A0BED45-A457-420B-8149-F3974DBAE25E}"/>
-              </a:ext>
-            </a:extLst>
-          </p:cNvPr>
-          <p:cNvCxnSpPr>
-            <a:cxnSpLocks/>
-          </p:cNvCxnSpPr>
-          <p:nvPr/>
-        </p:nvCxnSpPr>
-        <p:spPr>
-          <a:xfrm>
-            <a:off x="9297169" y="2873829"/>
-            <a:ext cx="0" cy="1449977"/>
-          </a:xfrm>
-          <a:prstGeom prst="straightConnector1">
-            <a:avLst/>
-          </a:prstGeom>
-          <a:ln w="38100">
-            <a:solidFill>
-              <a:srgbClr val="FF0000"/>
-            </a:solidFill>
-            <a:tailEnd type="triangle"/>
-          </a:ln>
-        </p:spPr>
-        <p:style>
-          <a:lnRef idx="1">
-            <a:schemeClr val="accent1"/>
-          </a:lnRef>
-          <a:fillRef idx="0">
-            <a:schemeClr val="accent1"/>
-          </a:fillRef>
-          <a:effectRef idx="0">
-            <a:schemeClr val="accent1"/>
-          </a:effectRef>
-          <a:fontRef idx="minor">
-            <a:schemeClr val="tx1"/>
-          </a:fontRef>
-        </p:style>
-      </p:cxnSp>
+            <a:pPr algn="ctr"/>
+            <a:r>
+              <a:rPr lang="en-US" sz="3600" dirty="0">
+                <a:solidFill>
+                  <a:schemeClr val="tx1"/>
+                </a:solidFill>
+              </a:rPr>
+              <a:t>Equipment Costs</a:t>
+            </a:r>
+          </a:p>
+        </p:txBody>
+      </p:sp>
     </p:spTree>
     <p:extLst>
       <p:ext uri="{BB962C8B-B14F-4D97-AF65-F5344CB8AC3E}">
-        <p14:creationId xmlns:p14="http://schemas.microsoft.com/office/powerpoint/2010/main" val="2835180805"/>
+        <p14:creationId xmlns:p14="http://schemas.microsoft.com/office/powerpoint/2010/main" val="1937689426"/>
       </p:ext>
     </p:extLst>
   </p:cSld>
@@ -4849,7 +4751,7 @@
           <p:cNvPr id="5" name="Content Placeholder 4">
             <a:extLst>
               <a:ext uri="{FF2B5EF4-FFF2-40B4-BE49-F238E27FC236}">
-                <a16:creationId xmlns:a16="http://schemas.microsoft.com/office/drawing/2014/main" id="{1D2D5476-BA11-404D-A029-3FEB2ACE80AD}"/>
+                <a16:creationId xmlns:a16="http://schemas.microsoft.com/office/drawing/2014/main" id="{BF8C68BF-EE88-434E-B962-9E75DBE30AA6}"/>
               </a:ext>
             </a:extLst>
           </p:cNvPr>
@@ -4874,8 +4776,8 @@
         </p:blipFill>
         <p:spPr>
           <a:xfrm>
-            <a:off x="106680" y="2602439"/>
-            <a:ext cx="5143946" cy="3292125"/>
+            <a:off x="6575553" y="4415246"/>
+            <a:ext cx="6050804" cy="1607959"/>
           </a:xfrm>
         </p:spPr>
       </p:pic>
@@ -4884,7 +4786,7 @@
           <p:cNvPr id="7" name="Picture 6">
             <a:extLst>
               <a:ext uri="{FF2B5EF4-FFF2-40B4-BE49-F238E27FC236}">
-                <a16:creationId xmlns:a16="http://schemas.microsoft.com/office/drawing/2014/main" id="{1950351E-8AF8-484B-848C-DDCCB09F6009}"/>
+                <a16:creationId xmlns:a16="http://schemas.microsoft.com/office/drawing/2014/main" id="{6FD9204E-0EC5-4AFB-BE85-ADD423E48402}"/>
               </a:ext>
             </a:extLst>
           </p:cNvPr>
@@ -4907,8 +4809,8 @@
         </p:blipFill>
         <p:spPr>
           <a:xfrm>
-            <a:off x="5935446" y="4248502"/>
-            <a:ext cx="5547841" cy="2217612"/>
+            <a:off x="0" y="0"/>
+            <a:ext cx="6366548" cy="6858000"/>
           </a:xfrm>
           <a:prstGeom prst="rect">
             <a:avLst/>
@@ -4920,7 +4822,7 @@
           <p:cNvPr id="8" name="TextBox 7">
             <a:extLst>
               <a:ext uri="{FF2B5EF4-FFF2-40B4-BE49-F238E27FC236}">
-                <a16:creationId xmlns:a16="http://schemas.microsoft.com/office/drawing/2014/main" id="{AFB58606-DFA7-4AA7-A4F7-93075ACF0F75}"/>
+                <a16:creationId xmlns:a16="http://schemas.microsoft.com/office/drawing/2014/main" id="{1ACDD1F7-FDE5-4422-8699-824D26FD923C}"/>
               </a:ext>
             </a:extLst>
           </p:cNvPr>
@@ -4929,8 +4831,8 @@
         </p:nvSpPr>
         <p:spPr>
           <a:xfrm>
-            <a:off x="3569293" y="391886"/>
-            <a:ext cx="5281126" cy="646331"/>
+            <a:off x="7328263" y="653143"/>
+            <a:ext cx="3185103" cy="461665"/>
           </a:xfrm>
           <a:prstGeom prst="rect">
             <a:avLst/>
@@ -4944,52 +4846,139 @@
           <a:lstStyle/>
           <a:p>
             <a:r>
-              <a:rPr lang="en-US" sz="3600" dirty="0"/>
-              <a:t>Pipe Thickness Calculations</a:t>
-            </a:r>
-          </a:p>
-        </p:txBody>
-      </p:sp>
-      <p:pic>
-        <p:nvPicPr>
-          <p:cNvPr id="10" name="Picture 9">
-            <a:extLst>
-              <a:ext uri="{FF2B5EF4-FFF2-40B4-BE49-F238E27FC236}">
-                <a16:creationId xmlns:a16="http://schemas.microsoft.com/office/drawing/2014/main" id="{D49865AA-288F-4843-9B82-6CE1C5CD503E}"/>
-              </a:ext>
-            </a:extLst>
-          </p:cNvPr>
-          <p:cNvPicPr>
-            <a:picLocks noChangeAspect="1"/>
-          </p:cNvPicPr>
+              <a:rPr lang="en-US" sz="2400" dirty="0"/>
+              <a:t>Foundation Calculations</a:t>
+            </a:r>
+          </a:p>
+        </p:txBody>
+      </p:sp>
+      <p:cxnSp>
+        <p:nvCxnSpPr>
+          <p:cNvPr id="10" name="Straight Arrow Connector 9">
+            <a:extLst>
+              <a:ext uri="{FF2B5EF4-FFF2-40B4-BE49-F238E27FC236}">
+                <a16:creationId xmlns:a16="http://schemas.microsoft.com/office/drawing/2014/main" id="{9CB1C0CD-3A13-4859-9777-045BEEFEF8CF}"/>
+              </a:ext>
+            </a:extLst>
+          </p:cNvPr>
+          <p:cNvCxnSpPr>
+            <a:cxnSpLocks/>
+          </p:cNvCxnSpPr>
           <p:nvPr/>
-        </p:nvPicPr>
-        <p:blipFill>
-          <a:blip r:embed="rId4">
-            <a:extLst>
-              <a:ext uri="{28A0092B-C50C-407E-A947-70E740481C1C}">
-                <a14:useLocalDpi xmlns:a14="http://schemas.microsoft.com/office/drawing/2010/main" val="0"/>
-              </a:ext>
-            </a:extLst>
-          </a:blip>
-          <a:stretch>
-            <a:fillRect/>
-          </a:stretch>
-        </p:blipFill>
+        </p:nvCxnSpPr>
+        <p:spPr>
+          <a:xfrm flipH="1">
+            <a:off x="6575553" y="883975"/>
+            <a:ext cx="752710" cy="0"/>
+          </a:xfrm>
+          <a:prstGeom prst="straightConnector1">
+            <a:avLst/>
+          </a:prstGeom>
+          <a:ln w="38100">
+            <a:solidFill>
+              <a:srgbClr val="FF0000"/>
+            </a:solidFill>
+            <a:tailEnd type="triangle"/>
+          </a:ln>
+        </p:spPr>
+        <p:style>
+          <a:lnRef idx="1">
+            <a:schemeClr val="accent1"/>
+          </a:lnRef>
+          <a:fillRef idx="0">
+            <a:schemeClr val="accent1"/>
+          </a:fillRef>
+          <a:effectRef idx="0">
+            <a:schemeClr val="accent1"/>
+          </a:effectRef>
+          <a:fontRef idx="minor">
+            <a:schemeClr val="tx1"/>
+          </a:fontRef>
+        </p:style>
+      </p:cxnSp>
+      <p:sp>
+        <p:nvSpPr>
+          <p:cNvPr id="13" name="TextBox 12">
+            <a:extLst>
+              <a:ext uri="{FF2B5EF4-FFF2-40B4-BE49-F238E27FC236}">
+                <a16:creationId xmlns:a16="http://schemas.microsoft.com/office/drawing/2014/main" id="{4BF4E68E-6313-43E9-9863-55EF20F7BF25}"/>
+              </a:ext>
+            </a:extLst>
+          </p:cNvPr>
+          <p:cNvSpPr txBox="1"/>
+          <p:nvPr/>
+        </p:nvSpPr>
         <p:spPr>
           <a:xfrm>
-            <a:off x="5333415" y="1469291"/>
-            <a:ext cx="6751905" cy="2629128"/>
+            <a:off x="7889966" y="2403566"/>
+            <a:ext cx="2989601" cy="461665"/>
           </a:xfrm>
           <a:prstGeom prst="rect">
             <a:avLst/>
           </a:prstGeom>
-        </p:spPr>
-      </p:pic>
+          <a:noFill/>
+        </p:spPr>
+        <p:txBody>
+          <a:bodyPr wrap="none" rtlCol="0">
+            <a:spAutoFit/>
+          </a:bodyPr>
+          <a:lstStyle/>
+          <a:p>
+            <a:r>
+              <a:rPr lang="en-US" sz="2400" dirty="0"/>
+              <a:t>Pump viability checker</a:t>
+            </a:r>
+          </a:p>
+        </p:txBody>
+      </p:sp>
+      <p:cxnSp>
+        <p:nvCxnSpPr>
+          <p:cNvPr id="14" name="Straight Arrow Connector 13">
+            <a:extLst>
+              <a:ext uri="{FF2B5EF4-FFF2-40B4-BE49-F238E27FC236}">
+                <a16:creationId xmlns:a16="http://schemas.microsoft.com/office/drawing/2014/main" id="{6A0BED45-A457-420B-8149-F3974DBAE25E}"/>
+              </a:ext>
+            </a:extLst>
+          </p:cNvPr>
+          <p:cNvCxnSpPr>
+            <a:cxnSpLocks/>
+          </p:cNvCxnSpPr>
+          <p:nvPr/>
+        </p:nvCxnSpPr>
+        <p:spPr>
+          <a:xfrm>
+            <a:off x="9297169" y="2873829"/>
+            <a:ext cx="0" cy="1449977"/>
+          </a:xfrm>
+          <a:prstGeom prst="straightConnector1">
+            <a:avLst/>
+          </a:prstGeom>
+          <a:ln w="38100">
+            <a:solidFill>
+              <a:srgbClr val="FF0000"/>
+            </a:solidFill>
+            <a:tailEnd type="triangle"/>
+          </a:ln>
+        </p:spPr>
+        <p:style>
+          <a:lnRef idx="1">
+            <a:schemeClr val="accent1"/>
+          </a:lnRef>
+          <a:fillRef idx="0">
+            <a:schemeClr val="accent1"/>
+          </a:fillRef>
+          <a:effectRef idx="0">
+            <a:schemeClr val="accent1"/>
+          </a:effectRef>
+          <a:fontRef idx="minor">
+            <a:schemeClr val="tx1"/>
+          </a:fontRef>
+        </p:style>
+      </p:cxnSp>
     </p:spTree>
     <p:extLst>
       <p:ext uri="{BB962C8B-B14F-4D97-AF65-F5344CB8AC3E}">
-        <p14:creationId xmlns:p14="http://schemas.microsoft.com/office/powerpoint/2010/main" val="66255904"/>
+        <p14:creationId xmlns:p14="http://schemas.microsoft.com/office/powerpoint/2010/main" val="2835180805"/>
       </p:ext>
     </p:extLst>
   </p:cSld>
@@ -5016,6 +5005,178 @@
           <a:chExt cx="0" cy="0"/>
         </a:xfrm>
       </p:grpSpPr>
+      <p:pic>
+        <p:nvPicPr>
+          <p:cNvPr id="5" name="Content Placeholder 4">
+            <a:extLst>
+              <a:ext uri="{FF2B5EF4-FFF2-40B4-BE49-F238E27FC236}">
+                <a16:creationId xmlns:a16="http://schemas.microsoft.com/office/drawing/2014/main" id="{1D2D5476-BA11-404D-A029-3FEB2ACE80AD}"/>
+              </a:ext>
+            </a:extLst>
+          </p:cNvPr>
+          <p:cNvPicPr>
+            <a:picLocks noGrp="1" noChangeAspect="1"/>
+          </p:cNvPicPr>
+          <p:nvPr>
+            <p:ph idx="1"/>
+          </p:nvPr>
+        </p:nvPicPr>
+        <p:blipFill>
+          <a:blip r:embed="rId2">
+            <a:extLst>
+              <a:ext uri="{28A0092B-C50C-407E-A947-70E740481C1C}">
+                <a14:useLocalDpi xmlns:a14="http://schemas.microsoft.com/office/drawing/2010/main" val="0"/>
+              </a:ext>
+            </a:extLst>
+          </a:blip>
+          <a:stretch>
+            <a:fillRect/>
+          </a:stretch>
+        </p:blipFill>
+        <p:spPr>
+          <a:xfrm>
+            <a:off x="106680" y="2602439"/>
+            <a:ext cx="5143946" cy="3292125"/>
+          </a:xfrm>
+        </p:spPr>
+      </p:pic>
+      <p:pic>
+        <p:nvPicPr>
+          <p:cNvPr id="7" name="Picture 6">
+            <a:extLst>
+              <a:ext uri="{FF2B5EF4-FFF2-40B4-BE49-F238E27FC236}">
+                <a16:creationId xmlns:a16="http://schemas.microsoft.com/office/drawing/2014/main" id="{1950351E-8AF8-484B-848C-DDCCB09F6009}"/>
+              </a:ext>
+            </a:extLst>
+          </p:cNvPr>
+          <p:cNvPicPr>
+            <a:picLocks noChangeAspect="1"/>
+          </p:cNvPicPr>
+          <p:nvPr/>
+        </p:nvPicPr>
+        <p:blipFill>
+          <a:blip r:embed="rId3">
+            <a:extLst>
+              <a:ext uri="{28A0092B-C50C-407E-A947-70E740481C1C}">
+                <a14:useLocalDpi xmlns:a14="http://schemas.microsoft.com/office/drawing/2010/main" val="0"/>
+              </a:ext>
+            </a:extLst>
+          </a:blip>
+          <a:stretch>
+            <a:fillRect/>
+          </a:stretch>
+        </p:blipFill>
+        <p:spPr>
+          <a:xfrm>
+            <a:off x="5935446" y="4248502"/>
+            <a:ext cx="5547841" cy="2217612"/>
+          </a:xfrm>
+          <a:prstGeom prst="rect">
+            <a:avLst/>
+          </a:prstGeom>
+        </p:spPr>
+      </p:pic>
+      <p:sp>
+        <p:nvSpPr>
+          <p:cNvPr id="8" name="TextBox 7">
+            <a:extLst>
+              <a:ext uri="{FF2B5EF4-FFF2-40B4-BE49-F238E27FC236}">
+                <a16:creationId xmlns:a16="http://schemas.microsoft.com/office/drawing/2014/main" id="{AFB58606-DFA7-4AA7-A4F7-93075ACF0F75}"/>
+              </a:ext>
+            </a:extLst>
+          </p:cNvPr>
+          <p:cNvSpPr txBox="1"/>
+          <p:nvPr/>
+        </p:nvSpPr>
+        <p:spPr>
+          <a:xfrm>
+            <a:off x="3569293" y="391886"/>
+            <a:ext cx="5281126" cy="646331"/>
+          </a:xfrm>
+          <a:prstGeom prst="rect">
+            <a:avLst/>
+          </a:prstGeom>
+          <a:noFill/>
+        </p:spPr>
+        <p:txBody>
+          <a:bodyPr wrap="none" rtlCol="0">
+            <a:spAutoFit/>
+          </a:bodyPr>
+          <a:lstStyle/>
+          <a:p>
+            <a:r>
+              <a:rPr lang="en-US" sz="3600" dirty="0"/>
+              <a:t>Pipe Thickness Calculations</a:t>
+            </a:r>
+          </a:p>
+        </p:txBody>
+      </p:sp>
+      <p:pic>
+        <p:nvPicPr>
+          <p:cNvPr id="10" name="Picture 9">
+            <a:extLst>
+              <a:ext uri="{FF2B5EF4-FFF2-40B4-BE49-F238E27FC236}">
+                <a16:creationId xmlns:a16="http://schemas.microsoft.com/office/drawing/2014/main" id="{D49865AA-288F-4843-9B82-6CE1C5CD503E}"/>
+              </a:ext>
+            </a:extLst>
+          </p:cNvPr>
+          <p:cNvPicPr>
+            <a:picLocks noChangeAspect="1"/>
+          </p:cNvPicPr>
+          <p:nvPr/>
+        </p:nvPicPr>
+        <p:blipFill>
+          <a:blip r:embed="rId4">
+            <a:extLst>
+              <a:ext uri="{28A0092B-C50C-407E-A947-70E740481C1C}">
+                <a14:useLocalDpi xmlns:a14="http://schemas.microsoft.com/office/drawing/2010/main" val="0"/>
+              </a:ext>
+            </a:extLst>
+          </a:blip>
+          <a:stretch>
+            <a:fillRect/>
+          </a:stretch>
+        </p:blipFill>
+        <p:spPr>
+          <a:xfrm>
+            <a:off x="5333415" y="1469291"/>
+            <a:ext cx="6751905" cy="2629128"/>
+          </a:xfrm>
+          <a:prstGeom prst="rect">
+            <a:avLst/>
+          </a:prstGeom>
+        </p:spPr>
+      </p:pic>
+    </p:spTree>
+    <p:extLst>
+      <p:ext uri="{BB962C8B-B14F-4D97-AF65-F5344CB8AC3E}">
+        <p14:creationId xmlns:p14="http://schemas.microsoft.com/office/powerpoint/2010/main" val="66255904"/>
+      </p:ext>
+    </p:extLst>
+  </p:cSld>
+  <p:clrMapOvr>
+    <a:masterClrMapping/>
+  </p:clrMapOvr>
+</p:sld>
+</file>
+
+<file path=ppt/slides/slide15.xml><?xml version="1.0" encoding="utf-8"?>
+<p:sld xmlns:a="http://schemas.openxmlformats.org/drawingml/2006/main" xmlns:r="http://schemas.openxmlformats.org/officeDocument/2006/relationships" xmlns:p="http://schemas.openxmlformats.org/presentationml/2006/main">
+  <p:cSld>
+    <p:spTree>
+      <p:nvGrpSpPr>
+        <p:cNvPr id="1" name=""/>
+        <p:cNvGrpSpPr/>
+        <p:nvPr/>
+      </p:nvGrpSpPr>
+      <p:grpSpPr>
+        <a:xfrm>
+          <a:off x="0" y="0"/>
+          <a:ext cx="0" cy="0"/>
+          <a:chOff x="0" y="0"/>
+          <a:chExt cx="0" cy="0"/>
+        </a:xfrm>
+      </p:grpSpPr>
       <p:sp>
         <p:nvSpPr>
           <p:cNvPr id="2" name="Title 1">
@@ -5129,7 +5290,7 @@
 </p:sld>
 </file>
 
-<file path=ppt/slides/slide15.xml><?xml version="1.0" encoding="utf-8"?>
+<file path=ppt/slides/slide16.xml><?xml version="1.0" encoding="utf-8"?>
 <p:sld xmlns:a="http://schemas.openxmlformats.org/drawingml/2006/main" xmlns:r="http://schemas.openxmlformats.org/officeDocument/2006/relationships" xmlns:p="http://schemas.openxmlformats.org/presentationml/2006/main">
   <p:cSld>
     <p:spTree>
@@ -5954,209 +6115,6 @@
 </p:sld>
 </file>
 
-<file path=ppt/slides/slide16.xml><?xml version="1.0" encoding="utf-8"?>
-<p:sld xmlns:a="http://schemas.openxmlformats.org/drawingml/2006/main" xmlns:r="http://schemas.openxmlformats.org/officeDocument/2006/relationships" xmlns:p="http://schemas.openxmlformats.org/presentationml/2006/main">
-  <p:cSld>
-    <p:spTree>
-      <p:nvGrpSpPr>
-        <p:cNvPr id="1" name=""/>
-        <p:cNvGrpSpPr/>
-        <p:nvPr/>
-      </p:nvGrpSpPr>
-      <p:grpSpPr>
-        <a:xfrm>
-          <a:off x="0" y="0"/>
-          <a:ext cx="0" cy="0"/>
-          <a:chOff x="0" y="0"/>
-          <a:chExt cx="0" cy="0"/>
-        </a:xfrm>
-      </p:grpSpPr>
-      <p:sp>
-        <p:nvSpPr>
-          <p:cNvPr id="2" name="Title 1">
-            <a:extLst>
-              <a:ext uri="{FF2B5EF4-FFF2-40B4-BE49-F238E27FC236}">
-                <a16:creationId xmlns:a16="http://schemas.microsoft.com/office/drawing/2014/main" id="{564562A0-1726-074A-962A-BCD7FC1A442A}"/>
-              </a:ext>
-            </a:extLst>
-          </p:cNvPr>
-          <p:cNvSpPr>
-            <a:spLocks noGrp="1"/>
-          </p:cNvSpPr>
-          <p:nvPr>
-            <p:ph type="title"/>
-          </p:nvPr>
-        </p:nvSpPr>
-        <p:spPr/>
-        <p:txBody>
-          <a:bodyPr/>
-          <a:lstStyle/>
-          <a:p>
-            <a:pPr algn="ctr"/>
-            <a:r>
-              <a:rPr lang="en-US" dirty="0"/>
-              <a:t>Calculations</a:t>
-            </a:r>
-          </a:p>
-        </p:txBody>
-      </p:sp>
-      <p:pic>
-        <p:nvPicPr>
-          <p:cNvPr id="9" name="Picture 8">
-            <a:extLst>
-              <a:ext uri="{FF2B5EF4-FFF2-40B4-BE49-F238E27FC236}">
-                <a16:creationId xmlns:a16="http://schemas.microsoft.com/office/drawing/2014/main" id="{6AA93FB2-32FA-4B46-AB0F-7B335AA222AF}"/>
-              </a:ext>
-            </a:extLst>
-          </p:cNvPr>
-          <p:cNvPicPr>
-            <a:picLocks noChangeAspect="1"/>
-          </p:cNvPicPr>
-          <p:nvPr/>
-        </p:nvPicPr>
-        <p:blipFill>
-          <a:blip r:embed="rId2">
-            <a:extLst>
-              <a:ext uri="{28A0092B-C50C-407E-A947-70E740481C1C}">
-                <a14:useLocalDpi xmlns:a14="http://schemas.microsoft.com/office/drawing/2010/main" val="0"/>
-              </a:ext>
-            </a:extLst>
-          </a:blip>
-          <a:stretch>
-            <a:fillRect/>
-          </a:stretch>
-        </p:blipFill>
-        <p:spPr>
-          <a:xfrm>
-            <a:off x="5611863" y="1257442"/>
-            <a:ext cx="5941436" cy="2249503"/>
-          </a:xfrm>
-          <a:prstGeom prst="rect">
-            <a:avLst/>
-          </a:prstGeom>
-        </p:spPr>
-      </p:pic>
-      <p:pic>
-        <p:nvPicPr>
-          <p:cNvPr id="13" name="Picture 12">
-            <a:extLst>
-              <a:ext uri="{FF2B5EF4-FFF2-40B4-BE49-F238E27FC236}">
-                <a16:creationId xmlns:a16="http://schemas.microsoft.com/office/drawing/2014/main" id="{B54FA688-BD4A-450E-B405-4222BAF91E58}"/>
-              </a:ext>
-            </a:extLst>
-          </p:cNvPr>
-          <p:cNvPicPr>
-            <a:picLocks noChangeAspect="1"/>
-          </p:cNvPicPr>
-          <p:nvPr/>
-        </p:nvPicPr>
-        <p:blipFill>
-          <a:blip r:embed="rId3">
-            <a:extLst>
-              <a:ext uri="{28A0092B-C50C-407E-A947-70E740481C1C}">
-                <a14:useLocalDpi xmlns:a14="http://schemas.microsoft.com/office/drawing/2010/main" val="0"/>
-              </a:ext>
-            </a:extLst>
-          </a:blip>
-          <a:stretch>
-            <a:fillRect/>
-          </a:stretch>
-        </p:blipFill>
-        <p:spPr>
-          <a:xfrm>
-            <a:off x="352337" y="3907376"/>
-            <a:ext cx="6487705" cy="2324493"/>
-          </a:xfrm>
-          <a:prstGeom prst="rect">
-            <a:avLst/>
-          </a:prstGeom>
-        </p:spPr>
-      </p:pic>
-      <p:pic>
-        <p:nvPicPr>
-          <p:cNvPr id="15" name="Picture 14">
-            <a:extLst>
-              <a:ext uri="{FF2B5EF4-FFF2-40B4-BE49-F238E27FC236}">
-                <a16:creationId xmlns:a16="http://schemas.microsoft.com/office/drawing/2014/main" id="{9F7F8456-59A6-413F-9E8B-9A7EE5AD0FDC}"/>
-              </a:ext>
-            </a:extLst>
-          </p:cNvPr>
-          <p:cNvPicPr>
-            <a:picLocks noChangeAspect="1"/>
-          </p:cNvPicPr>
-          <p:nvPr/>
-        </p:nvPicPr>
-        <p:blipFill>
-          <a:blip r:embed="rId4">
-            <a:extLst>
-              <a:ext uri="{28A0092B-C50C-407E-A947-70E740481C1C}">
-                <a14:useLocalDpi xmlns:a14="http://schemas.microsoft.com/office/drawing/2010/main" val="0"/>
-              </a:ext>
-            </a:extLst>
-          </a:blip>
-          <a:stretch>
-            <a:fillRect/>
-          </a:stretch>
-        </p:blipFill>
-        <p:spPr>
-          <a:xfrm>
-            <a:off x="6840042" y="3747236"/>
-            <a:ext cx="4338247" cy="2484633"/>
-          </a:xfrm>
-          <a:prstGeom prst="rect">
-            <a:avLst/>
-          </a:prstGeom>
-        </p:spPr>
-      </p:pic>
-      <p:pic>
-        <p:nvPicPr>
-          <p:cNvPr id="19" name="Picture 18">
-            <a:extLst>
-              <a:ext uri="{FF2B5EF4-FFF2-40B4-BE49-F238E27FC236}">
-                <a16:creationId xmlns:a16="http://schemas.microsoft.com/office/drawing/2014/main" id="{A3859470-571E-4C64-800B-0140E89CF0CD}"/>
-              </a:ext>
-            </a:extLst>
-          </p:cNvPr>
-          <p:cNvPicPr>
-            <a:picLocks noChangeAspect="1"/>
-          </p:cNvPicPr>
-          <p:nvPr/>
-        </p:nvPicPr>
-        <p:blipFill>
-          <a:blip r:embed="rId5">
-            <a:extLst>
-              <a:ext uri="{28A0092B-C50C-407E-A947-70E740481C1C}">
-                <a14:useLocalDpi xmlns:a14="http://schemas.microsoft.com/office/drawing/2010/main" val="0"/>
-              </a:ext>
-            </a:extLst>
-          </a:blip>
-          <a:stretch>
-            <a:fillRect/>
-          </a:stretch>
-        </p:blipFill>
-        <p:spPr>
-          <a:xfrm>
-            <a:off x="1290286" y="851686"/>
-            <a:ext cx="4122078" cy="2784595"/>
-          </a:xfrm>
-          <a:prstGeom prst="rect">
-            <a:avLst/>
-          </a:prstGeom>
-        </p:spPr>
-      </p:pic>
-    </p:spTree>
-    <p:extLst>
-      <p:ext uri="{BB962C8B-B14F-4D97-AF65-F5344CB8AC3E}">
-        <p14:creationId xmlns:p14="http://schemas.microsoft.com/office/powerpoint/2010/main" val="689369372"/>
-      </p:ext>
-    </p:extLst>
-  </p:cSld>
-  <p:clrMapOvr>
-    <a:masterClrMapping/>
-  </p:clrMapOvr>
-</p:sld>
-</file>
-
 <file path=ppt/slides/slide17.xml><?xml version="1.0" encoding="utf-8"?>
 <p:sld xmlns:a="http://schemas.openxmlformats.org/drawingml/2006/main" xmlns:r="http://schemas.openxmlformats.org/officeDocument/2006/relationships" xmlns:p="http://schemas.openxmlformats.org/presentationml/2006/main">
   <p:cSld>
@@ -6179,7 +6137,7 @@
           <p:cNvPr id="2" name="Title 1">
             <a:extLst>
               <a:ext uri="{FF2B5EF4-FFF2-40B4-BE49-F238E27FC236}">
-                <a16:creationId xmlns:a16="http://schemas.microsoft.com/office/drawing/2014/main" id="{D06A9ED8-DD87-2140-BEC3-643896B25143}"/>
+                <a16:creationId xmlns:a16="http://schemas.microsoft.com/office/drawing/2014/main" id="{564562A0-1726-074A-962A-BCD7FC1A442A}"/>
               </a:ext>
             </a:extLst>
           </p:cNvPr>
@@ -6198,17 +6156,17 @@
             <a:pPr algn="ctr"/>
             <a:r>
               <a:rPr lang="en-US" dirty="0"/>
-              <a:t>Zero-Based Execution</a:t>
+              <a:t>Calculations</a:t>
             </a:r>
           </a:p>
         </p:txBody>
       </p:sp>
       <p:pic>
         <p:nvPicPr>
-          <p:cNvPr id="6" name="Picture 5">
-            <a:extLst>
-              <a:ext uri="{FF2B5EF4-FFF2-40B4-BE49-F238E27FC236}">
-                <a16:creationId xmlns:a16="http://schemas.microsoft.com/office/drawing/2014/main" id="{089BB6C8-7134-4777-BA60-359C97A8BDF1}"/>
+          <p:cNvPr id="9" name="Picture 8">
+            <a:extLst>
+              <a:ext uri="{FF2B5EF4-FFF2-40B4-BE49-F238E27FC236}">
+                <a16:creationId xmlns:a16="http://schemas.microsoft.com/office/drawing/2014/main" id="{6AA93FB2-32FA-4B46-AB0F-7B335AA222AF}"/>
               </a:ext>
             </a:extLst>
           </p:cNvPr>
@@ -6231,8 +6189,8 @@
         </p:blipFill>
         <p:spPr>
           <a:xfrm>
-            <a:off x="6916169" y="3609061"/>
-            <a:ext cx="4180440" cy="2883814"/>
+            <a:off x="5611863" y="1257442"/>
+            <a:ext cx="5941436" cy="2249503"/>
           </a:xfrm>
           <a:prstGeom prst="rect">
             <a:avLst/>
@@ -6241,10 +6199,10 @@
       </p:pic>
       <p:pic>
         <p:nvPicPr>
-          <p:cNvPr id="7" name="Picture 6">
-            <a:extLst>
-              <a:ext uri="{FF2B5EF4-FFF2-40B4-BE49-F238E27FC236}">
-                <a16:creationId xmlns:a16="http://schemas.microsoft.com/office/drawing/2014/main" id="{5B7FDE87-0F94-4F91-AFA4-DAA7709B068B}"/>
+          <p:cNvPr id="13" name="Picture 12">
+            <a:extLst>
+              <a:ext uri="{FF2B5EF4-FFF2-40B4-BE49-F238E27FC236}">
+                <a16:creationId xmlns:a16="http://schemas.microsoft.com/office/drawing/2014/main" id="{B54FA688-BD4A-450E-B405-4222BAF91E58}"/>
               </a:ext>
             </a:extLst>
           </p:cNvPr>
@@ -6267,8 +6225,8 @@
         </p:blipFill>
         <p:spPr>
           <a:xfrm>
-            <a:off x="707650" y="4551130"/>
-            <a:ext cx="4749886" cy="1941745"/>
+            <a:off x="352337" y="3907376"/>
+            <a:ext cx="6487705" cy="2324493"/>
           </a:xfrm>
           <a:prstGeom prst="rect">
             <a:avLst/>
@@ -6277,10 +6235,10 @@
       </p:pic>
       <p:pic>
         <p:nvPicPr>
-          <p:cNvPr id="8" name="Picture 7">
-            <a:extLst>
-              <a:ext uri="{FF2B5EF4-FFF2-40B4-BE49-F238E27FC236}">
-                <a16:creationId xmlns:a16="http://schemas.microsoft.com/office/drawing/2014/main" id="{417E6C1D-EA7C-4714-9657-8E0E0B141F0C}"/>
+          <p:cNvPr id="15" name="Picture 14">
+            <a:extLst>
+              <a:ext uri="{FF2B5EF4-FFF2-40B4-BE49-F238E27FC236}">
+                <a16:creationId xmlns:a16="http://schemas.microsoft.com/office/drawing/2014/main" id="{9F7F8456-59A6-413F-9E8B-9A7EE5AD0FDC}"/>
               </a:ext>
             </a:extLst>
           </p:cNvPr>
@@ -6303,8 +6261,44 @@
         </p:blipFill>
         <p:spPr>
           <a:xfrm>
-            <a:off x="707650" y="1371854"/>
-            <a:ext cx="8114950" cy="3090965"/>
+            <a:off x="6840042" y="3747236"/>
+            <a:ext cx="4338247" cy="2484633"/>
+          </a:xfrm>
+          <a:prstGeom prst="rect">
+            <a:avLst/>
+          </a:prstGeom>
+        </p:spPr>
+      </p:pic>
+      <p:pic>
+        <p:nvPicPr>
+          <p:cNvPr id="19" name="Picture 18">
+            <a:extLst>
+              <a:ext uri="{FF2B5EF4-FFF2-40B4-BE49-F238E27FC236}">
+                <a16:creationId xmlns:a16="http://schemas.microsoft.com/office/drawing/2014/main" id="{A3859470-571E-4C64-800B-0140E89CF0CD}"/>
+              </a:ext>
+            </a:extLst>
+          </p:cNvPr>
+          <p:cNvPicPr>
+            <a:picLocks noChangeAspect="1"/>
+          </p:cNvPicPr>
+          <p:nvPr/>
+        </p:nvPicPr>
+        <p:blipFill>
+          <a:blip r:embed="rId5">
+            <a:extLst>
+              <a:ext uri="{28A0092B-C50C-407E-A947-70E740481C1C}">
+                <a14:useLocalDpi xmlns:a14="http://schemas.microsoft.com/office/drawing/2010/main" val="0"/>
+              </a:ext>
+            </a:extLst>
+          </a:blip>
+          <a:stretch>
+            <a:fillRect/>
+          </a:stretch>
+        </p:blipFill>
+        <p:spPr>
+          <a:xfrm>
+            <a:off x="1290286" y="851686"/>
+            <a:ext cx="4122078" cy="2784595"/>
           </a:xfrm>
           <a:prstGeom prst="rect">
             <a:avLst/>
@@ -6314,7 +6308,7 @@
     </p:spTree>
     <p:extLst>
       <p:ext uri="{BB962C8B-B14F-4D97-AF65-F5344CB8AC3E}">
-        <p14:creationId xmlns:p14="http://schemas.microsoft.com/office/powerpoint/2010/main" val="2246614268"/>
+        <p14:creationId xmlns:p14="http://schemas.microsoft.com/office/powerpoint/2010/main" val="689369372"/>
       </p:ext>
     </p:extLst>
   </p:cSld>
@@ -6346,7 +6340,7 @@
           <p:cNvPr id="2" name="Title 1">
             <a:extLst>
               <a:ext uri="{FF2B5EF4-FFF2-40B4-BE49-F238E27FC236}">
-                <a16:creationId xmlns:a16="http://schemas.microsoft.com/office/drawing/2014/main" id="{681DED21-DF87-624A-9DFC-CF2538DE2303}"/>
+                <a16:creationId xmlns:a16="http://schemas.microsoft.com/office/drawing/2014/main" id="{D06A9ED8-DD87-2140-BEC3-643896B25143}"/>
               </a:ext>
             </a:extLst>
           </p:cNvPr>
@@ -6365,17 +6359,17 @@
             <a:pPr algn="ctr"/>
             <a:r>
               <a:rPr lang="en-US" dirty="0"/>
-              <a:t>Constructability</a:t>
+              <a:t>Zero-Based Execution</a:t>
             </a:r>
           </a:p>
         </p:txBody>
       </p:sp>
       <p:pic>
         <p:nvPicPr>
-          <p:cNvPr id="7" name="Picture 6">
-            <a:extLst>
-              <a:ext uri="{FF2B5EF4-FFF2-40B4-BE49-F238E27FC236}">
-                <a16:creationId xmlns:a16="http://schemas.microsoft.com/office/drawing/2014/main" id="{8B3D23B4-512A-4022-919A-3AD8994A7E52}"/>
+          <p:cNvPr id="6" name="Picture 5">
+            <a:extLst>
+              <a:ext uri="{FF2B5EF4-FFF2-40B4-BE49-F238E27FC236}">
+                <a16:creationId xmlns:a16="http://schemas.microsoft.com/office/drawing/2014/main" id="{089BB6C8-7134-4777-BA60-359C97A8BDF1}"/>
               </a:ext>
             </a:extLst>
           </p:cNvPr>
@@ -6398,8 +6392,80 @@
         </p:blipFill>
         <p:spPr>
           <a:xfrm>
-            <a:off x="1542063" y="1690688"/>
-            <a:ext cx="9107873" cy="4844979"/>
+            <a:off x="6916169" y="3609061"/>
+            <a:ext cx="4180440" cy="2883814"/>
+          </a:xfrm>
+          <a:prstGeom prst="rect">
+            <a:avLst/>
+          </a:prstGeom>
+        </p:spPr>
+      </p:pic>
+      <p:pic>
+        <p:nvPicPr>
+          <p:cNvPr id="7" name="Picture 6">
+            <a:extLst>
+              <a:ext uri="{FF2B5EF4-FFF2-40B4-BE49-F238E27FC236}">
+                <a16:creationId xmlns:a16="http://schemas.microsoft.com/office/drawing/2014/main" id="{5B7FDE87-0F94-4F91-AFA4-DAA7709B068B}"/>
+              </a:ext>
+            </a:extLst>
+          </p:cNvPr>
+          <p:cNvPicPr>
+            <a:picLocks noChangeAspect="1"/>
+          </p:cNvPicPr>
+          <p:nvPr/>
+        </p:nvPicPr>
+        <p:blipFill>
+          <a:blip r:embed="rId3">
+            <a:extLst>
+              <a:ext uri="{28A0092B-C50C-407E-A947-70E740481C1C}">
+                <a14:useLocalDpi xmlns:a14="http://schemas.microsoft.com/office/drawing/2010/main" val="0"/>
+              </a:ext>
+            </a:extLst>
+          </a:blip>
+          <a:stretch>
+            <a:fillRect/>
+          </a:stretch>
+        </p:blipFill>
+        <p:spPr>
+          <a:xfrm>
+            <a:off x="707650" y="4551130"/>
+            <a:ext cx="4749886" cy="1941745"/>
+          </a:xfrm>
+          <a:prstGeom prst="rect">
+            <a:avLst/>
+          </a:prstGeom>
+        </p:spPr>
+      </p:pic>
+      <p:pic>
+        <p:nvPicPr>
+          <p:cNvPr id="8" name="Picture 7">
+            <a:extLst>
+              <a:ext uri="{FF2B5EF4-FFF2-40B4-BE49-F238E27FC236}">
+                <a16:creationId xmlns:a16="http://schemas.microsoft.com/office/drawing/2014/main" id="{417E6C1D-EA7C-4714-9657-8E0E0B141F0C}"/>
+              </a:ext>
+            </a:extLst>
+          </p:cNvPr>
+          <p:cNvPicPr>
+            <a:picLocks noChangeAspect="1"/>
+          </p:cNvPicPr>
+          <p:nvPr/>
+        </p:nvPicPr>
+        <p:blipFill>
+          <a:blip r:embed="rId4">
+            <a:extLst>
+              <a:ext uri="{28A0092B-C50C-407E-A947-70E740481C1C}">
+                <a14:useLocalDpi xmlns:a14="http://schemas.microsoft.com/office/drawing/2010/main" val="0"/>
+              </a:ext>
+            </a:extLst>
+          </a:blip>
+          <a:stretch>
+            <a:fillRect/>
+          </a:stretch>
+        </p:blipFill>
+        <p:spPr>
+          <a:xfrm>
+            <a:off x="707650" y="1371854"/>
+            <a:ext cx="8114950" cy="3090965"/>
           </a:xfrm>
           <a:prstGeom prst="rect">
             <a:avLst/>
@@ -6409,7 +6475,7 @@
     </p:spTree>
     <p:extLst>
       <p:ext uri="{BB962C8B-B14F-4D97-AF65-F5344CB8AC3E}">
-        <p14:creationId xmlns:p14="http://schemas.microsoft.com/office/powerpoint/2010/main" val="1544625445"/>
+        <p14:creationId xmlns:p14="http://schemas.microsoft.com/office/powerpoint/2010/main" val="2246614268"/>
       </p:ext>
     </p:extLst>
   </p:cSld>
@@ -6441,7 +6507,7 @@
           <p:cNvPr id="2" name="Title 1">
             <a:extLst>
               <a:ext uri="{FF2B5EF4-FFF2-40B4-BE49-F238E27FC236}">
-                <a16:creationId xmlns:a16="http://schemas.microsoft.com/office/drawing/2014/main" id="{049EC63C-A197-4252-85E7-993DB794C757}"/>
+                <a16:creationId xmlns:a16="http://schemas.microsoft.com/office/drawing/2014/main" id="{681DED21-DF87-624A-9DFC-CF2538DE2303}"/>
               </a:ext>
             </a:extLst>
           </p:cNvPr>
@@ -6452,12 +6518,7 @@
             <p:ph type="title"/>
           </p:nvPr>
         </p:nvSpPr>
-        <p:spPr>
-          <a:xfrm>
-            <a:off x="838200" y="365125"/>
-            <a:ext cx="10515600" cy="978645"/>
-          </a:xfrm>
-        </p:spPr>
+        <p:spPr/>
         <p:txBody>
           <a:bodyPr/>
           <a:lstStyle/>
@@ -6465,40 +6526,51 @@
             <a:pPr algn="ctr"/>
             <a:r>
               <a:rPr lang="en-US" dirty="0"/>
-              <a:t>Innovation Concept (continued)</a:t>
-            </a:r>
-          </a:p>
-        </p:txBody>
-      </p:sp>
-      <p:sp>
-        <p:nvSpPr>
-          <p:cNvPr id="3" name="Content Placeholder 2">
-            <a:extLst>
-              <a:ext uri="{FF2B5EF4-FFF2-40B4-BE49-F238E27FC236}">
-                <a16:creationId xmlns:a16="http://schemas.microsoft.com/office/drawing/2014/main" id="{7F6AA9CD-BC5B-4207-B49F-254E11F34AA5}"/>
-              </a:ext>
-            </a:extLst>
-          </p:cNvPr>
-          <p:cNvSpPr>
-            <a:spLocks noGrp="1"/>
-          </p:cNvSpPr>
-          <p:nvPr>
-            <p:ph idx="1"/>
-          </p:nvPr>
-        </p:nvSpPr>
-        <p:spPr/>
-        <p:txBody>
-          <a:bodyPr/>
-          <a:lstStyle/>
-          <a:p>
-            <a:endParaRPr lang="en-US"/>
-          </a:p>
-        </p:txBody>
-      </p:sp>
+              <a:t>Constructability</a:t>
+            </a:r>
+          </a:p>
+        </p:txBody>
+      </p:sp>
+      <p:pic>
+        <p:nvPicPr>
+          <p:cNvPr id="7" name="Picture 6">
+            <a:extLst>
+              <a:ext uri="{FF2B5EF4-FFF2-40B4-BE49-F238E27FC236}">
+                <a16:creationId xmlns:a16="http://schemas.microsoft.com/office/drawing/2014/main" id="{8B3D23B4-512A-4022-919A-3AD8994A7E52}"/>
+              </a:ext>
+            </a:extLst>
+          </p:cNvPr>
+          <p:cNvPicPr>
+            <a:picLocks noChangeAspect="1"/>
+          </p:cNvPicPr>
+          <p:nvPr/>
+        </p:nvPicPr>
+        <p:blipFill>
+          <a:blip r:embed="rId2">
+            <a:extLst>
+              <a:ext uri="{28A0092B-C50C-407E-A947-70E740481C1C}">
+                <a14:useLocalDpi xmlns:a14="http://schemas.microsoft.com/office/drawing/2010/main" val="0"/>
+              </a:ext>
+            </a:extLst>
+          </a:blip>
+          <a:stretch>
+            <a:fillRect/>
+          </a:stretch>
+        </p:blipFill>
+        <p:spPr>
+          <a:xfrm>
+            <a:off x="1542063" y="1690688"/>
+            <a:ext cx="9107873" cy="4844979"/>
+          </a:xfrm>
+          <a:prstGeom prst="rect">
+            <a:avLst/>
+          </a:prstGeom>
+        </p:spPr>
+      </p:pic>
     </p:spTree>
     <p:extLst>
       <p:ext uri="{BB962C8B-B14F-4D97-AF65-F5344CB8AC3E}">
-        <p14:creationId xmlns:p14="http://schemas.microsoft.com/office/powerpoint/2010/main" val="3831560297"/>
+        <p14:creationId xmlns:p14="http://schemas.microsoft.com/office/powerpoint/2010/main" val="1544625445"/>
       </p:ext>
     </p:extLst>
   </p:cSld>
@@ -7077,6 +7149,95 @@
 </p:sld>
 </file>
 
+<file path=ppt/slides/slide20.xml><?xml version="1.0" encoding="utf-8"?>
+<p:sld xmlns:a="http://schemas.openxmlformats.org/drawingml/2006/main" xmlns:r="http://schemas.openxmlformats.org/officeDocument/2006/relationships" xmlns:p="http://schemas.openxmlformats.org/presentationml/2006/main">
+  <p:cSld>
+    <p:spTree>
+      <p:nvGrpSpPr>
+        <p:cNvPr id="1" name=""/>
+        <p:cNvGrpSpPr/>
+        <p:nvPr/>
+      </p:nvGrpSpPr>
+      <p:grpSpPr>
+        <a:xfrm>
+          <a:off x="0" y="0"/>
+          <a:ext cx="0" cy="0"/>
+          <a:chOff x="0" y="0"/>
+          <a:chExt cx="0" cy="0"/>
+        </a:xfrm>
+      </p:grpSpPr>
+      <p:sp>
+        <p:nvSpPr>
+          <p:cNvPr id="2" name="Title 1">
+            <a:extLst>
+              <a:ext uri="{FF2B5EF4-FFF2-40B4-BE49-F238E27FC236}">
+                <a16:creationId xmlns:a16="http://schemas.microsoft.com/office/drawing/2014/main" id="{049EC63C-A197-4252-85E7-993DB794C757}"/>
+              </a:ext>
+            </a:extLst>
+          </p:cNvPr>
+          <p:cNvSpPr>
+            <a:spLocks noGrp="1"/>
+          </p:cNvSpPr>
+          <p:nvPr>
+            <p:ph type="title"/>
+          </p:nvPr>
+        </p:nvSpPr>
+        <p:spPr>
+          <a:xfrm>
+            <a:off x="838200" y="365125"/>
+            <a:ext cx="10515600" cy="978645"/>
+          </a:xfrm>
+        </p:spPr>
+        <p:txBody>
+          <a:bodyPr/>
+          <a:lstStyle/>
+          <a:p>
+            <a:pPr algn="ctr"/>
+            <a:r>
+              <a:rPr lang="en-US" dirty="0"/>
+              <a:t>Innovation Concept (continued)</a:t>
+            </a:r>
+          </a:p>
+        </p:txBody>
+      </p:sp>
+      <p:sp>
+        <p:nvSpPr>
+          <p:cNvPr id="3" name="Content Placeholder 2">
+            <a:extLst>
+              <a:ext uri="{FF2B5EF4-FFF2-40B4-BE49-F238E27FC236}">
+                <a16:creationId xmlns:a16="http://schemas.microsoft.com/office/drawing/2014/main" id="{7F6AA9CD-BC5B-4207-B49F-254E11F34AA5}"/>
+              </a:ext>
+            </a:extLst>
+          </p:cNvPr>
+          <p:cNvSpPr>
+            <a:spLocks noGrp="1"/>
+          </p:cNvSpPr>
+          <p:nvPr>
+            <p:ph idx="1"/>
+          </p:nvPr>
+        </p:nvSpPr>
+        <p:spPr/>
+        <p:txBody>
+          <a:bodyPr/>
+          <a:lstStyle/>
+          <a:p>
+            <a:endParaRPr lang="en-US"/>
+          </a:p>
+        </p:txBody>
+      </p:sp>
+    </p:spTree>
+    <p:extLst>
+      <p:ext uri="{BB962C8B-B14F-4D97-AF65-F5344CB8AC3E}">
+        <p14:creationId xmlns:p14="http://schemas.microsoft.com/office/powerpoint/2010/main" val="3831560297"/>
+      </p:ext>
+    </p:extLst>
+  </p:cSld>
+  <p:clrMapOvr>
+    <a:masterClrMapping/>
+  </p:clrMapOvr>
+</p:sld>
+</file>
+
 <file path=ppt/slides/slide3.xml><?xml version="1.0" encoding="utf-8"?>
 <p:sld xmlns:a="http://schemas.openxmlformats.org/drawingml/2006/main" xmlns:r="http://schemas.openxmlformats.org/officeDocument/2006/relationships" xmlns:p="http://schemas.openxmlformats.org/presentationml/2006/main">
   <p:cSld>
@@ -7128,12 +7289,949 @@
           </a:p>
         </p:txBody>
       </p:sp>
+      <p:pic>
+        <p:nvPicPr>
+          <p:cNvPr id="9" name="Picture 8">
+            <a:extLst>
+              <a:ext uri="{FF2B5EF4-FFF2-40B4-BE49-F238E27FC236}">
+                <a16:creationId xmlns:a16="http://schemas.microsoft.com/office/drawing/2014/main" id="{0C14285A-876F-4B62-9270-362186C19EA6}"/>
+              </a:ext>
+            </a:extLst>
+          </p:cNvPr>
+          <p:cNvPicPr>
+            <a:picLocks noChangeAspect="1"/>
+          </p:cNvPicPr>
+          <p:nvPr/>
+        </p:nvPicPr>
+        <p:blipFill rotWithShape="1">
+          <a:blip r:embed="rId3">
+            <a:extLst>
+              <a:ext uri="{28A0092B-C50C-407E-A947-70E740481C1C}">
+                <a14:useLocalDpi xmlns:a14="http://schemas.microsoft.com/office/drawing/2010/main" val="0"/>
+              </a:ext>
+            </a:extLst>
+          </a:blip>
+          <a:srcRect r="6760"/>
+          <a:stretch/>
+        </p:blipFill>
+        <p:spPr>
+          <a:xfrm>
+            <a:off x="6570617" y="1092517"/>
+            <a:ext cx="5621383" cy="2160134"/>
+          </a:xfrm>
+          <a:prstGeom prst="rect">
+            <a:avLst/>
+          </a:prstGeom>
+        </p:spPr>
+      </p:pic>
+      <p:pic>
+        <p:nvPicPr>
+          <p:cNvPr id="10" name="Picture 9">
+            <a:extLst>
+              <a:ext uri="{FF2B5EF4-FFF2-40B4-BE49-F238E27FC236}">
+                <a16:creationId xmlns:a16="http://schemas.microsoft.com/office/drawing/2014/main" id="{0CFBABE7-26EE-4180-B458-E6217CD6EECA}"/>
+              </a:ext>
+            </a:extLst>
+          </p:cNvPr>
+          <p:cNvPicPr>
+            <a:picLocks noChangeAspect="1"/>
+          </p:cNvPicPr>
+          <p:nvPr/>
+        </p:nvPicPr>
+        <p:blipFill>
+          <a:blip r:embed="rId4">
+            <a:extLst>
+              <a:ext uri="{28A0092B-C50C-407E-A947-70E740481C1C}">
+                <a14:useLocalDpi xmlns:a14="http://schemas.microsoft.com/office/drawing/2010/main" val="0"/>
+              </a:ext>
+            </a:extLst>
+          </a:blip>
+          <a:stretch>
+            <a:fillRect/>
+          </a:stretch>
+        </p:blipFill>
+        <p:spPr>
+          <a:xfrm>
+            <a:off x="7153550" y="3605350"/>
+            <a:ext cx="4338247" cy="2484633"/>
+          </a:xfrm>
+          <a:prstGeom prst="rect">
+            <a:avLst/>
+          </a:prstGeom>
+        </p:spPr>
+      </p:pic>
+    </p:spTree>
+    <p:extLst>
+      <p:ext uri="{BB962C8B-B14F-4D97-AF65-F5344CB8AC3E}">
+        <p14:creationId xmlns:p14="http://schemas.microsoft.com/office/powerpoint/2010/main" val="2140881363"/>
+      </p:ext>
+    </p:extLst>
+  </p:cSld>
+  <p:clrMapOvr>
+    <a:masterClrMapping/>
+  </p:clrMapOvr>
+</p:sld>
+</file>
+
+<file path=ppt/slides/slide4.xml><?xml version="1.0" encoding="utf-8"?>
+<p:sld xmlns:a="http://schemas.openxmlformats.org/drawingml/2006/main" xmlns:r="http://schemas.openxmlformats.org/officeDocument/2006/relationships" xmlns:p="http://schemas.openxmlformats.org/presentationml/2006/main">
+  <p:cSld>
+    <p:spTree>
+      <p:nvGrpSpPr>
+        <p:cNvPr id="1" name=""/>
+        <p:cNvGrpSpPr/>
+        <p:nvPr/>
+      </p:nvGrpSpPr>
+      <p:grpSpPr>
+        <a:xfrm>
+          <a:off x="0" y="0"/>
+          <a:ext cx="0" cy="0"/>
+          <a:chOff x="0" y="0"/>
+          <a:chExt cx="0" cy="0"/>
+        </a:xfrm>
+      </p:grpSpPr>
+      <p:sp>
+        <p:nvSpPr>
+          <p:cNvPr id="2" name="Title 1">
+            <a:extLst>
+              <a:ext uri="{FF2B5EF4-FFF2-40B4-BE49-F238E27FC236}">
+                <a16:creationId xmlns:a16="http://schemas.microsoft.com/office/drawing/2014/main" id="{D06A9ED8-DD87-2140-BEC3-643896B25143}"/>
+              </a:ext>
+            </a:extLst>
+          </p:cNvPr>
+          <p:cNvSpPr>
+            <a:spLocks noGrp="1"/>
+          </p:cNvSpPr>
+          <p:nvPr>
+            <p:ph type="title"/>
+          </p:nvPr>
+        </p:nvSpPr>
+        <p:spPr>
+          <a:xfrm>
+            <a:off x="838200" y="299812"/>
+            <a:ext cx="10515600" cy="719092"/>
+          </a:xfrm>
+        </p:spPr>
+        <p:txBody>
+          <a:bodyPr/>
+          <a:lstStyle/>
+          <a:p>
+            <a:pPr algn="ctr"/>
+            <a:r>
+              <a:rPr lang="en-US" dirty="0"/>
+              <a:t>Zero-Based Execution</a:t>
+            </a:r>
+          </a:p>
+        </p:txBody>
+      </p:sp>
+      <p:sp>
+        <p:nvSpPr>
+          <p:cNvPr id="10" name="Oval 9">
+            <a:extLst>
+              <a:ext uri="{FF2B5EF4-FFF2-40B4-BE49-F238E27FC236}">
+                <a16:creationId xmlns:a16="http://schemas.microsoft.com/office/drawing/2014/main" id="{0FA39828-BF15-470C-991C-CF7D74E7631F}"/>
+              </a:ext>
+            </a:extLst>
+          </p:cNvPr>
+          <p:cNvSpPr/>
+          <p:nvPr/>
+        </p:nvSpPr>
+        <p:spPr>
+          <a:xfrm>
+            <a:off x="9562012" y="2142308"/>
+            <a:ext cx="627017" cy="953589"/>
+          </a:xfrm>
+          <a:prstGeom prst="ellipse">
+            <a:avLst/>
+          </a:prstGeom>
+          <a:noFill/>
+          <a:ln>
+            <a:solidFill>
+              <a:schemeClr val="tx1"/>
+            </a:solidFill>
+          </a:ln>
+        </p:spPr>
+        <p:style>
+          <a:lnRef idx="2">
+            <a:schemeClr val="accent1">
+              <a:shade val="50000"/>
+            </a:schemeClr>
+          </a:lnRef>
+          <a:fillRef idx="1">
+            <a:schemeClr val="accent1"/>
+          </a:fillRef>
+          <a:effectRef idx="0">
+            <a:schemeClr val="accent1"/>
+          </a:effectRef>
+          <a:fontRef idx="minor">
+            <a:schemeClr val="lt1"/>
+          </a:fontRef>
+        </p:style>
+        <p:txBody>
+          <a:bodyPr rtlCol="0" anchor="ctr"/>
+          <a:lstStyle/>
+          <a:p>
+            <a:pPr algn="ctr"/>
+            <a:endParaRPr lang="en-US"/>
+          </a:p>
+        </p:txBody>
+      </p:sp>
+      <p:sp>
+        <p:nvSpPr>
+          <p:cNvPr id="11" name="Oval 10">
+            <a:extLst>
+              <a:ext uri="{FF2B5EF4-FFF2-40B4-BE49-F238E27FC236}">
+                <a16:creationId xmlns:a16="http://schemas.microsoft.com/office/drawing/2014/main" id="{55ED2BCF-7CD1-4CDA-A1CA-6392A31D0741}"/>
+              </a:ext>
+            </a:extLst>
+          </p:cNvPr>
+          <p:cNvSpPr/>
+          <p:nvPr/>
+        </p:nvSpPr>
+        <p:spPr>
+          <a:xfrm>
+            <a:off x="9418320" y="1972491"/>
+            <a:ext cx="923109" cy="1275806"/>
+          </a:xfrm>
+          <a:prstGeom prst="ellipse">
+            <a:avLst/>
+          </a:prstGeom>
+          <a:noFill/>
+          <a:ln>
+            <a:solidFill>
+              <a:schemeClr val="tx1"/>
+            </a:solidFill>
+          </a:ln>
+        </p:spPr>
+        <p:style>
+          <a:lnRef idx="2">
+            <a:schemeClr val="accent1">
+              <a:shade val="50000"/>
+            </a:schemeClr>
+          </a:lnRef>
+          <a:fillRef idx="1">
+            <a:schemeClr val="accent1"/>
+          </a:fillRef>
+          <a:effectRef idx="0">
+            <a:schemeClr val="accent1"/>
+          </a:effectRef>
+          <a:fontRef idx="minor">
+            <a:schemeClr val="lt1"/>
+          </a:fontRef>
+        </p:style>
+        <p:txBody>
+          <a:bodyPr rtlCol="0" anchor="ctr"/>
+          <a:lstStyle/>
+          <a:p>
+            <a:pPr algn="ctr"/>
+            <a:endParaRPr lang="en-US"/>
+          </a:p>
+        </p:txBody>
+      </p:sp>
+      <p:cxnSp>
+        <p:nvCxnSpPr>
+          <p:cNvPr id="13" name="Straight Connector 12">
+            <a:extLst>
+              <a:ext uri="{FF2B5EF4-FFF2-40B4-BE49-F238E27FC236}">
+                <a16:creationId xmlns:a16="http://schemas.microsoft.com/office/drawing/2014/main" id="{71B7DB92-0E58-4740-B20B-96DC4505F9D6}"/>
+              </a:ext>
+            </a:extLst>
+          </p:cNvPr>
+          <p:cNvCxnSpPr>
+            <a:stCxn id="11" idx="0"/>
+          </p:cNvCxnSpPr>
+          <p:nvPr/>
+        </p:nvCxnSpPr>
+        <p:spPr>
+          <a:xfrm flipH="1" flipV="1">
+            <a:off x="8112034" y="1606883"/>
+            <a:ext cx="1767841" cy="365608"/>
+          </a:xfrm>
+          <a:prstGeom prst="line">
+            <a:avLst/>
+          </a:prstGeom>
+          <a:ln>
+            <a:solidFill>
+              <a:schemeClr val="tx1"/>
+            </a:solidFill>
+          </a:ln>
+        </p:spPr>
+        <p:style>
+          <a:lnRef idx="1">
+            <a:schemeClr val="accent1"/>
+          </a:lnRef>
+          <a:fillRef idx="0">
+            <a:schemeClr val="accent1"/>
+          </a:fillRef>
+          <a:effectRef idx="0">
+            <a:schemeClr val="accent1"/>
+          </a:effectRef>
+          <a:fontRef idx="minor">
+            <a:schemeClr val="tx1"/>
+          </a:fontRef>
+        </p:style>
+      </p:cxnSp>
+      <p:cxnSp>
+        <p:nvCxnSpPr>
+          <p:cNvPr id="14" name="Straight Connector 13">
+            <a:extLst>
+              <a:ext uri="{FF2B5EF4-FFF2-40B4-BE49-F238E27FC236}">
+                <a16:creationId xmlns:a16="http://schemas.microsoft.com/office/drawing/2014/main" id="{C0E3E0ED-5154-49C5-8844-14518C396B6C}"/>
+              </a:ext>
+            </a:extLst>
+          </p:cNvPr>
+          <p:cNvCxnSpPr/>
+          <p:nvPr/>
+        </p:nvCxnSpPr>
+        <p:spPr>
+          <a:xfrm flipH="1" flipV="1">
+            <a:off x="8020595" y="2882689"/>
+            <a:ext cx="1767841" cy="365608"/>
+          </a:xfrm>
+          <a:prstGeom prst="line">
+            <a:avLst/>
+          </a:prstGeom>
+          <a:ln>
+            <a:solidFill>
+              <a:schemeClr val="tx1"/>
+            </a:solidFill>
+          </a:ln>
+        </p:spPr>
+        <p:style>
+          <a:lnRef idx="1">
+            <a:schemeClr val="accent1"/>
+          </a:lnRef>
+          <a:fillRef idx="0">
+            <a:schemeClr val="accent1"/>
+          </a:fillRef>
+          <a:effectRef idx="0">
+            <a:schemeClr val="accent1"/>
+          </a:effectRef>
+          <a:fontRef idx="minor">
+            <a:schemeClr val="tx1"/>
+          </a:fontRef>
+        </p:style>
+      </p:cxnSp>
+      <p:cxnSp>
+        <p:nvCxnSpPr>
+          <p:cNvPr id="16" name="Straight Arrow Connector 15">
+            <a:extLst>
+              <a:ext uri="{FF2B5EF4-FFF2-40B4-BE49-F238E27FC236}">
+                <a16:creationId xmlns:a16="http://schemas.microsoft.com/office/drawing/2014/main" id="{8B4BCEB9-0004-4640-9A7C-A67EB496D90A}"/>
+              </a:ext>
+            </a:extLst>
+          </p:cNvPr>
+          <p:cNvCxnSpPr/>
+          <p:nvPr/>
+        </p:nvCxnSpPr>
+        <p:spPr>
+          <a:xfrm>
+            <a:off x="9875520" y="2610394"/>
+            <a:ext cx="1306286" cy="272295"/>
+          </a:xfrm>
+          <a:prstGeom prst="straightConnector1">
+            <a:avLst/>
+          </a:prstGeom>
+          <a:ln w="76200">
+            <a:tailEnd type="triangle"/>
+          </a:ln>
+        </p:spPr>
+        <p:style>
+          <a:lnRef idx="1">
+            <a:schemeClr val="accent1"/>
+          </a:lnRef>
+          <a:fillRef idx="0">
+            <a:schemeClr val="accent1"/>
+          </a:fillRef>
+          <a:effectRef idx="0">
+            <a:schemeClr val="accent1"/>
+          </a:effectRef>
+          <a:fontRef idx="minor">
+            <a:schemeClr val="tx1"/>
+          </a:fontRef>
+        </p:style>
+      </p:cxnSp>
+      <p:sp>
+        <p:nvSpPr>
+          <p:cNvPr id="17" name="Oval 16">
+            <a:extLst>
+              <a:ext uri="{FF2B5EF4-FFF2-40B4-BE49-F238E27FC236}">
+                <a16:creationId xmlns:a16="http://schemas.microsoft.com/office/drawing/2014/main" id="{9CCA9F8C-512B-45CF-9B80-0D138F612EE5}"/>
+              </a:ext>
+            </a:extLst>
+          </p:cNvPr>
+          <p:cNvSpPr/>
+          <p:nvPr/>
+        </p:nvSpPr>
+        <p:spPr>
+          <a:xfrm>
+            <a:off x="9599025" y="4976600"/>
+            <a:ext cx="418503" cy="501092"/>
+          </a:xfrm>
+          <a:prstGeom prst="ellipse">
+            <a:avLst/>
+          </a:prstGeom>
+          <a:noFill/>
+          <a:ln>
+            <a:solidFill>
+              <a:schemeClr val="tx1"/>
+            </a:solidFill>
+          </a:ln>
+        </p:spPr>
+        <p:style>
+          <a:lnRef idx="2">
+            <a:schemeClr val="accent1">
+              <a:shade val="50000"/>
+            </a:schemeClr>
+          </a:lnRef>
+          <a:fillRef idx="1">
+            <a:schemeClr val="accent1"/>
+          </a:fillRef>
+          <a:effectRef idx="0">
+            <a:schemeClr val="accent1"/>
+          </a:effectRef>
+          <a:fontRef idx="minor">
+            <a:schemeClr val="lt1"/>
+          </a:fontRef>
+        </p:style>
+        <p:txBody>
+          <a:bodyPr rtlCol="0" anchor="ctr"/>
+          <a:lstStyle/>
+          <a:p>
+            <a:pPr algn="ctr"/>
+            <a:endParaRPr lang="en-US"/>
+          </a:p>
+        </p:txBody>
+      </p:sp>
+      <p:sp>
+        <p:nvSpPr>
+          <p:cNvPr id="18" name="Oval 17">
+            <a:extLst>
+              <a:ext uri="{FF2B5EF4-FFF2-40B4-BE49-F238E27FC236}">
+                <a16:creationId xmlns:a16="http://schemas.microsoft.com/office/drawing/2014/main" id="{30A255D9-F3EC-46B0-A77E-B842D2C931C5}"/>
+              </a:ext>
+            </a:extLst>
+          </p:cNvPr>
+          <p:cNvSpPr/>
+          <p:nvPr/>
+        </p:nvSpPr>
+        <p:spPr>
+          <a:xfrm>
+            <a:off x="9480371" y="4898876"/>
+            <a:ext cx="616130" cy="670410"/>
+          </a:xfrm>
+          <a:prstGeom prst="ellipse">
+            <a:avLst/>
+          </a:prstGeom>
+          <a:noFill/>
+          <a:ln>
+            <a:solidFill>
+              <a:schemeClr val="tx1"/>
+            </a:solidFill>
+          </a:ln>
+        </p:spPr>
+        <p:style>
+          <a:lnRef idx="2">
+            <a:schemeClr val="accent1">
+              <a:shade val="50000"/>
+            </a:schemeClr>
+          </a:lnRef>
+          <a:fillRef idx="1">
+            <a:schemeClr val="accent1"/>
+          </a:fillRef>
+          <a:effectRef idx="0">
+            <a:schemeClr val="accent1"/>
+          </a:effectRef>
+          <a:fontRef idx="minor">
+            <a:schemeClr val="lt1"/>
+          </a:fontRef>
+        </p:style>
+        <p:txBody>
+          <a:bodyPr rtlCol="0" anchor="ctr"/>
+          <a:lstStyle/>
+          <a:p>
+            <a:pPr algn="ctr"/>
+            <a:endParaRPr lang="en-US"/>
+          </a:p>
+        </p:txBody>
+      </p:sp>
+      <p:cxnSp>
+        <p:nvCxnSpPr>
+          <p:cNvPr id="19" name="Straight Connector 18">
+            <a:extLst>
+              <a:ext uri="{FF2B5EF4-FFF2-40B4-BE49-F238E27FC236}">
+                <a16:creationId xmlns:a16="http://schemas.microsoft.com/office/drawing/2014/main" id="{CDBA8F9F-5217-4232-958E-46E3EFCEE4BB}"/>
+              </a:ext>
+            </a:extLst>
+          </p:cNvPr>
+          <p:cNvCxnSpPr>
+            <a:cxnSpLocks/>
+            <a:stCxn id="18" idx="0"/>
+          </p:cNvCxnSpPr>
+          <p:nvPr/>
+        </p:nvCxnSpPr>
+        <p:spPr>
+          <a:xfrm flipH="1" flipV="1">
+            <a:off x="7961815" y="4452236"/>
+            <a:ext cx="1826621" cy="446640"/>
+          </a:xfrm>
+          <a:prstGeom prst="line">
+            <a:avLst/>
+          </a:prstGeom>
+          <a:ln>
+            <a:solidFill>
+              <a:schemeClr val="tx1"/>
+            </a:solidFill>
+          </a:ln>
+        </p:spPr>
+        <p:style>
+          <a:lnRef idx="1">
+            <a:schemeClr val="accent1"/>
+          </a:lnRef>
+          <a:fillRef idx="0">
+            <a:schemeClr val="accent1"/>
+          </a:fillRef>
+          <a:effectRef idx="0">
+            <a:schemeClr val="accent1"/>
+          </a:effectRef>
+          <a:fontRef idx="minor">
+            <a:schemeClr val="tx1"/>
+          </a:fontRef>
+        </p:style>
+      </p:cxnSp>
+      <p:cxnSp>
+        <p:nvCxnSpPr>
+          <p:cNvPr id="20" name="Straight Connector 19">
+            <a:extLst>
+              <a:ext uri="{FF2B5EF4-FFF2-40B4-BE49-F238E27FC236}">
+                <a16:creationId xmlns:a16="http://schemas.microsoft.com/office/drawing/2014/main" id="{D599C2B7-0000-483F-8A94-166BBE32D30B}"/>
+              </a:ext>
+            </a:extLst>
+          </p:cNvPr>
+          <p:cNvCxnSpPr>
+            <a:cxnSpLocks/>
+          </p:cNvCxnSpPr>
+          <p:nvPr/>
+        </p:nvCxnSpPr>
+        <p:spPr>
+          <a:xfrm flipH="1" flipV="1">
+            <a:off x="7837173" y="5112082"/>
+            <a:ext cx="1921873" cy="443334"/>
+          </a:xfrm>
+          <a:prstGeom prst="line">
+            <a:avLst/>
+          </a:prstGeom>
+          <a:ln>
+            <a:solidFill>
+              <a:schemeClr val="tx1"/>
+            </a:solidFill>
+          </a:ln>
+        </p:spPr>
+        <p:style>
+          <a:lnRef idx="1">
+            <a:schemeClr val="accent1"/>
+          </a:lnRef>
+          <a:fillRef idx="0">
+            <a:schemeClr val="accent1"/>
+          </a:fillRef>
+          <a:effectRef idx="0">
+            <a:schemeClr val="accent1"/>
+          </a:effectRef>
+          <a:fontRef idx="minor">
+            <a:schemeClr val="tx1"/>
+          </a:fontRef>
+        </p:style>
+      </p:cxnSp>
+      <p:cxnSp>
+        <p:nvCxnSpPr>
+          <p:cNvPr id="24" name="Straight Arrow Connector 23">
+            <a:extLst>
+              <a:ext uri="{FF2B5EF4-FFF2-40B4-BE49-F238E27FC236}">
+                <a16:creationId xmlns:a16="http://schemas.microsoft.com/office/drawing/2014/main" id="{714ACDE2-4102-4FBA-AB89-BD37F16CAF80}"/>
+              </a:ext>
+            </a:extLst>
+          </p:cNvPr>
+          <p:cNvCxnSpPr/>
+          <p:nvPr/>
+        </p:nvCxnSpPr>
+        <p:spPr>
+          <a:xfrm>
+            <a:off x="9816984" y="5251194"/>
+            <a:ext cx="1306286" cy="272295"/>
+          </a:xfrm>
+          <a:prstGeom prst="straightConnector1">
+            <a:avLst/>
+          </a:prstGeom>
+          <a:ln w="76200">
+            <a:tailEnd type="triangle"/>
+          </a:ln>
+        </p:spPr>
+        <p:style>
+          <a:lnRef idx="1">
+            <a:schemeClr val="accent1"/>
+          </a:lnRef>
+          <a:fillRef idx="0">
+            <a:schemeClr val="accent1"/>
+          </a:fillRef>
+          <a:effectRef idx="0">
+            <a:schemeClr val="accent1"/>
+          </a:effectRef>
+          <a:fontRef idx="minor">
+            <a:schemeClr val="tx1"/>
+          </a:fontRef>
+        </p:style>
+      </p:cxnSp>
+      <p:sp>
+        <p:nvSpPr>
+          <p:cNvPr id="25" name="TextBox 24">
+            <a:extLst>
+              <a:ext uri="{FF2B5EF4-FFF2-40B4-BE49-F238E27FC236}">
+                <a16:creationId xmlns:a16="http://schemas.microsoft.com/office/drawing/2014/main" id="{CB9DF602-9EE2-4FCF-A175-368E6068274C}"/>
+              </a:ext>
+            </a:extLst>
+          </p:cNvPr>
+          <p:cNvSpPr txBox="1"/>
+          <p:nvPr/>
+        </p:nvSpPr>
+        <p:spPr>
+          <a:xfrm>
+            <a:off x="10711543" y="1972491"/>
+            <a:ext cx="1024639" cy="646331"/>
+          </a:xfrm>
+          <a:prstGeom prst="rect">
+            <a:avLst/>
+          </a:prstGeom>
+          <a:noFill/>
+        </p:spPr>
+        <p:txBody>
+          <a:bodyPr wrap="none" rtlCol="0">
+            <a:spAutoFit/>
+          </a:bodyPr>
+          <a:lstStyle/>
+          <a:p>
+            <a:r>
+              <a:rPr lang="en-US" sz="3600" dirty="0"/>
+              <a:t>A</a:t>
+            </a:r>
+            <a:r>
+              <a:rPr lang="en-US" sz="3600" baseline="-25000" dirty="0"/>
+              <a:t>1</a:t>
+            </a:r>
+            <a:r>
+              <a:rPr lang="en-US" sz="3600" dirty="0"/>
+              <a:t>V</a:t>
+            </a:r>
+            <a:r>
+              <a:rPr lang="en-US" sz="3600" baseline="-25000" dirty="0"/>
+              <a:t>1</a:t>
+            </a:r>
+            <a:endParaRPr lang="en-US" sz="3600" dirty="0"/>
+          </a:p>
+        </p:txBody>
+      </p:sp>
+      <p:sp>
+        <p:nvSpPr>
+          <p:cNvPr id="26" name="TextBox 25">
+            <a:extLst>
+              <a:ext uri="{FF2B5EF4-FFF2-40B4-BE49-F238E27FC236}">
+                <a16:creationId xmlns:a16="http://schemas.microsoft.com/office/drawing/2014/main" id="{6B272907-DFE0-4D26-AAC0-86DCA1C5B87C}"/>
+              </a:ext>
+            </a:extLst>
+          </p:cNvPr>
+          <p:cNvSpPr txBox="1"/>
+          <p:nvPr/>
+        </p:nvSpPr>
+        <p:spPr>
+          <a:xfrm>
+            <a:off x="10668888" y="4651748"/>
+            <a:ext cx="1024639" cy="646331"/>
+          </a:xfrm>
+          <a:prstGeom prst="rect">
+            <a:avLst/>
+          </a:prstGeom>
+          <a:noFill/>
+        </p:spPr>
+        <p:txBody>
+          <a:bodyPr wrap="none" rtlCol="0">
+            <a:spAutoFit/>
+          </a:bodyPr>
+          <a:lstStyle/>
+          <a:p>
+            <a:r>
+              <a:rPr lang="en-US" sz="3600" dirty="0"/>
+              <a:t>A</a:t>
+            </a:r>
+            <a:r>
+              <a:rPr lang="en-US" sz="3600" baseline="-25000" dirty="0"/>
+              <a:t>2</a:t>
+            </a:r>
+            <a:r>
+              <a:rPr lang="en-US" sz="3600" dirty="0"/>
+              <a:t>V</a:t>
+            </a:r>
+            <a:r>
+              <a:rPr lang="en-US" sz="3600" baseline="-25000" dirty="0"/>
+              <a:t>2</a:t>
+            </a:r>
+            <a:endParaRPr lang="en-US" sz="3600" dirty="0"/>
+          </a:p>
+        </p:txBody>
+      </p:sp>
+      <p:sp>
+        <p:nvSpPr>
+          <p:cNvPr id="27" name="TextBox 26">
+            <a:extLst>
+              <a:ext uri="{FF2B5EF4-FFF2-40B4-BE49-F238E27FC236}">
+                <a16:creationId xmlns:a16="http://schemas.microsoft.com/office/drawing/2014/main" id="{BF335F71-2BFB-4CCF-96F4-5BB0CCF9BCE8}"/>
+              </a:ext>
+            </a:extLst>
+          </p:cNvPr>
+          <p:cNvSpPr txBox="1"/>
+          <p:nvPr/>
+        </p:nvSpPr>
+        <p:spPr>
+          <a:xfrm>
+            <a:off x="9106711" y="3265714"/>
+            <a:ext cx="747320" cy="1446550"/>
+          </a:xfrm>
+          <a:prstGeom prst="rect">
+            <a:avLst/>
+          </a:prstGeom>
+          <a:noFill/>
+        </p:spPr>
+        <p:txBody>
+          <a:bodyPr wrap="none" rtlCol="0">
+            <a:spAutoFit/>
+          </a:bodyPr>
+          <a:lstStyle/>
+          <a:p>
+            <a:r>
+              <a:rPr lang="en-US" sz="8800" dirty="0"/>
+              <a:t>=</a:t>
+            </a:r>
+          </a:p>
+        </p:txBody>
+      </p:sp>
+    </p:spTree>
+    <p:extLst>
+      <p:ext uri="{BB962C8B-B14F-4D97-AF65-F5344CB8AC3E}">
+        <p14:creationId xmlns:p14="http://schemas.microsoft.com/office/powerpoint/2010/main" val="2064180662"/>
+      </p:ext>
+    </p:extLst>
+  </p:cSld>
+  <p:clrMapOvr>
+    <a:masterClrMapping/>
+  </p:clrMapOvr>
+</p:sld>
+</file>
+
+<file path=ppt/slides/slide5.xml><?xml version="1.0" encoding="utf-8"?>
+<p:sld xmlns:a="http://schemas.openxmlformats.org/drawingml/2006/main" xmlns:r="http://schemas.openxmlformats.org/officeDocument/2006/relationships" xmlns:p="http://schemas.openxmlformats.org/presentationml/2006/main">
+  <p:cSld>
+    <p:spTree>
+      <p:nvGrpSpPr>
+        <p:cNvPr id="1" name=""/>
+        <p:cNvGrpSpPr/>
+        <p:nvPr/>
+      </p:nvGrpSpPr>
+      <p:grpSpPr>
+        <a:xfrm>
+          <a:off x="0" y="0"/>
+          <a:ext cx="0" cy="0"/>
+          <a:chOff x="0" y="0"/>
+          <a:chExt cx="0" cy="0"/>
+        </a:xfrm>
+      </p:grpSpPr>
+      <p:pic>
+        <p:nvPicPr>
+          <p:cNvPr id="4" name="Picture 3">
+            <a:extLst>
+              <a:ext uri="{FF2B5EF4-FFF2-40B4-BE49-F238E27FC236}">
+                <a16:creationId xmlns:a16="http://schemas.microsoft.com/office/drawing/2014/main" id="{6DB30E48-36D0-443B-8041-D45CDBD7C38E}"/>
+              </a:ext>
+            </a:extLst>
+          </p:cNvPr>
+          <p:cNvPicPr>
+            <a:picLocks noChangeAspect="1"/>
+          </p:cNvPicPr>
+          <p:nvPr/>
+        </p:nvPicPr>
+        <p:blipFill>
+          <a:blip r:embed="rId2">
+            <a:extLst>
+              <a:ext uri="{28A0092B-C50C-407E-A947-70E740481C1C}">
+                <a14:useLocalDpi xmlns:a14="http://schemas.microsoft.com/office/drawing/2010/main" val="0"/>
+              </a:ext>
+            </a:extLst>
+          </a:blip>
+          <a:stretch>
+            <a:fillRect/>
+          </a:stretch>
+        </p:blipFill>
+        <p:spPr>
+          <a:xfrm>
+            <a:off x="-59941" y="1084217"/>
+            <a:ext cx="12311881" cy="4689566"/>
+          </a:xfrm>
+          <a:prstGeom prst="rect">
+            <a:avLst/>
+          </a:prstGeom>
+        </p:spPr>
+      </p:pic>
+    </p:spTree>
+    <p:extLst>
+      <p:ext uri="{BB962C8B-B14F-4D97-AF65-F5344CB8AC3E}">
+        <p14:creationId xmlns:p14="http://schemas.microsoft.com/office/powerpoint/2010/main" val="1367030958"/>
+      </p:ext>
+    </p:extLst>
+  </p:cSld>
+  <p:clrMapOvr>
+    <a:masterClrMapping/>
+  </p:clrMapOvr>
+</p:sld>
+</file>
+
+<file path=ppt/slides/slide6.xml><?xml version="1.0" encoding="utf-8"?>
+<p:sld xmlns:a="http://schemas.openxmlformats.org/drawingml/2006/main" xmlns:r="http://schemas.openxmlformats.org/officeDocument/2006/relationships" xmlns:p="http://schemas.openxmlformats.org/presentationml/2006/main">
+  <p:cSld>
+    <p:spTree>
+      <p:nvGrpSpPr>
+        <p:cNvPr id="1" name=""/>
+        <p:cNvGrpSpPr/>
+        <p:nvPr/>
+      </p:nvGrpSpPr>
+      <p:grpSpPr>
+        <a:xfrm>
+          <a:off x="0" y="0"/>
+          <a:ext cx="0" cy="0"/>
+          <a:chOff x="0" y="0"/>
+          <a:chExt cx="0" cy="0"/>
+        </a:xfrm>
+      </p:grpSpPr>
+      <p:sp>
+        <p:nvSpPr>
+          <p:cNvPr id="2" name="Title 1">
+            <a:extLst>
+              <a:ext uri="{FF2B5EF4-FFF2-40B4-BE49-F238E27FC236}">
+                <a16:creationId xmlns:a16="http://schemas.microsoft.com/office/drawing/2014/main" id="{B5A84D1F-120D-1F44-8907-5AD5A4F0ED55}"/>
+              </a:ext>
+            </a:extLst>
+          </p:cNvPr>
+          <p:cNvSpPr>
+            <a:spLocks noGrp="1"/>
+          </p:cNvSpPr>
+          <p:nvPr>
+            <p:ph type="title"/>
+          </p:nvPr>
+        </p:nvSpPr>
+        <p:spPr/>
+        <p:txBody>
+          <a:bodyPr/>
+          <a:lstStyle/>
+          <a:p>
+            <a:pPr algn="ctr"/>
+            <a:r>
+              <a:rPr lang="en-US" dirty="0"/>
+              <a:t>Modularization</a:t>
+            </a:r>
+          </a:p>
+        </p:txBody>
+      </p:sp>
+      <p:sp>
+        <p:nvSpPr>
+          <p:cNvPr id="3" name="Content Placeholder 2">
+            <a:extLst>
+              <a:ext uri="{FF2B5EF4-FFF2-40B4-BE49-F238E27FC236}">
+                <a16:creationId xmlns:a16="http://schemas.microsoft.com/office/drawing/2014/main" id="{7CB5C8AD-2517-984B-82E9-785FA47419CF}"/>
+              </a:ext>
+            </a:extLst>
+          </p:cNvPr>
+          <p:cNvSpPr>
+            <a:spLocks noGrp="1"/>
+          </p:cNvSpPr>
+          <p:nvPr>
+            <p:ph idx="1"/>
+          </p:nvPr>
+        </p:nvSpPr>
+        <p:spPr/>
+        <p:txBody>
+          <a:bodyPr/>
+          <a:lstStyle/>
+          <a:p>
+            <a:r>
+              <a:rPr lang="en-US" dirty="0"/>
+              <a:t>Modularization seems to reduce costs at the expense of increased risks</a:t>
+            </a:r>
+          </a:p>
+          <a:p>
+            <a:r>
+              <a:rPr lang="en-US" dirty="0"/>
+              <a:t>Modularized components can be built/repaired more easily in-field</a:t>
+            </a:r>
+          </a:p>
+          <a:p>
+            <a:r>
+              <a:rPr lang="en-US" dirty="0"/>
+              <a:t>This in-field maintenance introduces the risks of foreign object damage in sensitive areas</a:t>
+            </a:r>
+          </a:p>
+          <a:p>
+            <a:pPr lvl="1"/>
+            <a:r>
+              <a:rPr lang="en-US" dirty="0"/>
+              <a:t>This risk is compounded in very sandy areas, such as the project location</a:t>
+            </a:r>
+          </a:p>
+          <a:p>
+            <a:endParaRPr lang="en-US" dirty="0"/>
+          </a:p>
+          <a:p>
+            <a:pPr marL="0" indent="0">
+              <a:buNone/>
+            </a:pPr>
+            <a:r>
+              <a:rPr lang="en-US" b="1" dirty="0"/>
+              <a:t>Key Takeaway: risk/reward must be quantified before making a final decision on the benefits of modularization—not enough info on risk!</a:t>
+            </a:r>
+          </a:p>
+        </p:txBody>
+      </p:sp>
+    </p:spTree>
+    <p:extLst>
+      <p:ext uri="{BB962C8B-B14F-4D97-AF65-F5344CB8AC3E}">
+        <p14:creationId xmlns:p14="http://schemas.microsoft.com/office/powerpoint/2010/main" val="488885204"/>
+      </p:ext>
+    </p:extLst>
+  </p:cSld>
+  <p:clrMapOvr>
+    <a:masterClrMapping/>
+  </p:clrMapOvr>
+</p:sld>
+</file>
+
+<file path=ppt/slides/slide7.xml><?xml version="1.0" encoding="utf-8"?>
+<p:sld xmlns:a="http://schemas.openxmlformats.org/drawingml/2006/main" xmlns:r="http://schemas.openxmlformats.org/officeDocument/2006/relationships" xmlns:p="http://schemas.openxmlformats.org/presentationml/2006/main">
+  <p:cSld>
+    <p:spTree>
+      <p:nvGrpSpPr>
+        <p:cNvPr id="1" name=""/>
+        <p:cNvGrpSpPr/>
+        <p:nvPr/>
+      </p:nvGrpSpPr>
+      <p:grpSpPr>
+        <a:xfrm>
+          <a:off x="0" y="0"/>
+          <a:ext cx="0" cy="0"/>
+          <a:chOff x="0" y="0"/>
+          <a:chExt cx="0" cy="0"/>
+        </a:xfrm>
+      </p:grpSpPr>
       <p:graphicFrame>
         <p:nvGraphicFramePr>
-          <p:cNvPr id="7" name="Table 7">
-            <a:extLst>
-              <a:ext uri="{FF2B5EF4-FFF2-40B4-BE49-F238E27FC236}">
-                <a16:creationId xmlns:a16="http://schemas.microsoft.com/office/drawing/2014/main" id="{A6FA5922-AC87-43D2-894A-C148653352FE}"/>
+          <p:cNvPr id="5" name="Table 7">
+            <a:extLst>
+              <a:ext uri="{FF2B5EF4-FFF2-40B4-BE49-F238E27FC236}">
+                <a16:creationId xmlns:a16="http://schemas.microsoft.com/office/drawing/2014/main" id="{4CB1A464-81AD-8D4D-BCE6-BF0CCCD0B397}"/>
               </a:ext>
             </a:extLst>
           </p:cNvPr>
@@ -7143,13 +8241,424 @@
           <p:nvPr>
             <p:extLst>
               <p:ext uri="{D42A27DB-BD31-4B8C-83A1-F6EECF244321}">
-                <p14:modId xmlns:p14="http://schemas.microsoft.com/office/powerpoint/2010/main" val="1826306665"/>
+                <p14:modId xmlns:p14="http://schemas.microsoft.com/office/powerpoint/2010/main" val="540475464"/>
               </p:ext>
             </p:extLst>
           </p:nvPr>
         </p:nvGraphicFramePr>
         <p:xfrm>
-          <a:off x="168366" y="1627505"/>
+          <a:off x="5627188" y="3213766"/>
+          <a:ext cx="6564812" cy="3644234"/>
+        </p:xfrm>
+        <a:graphic>
+          <a:graphicData uri="http://schemas.openxmlformats.org/drawingml/2006/table">
+            <a:tbl>
+              <a:tblPr firstRow="1" bandRow="1">
+                <a:tableStyleId>{5C22544A-7EE6-4342-B048-85BDC9FD1C3A}</a:tableStyleId>
+              </a:tblPr>
+              <a:tblGrid>
+                <a:gridCol w="1307303">
+                  <a:extLst>
+                    <a:ext uri="{9D8B030D-6E8A-4147-A177-3AD203B41FA5}">
+                      <a16:colId xmlns:a16="http://schemas.microsoft.com/office/drawing/2014/main" val="1944432691"/>
+                    </a:ext>
+                  </a:extLst>
+                </a:gridCol>
+                <a:gridCol w="3716092">
+                  <a:extLst>
+                    <a:ext uri="{9D8B030D-6E8A-4147-A177-3AD203B41FA5}">
+                      <a16:colId xmlns:a16="http://schemas.microsoft.com/office/drawing/2014/main" val="1661844142"/>
+                    </a:ext>
+                  </a:extLst>
+                </a:gridCol>
+                <a:gridCol w="1541417">
+                  <a:extLst>
+                    <a:ext uri="{9D8B030D-6E8A-4147-A177-3AD203B41FA5}">
+                      <a16:colId xmlns:a16="http://schemas.microsoft.com/office/drawing/2014/main" val="1607563751"/>
+                    </a:ext>
+                  </a:extLst>
+                </a:gridCol>
+              </a:tblGrid>
+              <a:tr h="353945">
+                <a:tc>
+                  <a:txBody>
+                    <a:bodyPr/>
+                    <a:lstStyle/>
+                    <a:p>
+                      <a:endParaRPr lang="en-US" dirty="0"/>
+                    </a:p>
+                  </a:txBody>
+                  <a:tcPr/>
+                </a:tc>
+                <a:tc>
+                  <a:txBody>
+                    <a:bodyPr/>
+                    <a:lstStyle/>
+                    <a:p>
+                      <a:pPr algn="ctr">
+                        <a:lnSpc>
+                          <a:spcPct val="150000"/>
+                        </a:lnSpc>
+                      </a:pPr>
+                      <a:r>
+                        <a:rPr lang="en-US" dirty="0"/>
+                        <a:t>Solution</a:t>
+                      </a:r>
+                    </a:p>
+                  </a:txBody>
+                  <a:tcPr/>
+                </a:tc>
+                <a:tc>
+                  <a:txBody>
+                    <a:bodyPr/>
+                    <a:lstStyle/>
+                    <a:p>
+                      <a:pPr algn="r">
+                        <a:lnSpc>
+                          <a:spcPct val="150000"/>
+                        </a:lnSpc>
+                      </a:pPr>
+                      <a:r>
+                        <a:rPr lang="en-US" dirty="0"/>
+                        <a:t>Cost</a:t>
+                      </a:r>
+                    </a:p>
+                  </a:txBody>
+                  <a:tcPr/>
+                </a:tc>
+                <a:extLst>
+                  <a:ext uri="{0D108BD9-81ED-4DB2-BD59-A6C34878D82A}">
+                    <a16:rowId xmlns:a16="http://schemas.microsoft.com/office/drawing/2014/main" val="2769426632"/>
+                  </a:ext>
+                </a:extLst>
+              </a:tr>
+              <a:tr h="986652">
+                <a:tc>
+                  <a:txBody>
+                    <a:bodyPr/>
+                    <a:lstStyle/>
+                    <a:p>
+                      <a:pPr>
+                        <a:lnSpc>
+                          <a:spcPct val="150000"/>
+                        </a:lnSpc>
+                      </a:pPr>
+                      <a:r>
+                        <a:rPr lang="en-US" b="1" dirty="0"/>
+                        <a:t>Hydraulics &amp; Civil Design</a:t>
+                      </a:r>
+                    </a:p>
+                  </a:txBody>
+                  <a:tcPr/>
+                </a:tc>
+                <a:tc>
+                  <a:txBody>
+                    <a:bodyPr/>
+                    <a:lstStyle/>
+                    <a:p>
+                      <a:pPr marL="285750" indent="-285750">
+                        <a:lnSpc>
+                          <a:spcPct val="150000"/>
+                        </a:lnSpc>
+                        <a:buFont typeface="Arial" panose="020B0604020202020204" pitchFamily="34" charset="0"/>
+                        <a:buChar char="•"/>
+                      </a:pPr>
+                      <a:r>
+                        <a:rPr lang="en-US" dirty="0"/>
+                        <a:t>.25”, .375”, and .5” schedules</a:t>
+                      </a:r>
+                    </a:p>
+                    <a:p>
+                      <a:pPr marL="285750" indent="-285750">
+                        <a:lnSpc>
+                          <a:spcPct val="150000"/>
+                        </a:lnSpc>
+                        <a:buFont typeface="Arial" panose="020B0604020202020204" pitchFamily="34" charset="0"/>
+                        <a:buChar char="•"/>
+                      </a:pPr>
+                      <a:r>
+                        <a:rPr lang="en-US" dirty="0"/>
+                        <a:t>Pump F x 2</a:t>
+                      </a:r>
+                    </a:p>
+                    <a:p>
+                      <a:pPr marL="285750" indent="-285750">
+                        <a:lnSpc>
+                          <a:spcPct val="150000"/>
+                        </a:lnSpc>
+                        <a:buFont typeface="Arial" panose="020B0604020202020204" pitchFamily="34" charset="0"/>
+                        <a:buChar char="•"/>
+                      </a:pPr>
+                      <a:r>
+                        <a:rPr lang="en-US" dirty="0"/>
+                        <a:t>Junctions 9 and 11 pump locations</a:t>
+                      </a:r>
+                    </a:p>
+                  </a:txBody>
+                  <a:tcPr/>
+                </a:tc>
+                <a:tc>
+                  <a:txBody>
+                    <a:bodyPr/>
+                    <a:lstStyle/>
+                    <a:p>
+                      <a:pPr algn="r">
+                        <a:lnSpc>
+                          <a:spcPct val="200000"/>
+                        </a:lnSpc>
+                      </a:pPr>
+                      <a:endParaRPr lang="en-US" b="1" dirty="0"/>
+                    </a:p>
+                    <a:p>
+                      <a:pPr algn="r">
+                        <a:lnSpc>
+                          <a:spcPct val="250000"/>
+                        </a:lnSpc>
+                      </a:pPr>
+                      <a:r>
+                        <a:rPr lang="en-US" b="1" dirty="0"/>
+                        <a:t>$33,166,245</a:t>
+                      </a:r>
+                    </a:p>
+                  </a:txBody>
+                  <a:tcPr/>
+                </a:tc>
+                <a:extLst>
+                  <a:ext uri="{0D108BD9-81ED-4DB2-BD59-A6C34878D82A}">
+                    <a16:rowId xmlns:a16="http://schemas.microsoft.com/office/drawing/2014/main" val="1276461503"/>
+                  </a:ext>
+                </a:extLst>
+              </a:tr>
+              <a:tr h="913910">
+                <a:tc>
+                  <a:txBody>
+                    <a:bodyPr/>
+                    <a:lstStyle/>
+                    <a:p>
+                      <a:pPr>
+                        <a:lnSpc>
+                          <a:spcPct val="150000"/>
+                        </a:lnSpc>
+                      </a:pPr>
+                      <a:r>
+                        <a:rPr lang="en-US" b="1" dirty="0"/>
+                        <a:t>Equipment</a:t>
+                      </a:r>
+                    </a:p>
+                  </a:txBody>
+                  <a:tcPr/>
+                </a:tc>
+                <a:tc>
+                  <a:txBody>
+                    <a:bodyPr/>
+                    <a:lstStyle/>
+                    <a:p>
+                      <a:pPr marL="285750" indent="-285750">
+                        <a:buFont typeface="Arial" panose="020B0604020202020204" pitchFamily="34" charset="0"/>
+                        <a:buChar char="•"/>
+                      </a:pPr>
+                      <a:r>
+                        <a:rPr lang="en-US" dirty="0"/>
+                        <a:t>12 track-hoe-days</a:t>
+                      </a:r>
+                    </a:p>
+                    <a:p>
+                      <a:pPr marL="285750" indent="-285750">
+                        <a:buFont typeface="Arial" panose="020B0604020202020204" pitchFamily="34" charset="0"/>
+                        <a:buChar char="•"/>
+                      </a:pPr>
+                      <a:r>
+                        <a:rPr lang="en-US" dirty="0"/>
+                        <a:t>6 dump-truck-days</a:t>
+                      </a:r>
+                    </a:p>
+                    <a:p>
+                      <a:pPr marL="285750" indent="-285750">
+                        <a:buFont typeface="Arial" panose="020B0604020202020204" pitchFamily="34" charset="0"/>
+                        <a:buChar char="•"/>
+                      </a:pPr>
+                      <a:r>
+                        <a:rPr lang="en-US" dirty="0"/>
+                        <a:t>1 crane-day</a:t>
+                      </a:r>
+                    </a:p>
+                    <a:p>
+                      <a:pPr marL="285750" indent="-285750">
+                        <a:buFont typeface="Arial" panose="020B0604020202020204" pitchFamily="34" charset="0"/>
+                        <a:buChar char="•"/>
+                      </a:pPr>
+                      <a:r>
+                        <a:rPr lang="en-US" dirty="0"/>
+                        <a:t>4 concrete-truck-days</a:t>
+                      </a:r>
+                    </a:p>
+                  </a:txBody>
+                  <a:tcPr/>
+                </a:tc>
+                <a:tc>
+                  <a:txBody>
+                    <a:bodyPr/>
+                    <a:lstStyle/>
+                    <a:p>
+                      <a:pPr algn="r"/>
+                      <a:endParaRPr lang="en-US" dirty="0"/>
+                    </a:p>
+                    <a:p>
+                      <a:pPr algn="r"/>
+                      <a:endParaRPr lang="en-US" dirty="0"/>
+                    </a:p>
+                    <a:p>
+                      <a:pPr algn="r"/>
+                      <a:endParaRPr lang="en-US" dirty="0"/>
+                    </a:p>
+                    <a:p>
+                      <a:pPr algn="r"/>
+                      <a:r>
+                        <a:rPr lang="en-US" b="1" dirty="0"/>
+                        <a:t>$176,000</a:t>
+                      </a:r>
+                    </a:p>
+                  </a:txBody>
+                  <a:tcPr/>
+                </a:tc>
+                <a:extLst>
+                  <a:ext uri="{0D108BD9-81ED-4DB2-BD59-A6C34878D82A}">
+                    <a16:rowId xmlns:a16="http://schemas.microsoft.com/office/drawing/2014/main" val="348258760"/>
+                  </a:ext>
+                </a:extLst>
+              </a:tr>
+              <a:tr h="711804">
+                <a:tc>
+                  <a:txBody>
+                    <a:bodyPr/>
+                    <a:lstStyle/>
+                    <a:p>
+                      <a:pPr>
+                        <a:lnSpc>
+                          <a:spcPct val="150000"/>
+                        </a:lnSpc>
+                      </a:pPr>
+                      <a:r>
+                        <a:rPr lang="en-US" b="1" dirty="0"/>
+                        <a:t>Total</a:t>
+                      </a:r>
+                    </a:p>
+                  </a:txBody>
+                  <a:tcPr/>
+                </a:tc>
+                <a:tc>
+                  <a:txBody>
+                    <a:bodyPr/>
+                    <a:lstStyle/>
+                    <a:p>
+                      <a:endParaRPr lang="en-US" dirty="0"/>
+                    </a:p>
+                  </a:txBody>
+                  <a:tcPr/>
+                </a:tc>
+                <a:tc>
+                  <a:txBody>
+                    <a:bodyPr/>
+                    <a:lstStyle/>
+                    <a:p>
+                      <a:endParaRPr lang="en-US" dirty="0"/>
+                    </a:p>
+                    <a:p>
+                      <a:pPr algn="r"/>
+                      <a:r>
+                        <a:rPr lang="en-US" sz="2000" b="1" u="sng" dirty="0"/>
+                        <a:t>$33,342,244</a:t>
+                      </a:r>
+                    </a:p>
+                  </a:txBody>
+                  <a:tcPr/>
+                </a:tc>
+                <a:extLst>
+                  <a:ext uri="{0D108BD9-81ED-4DB2-BD59-A6C34878D82A}">
+                    <a16:rowId xmlns:a16="http://schemas.microsoft.com/office/drawing/2014/main" val="333270449"/>
+                  </a:ext>
+                </a:extLst>
+              </a:tr>
+            </a:tbl>
+          </a:graphicData>
+        </a:graphic>
+      </p:graphicFrame>
+      <p:sp>
+        <p:nvSpPr>
+          <p:cNvPr id="6" name="Rectangle 5">
+            <a:extLst>
+              <a:ext uri="{FF2B5EF4-FFF2-40B4-BE49-F238E27FC236}">
+                <a16:creationId xmlns:a16="http://schemas.microsoft.com/office/drawing/2014/main" id="{FD2BF659-BE24-CB43-8880-7B2C7261F92A}"/>
+              </a:ext>
+            </a:extLst>
+          </p:cNvPr>
+          <p:cNvSpPr/>
+          <p:nvPr/>
+        </p:nvSpPr>
+        <p:spPr>
+          <a:xfrm>
+            <a:off x="5399902" y="3151477"/>
+            <a:ext cx="1569308" cy="555045"/>
+          </a:xfrm>
+          <a:prstGeom prst="rect">
+            <a:avLst/>
+          </a:prstGeom>
+          <a:solidFill>
+            <a:schemeClr val="bg1"/>
+          </a:solidFill>
+          <a:ln>
+            <a:solidFill>
+              <a:schemeClr val="bg1"/>
+            </a:solidFill>
+          </a:ln>
+        </p:spPr>
+        <p:style>
+          <a:lnRef idx="2">
+            <a:schemeClr val="accent1">
+              <a:shade val="50000"/>
+            </a:schemeClr>
+          </a:lnRef>
+          <a:fillRef idx="1">
+            <a:schemeClr val="accent1"/>
+          </a:fillRef>
+          <a:effectRef idx="0">
+            <a:schemeClr val="accent1"/>
+          </a:effectRef>
+          <a:fontRef idx="minor">
+            <a:schemeClr val="lt1"/>
+          </a:fontRef>
+        </p:style>
+        <p:txBody>
+          <a:bodyPr rtlCol="0" anchor="ctr"/>
+          <a:lstStyle/>
+          <a:p>
+            <a:pPr algn="ctr"/>
+            <a:endParaRPr lang="en-US"/>
+          </a:p>
+        </p:txBody>
+      </p:sp>
+      <p:graphicFrame>
+        <p:nvGraphicFramePr>
+          <p:cNvPr id="4" name="Table 7">
+            <a:extLst>
+              <a:ext uri="{FF2B5EF4-FFF2-40B4-BE49-F238E27FC236}">
+                <a16:creationId xmlns:a16="http://schemas.microsoft.com/office/drawing/2014/main" id="{9D5EF90D-4233-434B-AEA5-0898007169B2}"/>
+              </a:ext>
+            </a:extLst>
+          </p:cNvPr>
+          <p:cNvGraphicFramePr>
+            <a:graphicFrameLocks noGrp="1"/>
+          </p:cNvGraphicFramePr>
+          <p:nvPr>
+            <p:extLst>
+              <p:ext uri="{D42A27DB-BD31-4B8C-83A1-F6EECF244321}">
+                <p14:modId xmlns:p14="http://schemas.microsoft.com/office/powerpoint/2010/main" val="1317755553"/>
+              </p:ext>
+            </p:extLst>
+          </p:nvPr>
+        </p:nvGraphicFramePr>
+        <p:xfrm>
+          <a:off x="0" y="0"/>
           <a:ext cx="6402251" cy="3602990"/>
         </p:xfrm>
         <a:graphic>
@@ -7485,628 +8994,78 @@
           </a:graphicData>
         </a:graphic>
       </p:graphicFrame>
-      <p:pic>
-        <p:nvPicPr>
-          <p:cNvPr id="9" name="Picture 8">
-            <a:extLst>
-              <a:ext uri="{FF2B5EF4-FFF2-40B4-BE49-F238E27FC236}">
-                <a16:creationId xmlns:a16="http://schemas.microsoft.com/office/drawing/2014/main" id="{0C14285A-876F-4B62-9270-362186C19EA6}"/>
-              </a:ext>
-            </a:extLst>
-          </p:cNvPr>
-          <p:cNvPicPr>
-            <a:picLocks noChangeAspect="1"/>
-          </p:cNvPicPr>
+      <p:sp>
+        <p:nvSpPr>
+          <p:cNvPr id="8" name="TextBox 7">
+            <a:extLst>
+              <a:ext uri="{FF2B5EF4-FFF2-40B4-BE49-F238E27FC236}">
+                <a16:creationId xmlns:a16="http://schemas.microsoft.com/office/drawing/2014/main" id="{C2EF3BE0-9BFE-5F40-9AD3-22C52F5DE990}"/>
+              </a:ext>
+            </a:extLst>
+          </p:cNvPr>
+          <p:cNvSpPr txBox="1"/>
           <p:nvPr/>
-        </p:nvPicPr>
-        <p:blipFill rotWithShape="1">
-          <a:blip r:embed="rId3">
-            <a:extLst>
-              <a:ext uri="{28A0092B-C50C-407E-A947-70E740481C1C}">
-                <a14:useLocalDpi xmlns:a14="http://schemas.microsoft.com/office/drawing/2010/main" val="0"/>
-              </a:ext>
-            </a:extLst>
-          </a:blip>
-          <a:srcRect r="6760"/>
-          <a:stretch/>
-        </p:blipFill>
+        </p:nvSpPr>
         <p:spPr>
           <a:xfrm>
-            <a:off x="6570617" y="1092517"/>
-            <a:ext cx="5621383" cy="2160134"/>
+            <a:off x="1149880" y="4324864"/>
+            <a:ext cx="2693071" cy="584775"/>
           </a:xfrm>
           <a:prstGeom prst="rect">
-            <a:avLst/>
-          </a:prstGeom>
-        </p:spPr>
-      </p:pic>
-      <p:pic>
-        <p:nvPicPr>
-          <p:cNvPr id="10" name="Picture 9">
-            <a:extLst>
-              <a:ext uri="{FF2B5EF4-FFF2-40B4-BE49-F238E27FC236}">
-                <a16:creationId xmlns:a16="http://schemas.microsoft.com/office/drawing/2014/main" id="{0CFBABE7-26EE-4180-B458-E6217CD6EECA}"/>
-              </a:ext>
-            </a:extLst>
-          </p:cNvPr>
-          <p:cNvPicPr>
-            <a:picLocks noChangeAspect="1"/>
-          </p:cNvPicPr>
-          <p:nvPr/>
-        </p:nvPicPr>
-        <p:blipFill>
-          <a:blip r:embed="rId4">
-            <a:extLst>
-              <a:ext uri="{28A0092B-C50C-407E-A947-70E740481C1C}">
-                <a14:useLocalDpi xmlns:a14="http://schemas.microsoft.com/office/drawing/2010/main" val="0"/>
-              </a:ext>
-            </a:extLst>
-          </a:blip>
-          <a:stretch>
-            <a:fillRect/>
-          </a:stretch>
-        </p:blipFill>
-        <p:spPr>
-          <a:xfrm>
-            <a:off x="7153550" y="3605350"/>
-            <a:ext cx="4338247" cy="2484633"/>
-          </a:xfrm>
-          <a:prstGeom prst="rect">
-            <a:avLst/>
-          </a:prstGeom>
-        </p:spPr>
-      </p:pic>
-    </p:spTree>
-    <p:extLst>
-      <p:ext uri="{BB962C8B-B14F-4D97-AF65-F5344CB8AC3E}">
-        <p14:creationId xmlns:p14="http://schemas.microsoft.com/office/powerpoint/2010/main" val="2140881363"/>
-      </p:ext>
-    </p:extLst>
-  </p:cSld>
-  <p:clrMapOvr>
-    <a:masterClrMapping/>
-  </p:clrMapOvr>
-</p:sld>
-</file>
-
-<file path=ppt/slides/slide4.xml><?xml version="1.0" encoding="utf-8"?>
-<p:sld xmlns:a="http://schemas.openxmlformats.org/drawingml/2006/main" xmlns:r="http://schemas.openxmlformats.org/officeDocument/2006/relationships" xmlns:p="http://schemas.openxmlformats.org/presentationml/2006/main">
-  <p:cSld>
-    <p:spTree>
-      <p:nvGrpSpPr>
-        <p:cNvPr id="1" name=""/>
-        <p:cNvGrpSpPr/>
-        <p:nvPr/>
-      </p:nvGrpSpPr>
-      <p:grpSpPr>
-        <a:xfrm>
-          <a:off x="0" y="0"/>
-          <a:ext cx="0" cy="0"/>
-          <a:chOff x="0" y="0"/>
-          <a:chExt cx="0" cy="0"/>
-        </a:xfrm>
-      </p:grpSpPr>
-      <p:sp>
-        <p:nvSpPr>
-          <p:cNvPr id="2" name="Title 1">
-            <a:extLst>
-              <a:ext uri="{FF2B5EF4-FFF2-40B4-BE49-F238E27FC236}">
-                <a16:creationId xmlns:a16="http://schemas.microsoft.com/office/drawing/2014/main" id="{D06A9ED8-DD87-2140-BEC3-643896B25143}"/>
-              </a:ext>
-            </a:extLst>
-          </p:cNvPr>
-          <p:cNvSpPr>
-            <a:spLocks noGrp="1"/>
-          </p:cNvSpPr>
-          <p:nvPr>
-            <p:ph type="title"/>
-          </p:nvPr>
-        </p:nvSpPr>
-        <p:spPr>
-          <a:xfrm>
-            <a:off x="838200" y="299812"/>
-            <a:ext cx="10515600" cy="719092"/>
-          </a:xfrm>
-        </p:spPr>
-        <p:txBody>
-          <a:bodyPr/>
-          <a:lstStyle/>
-          <a:p>
-            <a:pPr algn="ctr"/>
-            <a:r>
-              <a:rPr lang="en-US" dirty="0"/>
-              <a:t>Zero-Based Execution</a:t>
-            </a:r>
-          </a:p>
-        </p:txBody>
-      </p:sp>
-      <p:graphicFrame>
-        <p:nvGraphicFramePr>
-          <p:cNvPr id="9" name="Table 7">
-            <a:extLst>
-              <a:ext uri="{FF2B5EF4-FFF2-40B4-BE49-F238E27FC236}">
-                <a16:creationId xmlns:a16="http://schemas.microsoft.com/office/drawing/2014/main" id="{24196320-75C8-4576-88BB-D3CDD69A793D}"/>
-              </a:ext>
-            </a:extLst>
-          </p:cNvPr>
-          <p:cNvGraphicFramePr>
-            <a:graphicFrameLocks noGrp="1"/>
-          </p:cNvGraphicFramePr>
-          <p:nvPr>
-            <p:extLst>
-              <p:ext uri="{D42A27DB-BD31-4B8C-83A1-F6EECF244321}">
-                <p14:modId xmlns:p14="http://schemas.microsoft.com/office/powerpoint/2010/main" val="3664197031"/>
-              </p:ext>
-            </p:extLst>
-          </p:nvPr>
-        </p:nvGraphicFramePr>
-        <p:xfrm>
-          <a:off x="149497" y="1606883"/>
-          <a:ext cx="6564812" cy="3644234"/>
-        </p:xfrm>
-        <a:graphic>
-          <a:graphicData uri="http://schemas.openxmlformats.org/drawingml/2006/table">
-            <a:tbl>
-              <a:tblPr firstRow="1" bandRow="1">
-                <a:tableStyleId>{5C22544A-7EE6-4342-B048-85BDC9FD1C3A}</a:tableStyleId>
-              </a:tblPr>
-              <a:tblGrid>
-                <a:gridCol w="1307303">
-                  <a:extLst>
-                    <a:ext uri="{9D8B030D-6E8A-4147-A177-3AD203B41FA5}">
-                      <a16:colId xmlns:a16="http://schemas.microsoft.com/office/drawing/2014/main" val="1944432691"/>
-                    </a:ext>
-                  </a:extLst>
-                </a:gridCol>
-                <a:gridCol w="3716092">
-                  <a:extLst>
-                    <a:ext uri="{9D8B030D-6E8A-4147-A177-3AD203B41FA5}">
-                      <a16:colId xmlns:a16="http://schemas.microsoft.com/office/drawing/2014/main" val="1661844142"/>
-                    </a:ext>
-                  </a:extLst>
-                </a:gridCol>
-                <a:gridCol w="1541417">
-                  <a:extLst>
-                    <a:ext uri="{9D8B030D-6E8A-4147-A177-3AD203B41FA5}">
-                      <a16:colId xmlns:a16="http://schemas.microsoft.com/office/drawing/2014/main" val="1607563751"/>
-                    </a:ext>
-                  </a:extLst>
-                </a:gridCol>
-              </a:tblGrid>
-              <a:tr h="353945">
-                <a:tc>
-                  <a:txBody>
-                    <a:bodyPr/>
-                    <a:lstStyle/>
-                    <a:p>
-                      <a:endParaRPr lang="en-US" dirty="0"/>
-                    </a:p>
-                  </a:txBody>
-                  <a:tcPr/>
-                </a:tc>
-                <a:tc>
-                  <a:txBody>
-                    <a:bodyPr/>
-                    <a:lstStyle/>
-                    <a:p>
-                      <a:pPr algn="ctr">
-                        <a:lnSpc>
-                          <a:spcPct val="150000"/>
-                        </a:lnSpc>
-                      </a:pPr>
-                      <a:r>
-                        <a:rPr lang="en-US" dirty="0"/>
-                        <a:t>Solution</a:t>
-                      </a:r>
-                    </a:p>
-                  </a:txBody>
-                  <a:tcPr/>
-                </a:tc>
-                <a:tc>
-                  <a:txBody>
-                    <a:bodyPr/>
-                    <a:lstStyle/>
-                    <a:p>
-                      <a:pPr algn="r">
-                        <a:lnSpc>
-                          <a:spcPct val="150000"/>
-                        </a:lnSpc>
-                      </a:pPr>
-                      <a:r>
-                        <a:rPr lang="en-US" dirty="0"/>
-                        <a:t>Cost</a:t>
-                      </a:r>
-                    </a:p>
-                  </a:txBody>
-                  <a:tcPr/>
-                </a:tc>
-                <a:extLst>
-                  <a:ext uri="{0D108BD9-81ED-4DB2-BD59-A6C34878D82A}">
-                    <a16:rowId xmlns:a16="http://schemas.microsoft.com/office/drawing/2014/main" val="2769426632"/>
-                  </a:ext>
-                </a:extLst>
-              </a:tr>
-              <a:tr h="986652">
-                <a:tc>
-                  <a:txBody>
-                    <a:bodyPr/>
-                    <a:lstStyle/>
-                    <a:p>
-                      <a:pPr>
-                        <a:lnSpc>
-                          <a:spcPct val="150000"/>
-                        </a:lnSpc>
-                      </a:pPr>
-                      <a:r>
-                        <a:rPr lang="en-US" b="1" dirty="0"/>
-                        <a:t>Hydraulics &amp; Civil Design</a:t>
-                      </a:r>
-                    </a:p>
-                  </a:txBody>
-                  <a:tcPr/>
-                </a:tc>
-                <a:tc>
-                  <a:txBody>
-                    <a:bodyPr/>
-                    <a:lstStyle/>
-                    <a:p>
-                      <a:pPr marL="285750" indent="-285750">
-                        <a:lnSpc>
-                          <a:spcPct val="150000"/>
-                        </a:lnSpc>
-                        <a:buFont typeface="Arial" panose="020B0604020202020204" pitchFamily="34" charset="0"/>
-                        <a:buChar char="•"/>
-                      </a:pPr>
-                      <a:r>
-                        <a:rPr lang="en-US" dirty="0"/>
-                        <a:t>.25”, .375”, and .5” schedules</a:t>
-                      </a:r>
-                    </a:p>
-                    <a:p>
-                      <a:pPr marL="285750" indent="-285750">
-                        <a:lnSpc>
-                          <a:spcPct val="150000"/>
-                        </a:lnSpc>
-                        <a:buFont typeface="Arial" panose="020B0604020202020204" pitchFamily="34" charset="0"/>
-                        <a:buChar char="•"/>
-                      </a:pPr>
-                      <a:r>
-                        <a:rPr lang="en-US" dirty="0"/>
-                        <a:t>Pump F x 2</a:t>
-                      </a:r>
-                    </a:p>
-                    <a:p>
-                      <a:pPr marL="285750" indent="-285750">
-                        <a:lnSpc>
-                          <a:spcPct val="150000"/>
-                        </a:lnSpc>
-                        <a:buFont typeface="Arial" panose="020B0604020202020204" pitchFamily="34" charset="0"/>
-                        <a:buChar char="•"/>
-                      </a:pPr>
-                      <a:r>
-                        <a:rPr lang="en-US" dirty="0"/>
-                        <a:t>Junctions 9 and 11 pump locations</a:t>
-                      </a:r>
-                    </a:p>
-                  </a:txBody>
-                  <a:tcPr/>
-                </a:tc>
-                <a:tc>
-                  <a:txBody>
-                    <a:bodyPr/>
-                    <a:lstStyle/>
-                    <a:p>
-                      <a:pPr algn="r">
-                        <a:lnSpc>
-                          <a:spcPct val="200000"/>
-                        </a:lnSpc>
-                      </a:pPr>
-                      <a:endParaRPr lang="en-US" b="1" dirty="0"/>
-                    </a:p>
-                    <a:p>
-                      <a:pPr algn="r">
-                        <a:lnSpc>
-                          <a:spcPct val="250000"/>
-                        </a:lnSpc>
-                      </a:pPr>
-                      <a:r>
-                        <a:rPr lang="en-US" b="1" dirty="0"/>
-                        <a:t>$33,166,245</a:t>
-                      </a:r>
-                    </a:p>
-                  </a:txBody>
-                  <a:tcPr/>
-                </a:tc>
-                <a:extLst>
-                  <a:ext uri="{0D108BD9-81ED-4DB2-BD59-A6C34878D82A}">
-                    <a16:rowId xmlns:a16="http://schemas.microsoft.com/office/drawing/2014/main" val="1276461503"/>
-                  </a:ext>
-                </a:extLst>
-              </a:tr>
-              <a:tr h="913910">
-                <a:tc>
-                  <a:txBody>
-                    <a:bodyPr/>
-                    <a:lstStyle/>
-                    <a:p>
-                      <a:pPr>
-                        <a:lnSpc>
-                          <a:spcPct val="150000"/>
-                        </a:lnSpc>
-                      </a:pPr>
-                      <a:r>
-                        <a:rPr lang="en-US" b="1" dirty="0"/>
-                        <a:t>Equipment</a:t>
-                      </a:r>
-                    </a:p>
-                  </a:txBody>
-                  <a:tcPr/>
-                </a:tc>
-                <a:tc>
-                  <a:txBody>
-                    <a:bodyPr/>
-                    <a:lstStyle/>
-                    <a:p>
-                      <a:pPr marL="285750" indent="-285750">
-                        <a:buFont typeface="Arial" panose="020B0604020202020204" pitchFamily="34" charset="0"/>
-                        <a:buChar char="•"/>
-                      </a:pPr>
-                      <a:r>
-                        <a:rPr lang="en-US" dirty="0"/>
-                        <a:t>12 track-hoe-days</a:t>
-                      </a:r>
-                    </a:p>
-                    <a:p>
-                      <a:pPr marL="285750" indent="-285750">
-                        <a:buFont typeface="Arial" panose="020B0604020202020204" pitchFamily="34" charset="0"/>
-                        <a:buChar char="•"/>
-                      </a:pPr>
-                      <a:r>
-                        <a:rPr lang="en-US" dirty="0"/>
-                        <a:t>6 dump-truck-days</a:t>
-                      </a:r>
-                    </a:p>
-                    <a:p>
-                      <a:pPr marL="285750" indent="-285750">
-                        <a:buFont typeface="Arial" panose="020B0604020202020204" pitchFamily="34" charset="0"/>
-                        <a:buChar char="•"/>
-                      </a:pPr>
-                      <a:r>
-                        <a:rPr lang="en-US" dirty="0"/>
-                        <a:t>1 crane-day</a:t>
-                      </a:r>
-                    </a:p>
-                    <a:p>
-                      <a:pPr marL="285750" indent="-285750">
-                        <a:buFont typeface="Arial" panose="020B0604020202020204" pitchFamily="34" charset="0"/>
-                        <a:buChar char="•"/>
-                      </a:pPr>
-                      <a:r>
-                        <a:rPr lang="en-US" dirty="0"/>
-                        <a:t>4 concrete-truck-days</a:t>
-                      </a:r>
-                    </a:p>
-                  </a:txBody>
-                  <a:tcPr/>
-                </a:tc>
-                <a:tc>
-                  <a:txBody>
-                    <a:bodyPr/>
-                    <a:lstStyle/>
-                    <a:p>
-                      <a:pPr algn="r"/>
-                      <a:endParaRPr lang="en-US" dirty="0"/>
-                    </a:p>
-                    <a:p>
-                      <a:pPr algn="r"/>
-                      <a:endParaRPr lang="en-US" dirty="0"/>
-                    </a:p>
-                    <a:p>
-                      <a:pPr algn="r"/>
-                      <a:endParaRPr lang="en-US" dirty="0"/>
-                    </a:p>
-                    <a:p>
-                      <a:pPr algn="r"/>
-                      <a:r>
-                        <a:rPr lang="en-US" b="1" dirty="0"/>
-                        <a:t>$176,000</a:t>
-                      </a:r>
-                    </a:p>
-                  </a:txBody>
-                  <a:tcPr/>
-                </a:tc>
-                <a:extLst>
-                  <a:ext uri="{0D108BD9-81ED-4DB2-BD59-A6C34878D82A}">
-                    <a16:rowId xmlns:a16="http://schemas.microsoft.com/office/drawing/2014/main" val="348258760"/>
-                  </a:ext>
-                </a:extLst>
-              </a:tr>
-              <a:tr h="711804">
-                <a:tc>
-                  <a:txBody>
-                    <a:bodyPr/>
-                    <a:lstStyle/>
-                    <a:p>
-                      <a:pPr>
-                        <a:lnSpc>
-                          <a:spcPct val="150000"/>
-                        </a:lnSpc>
-                      </a:pPr>
-                      <a:r>
-                        <a:rPr lang="en-US" b="1" dirty="0"/>
-                        <a:t>Total</a:t>
-                      </a:r>
-                    </a:p>
-                  </a:txBody>
-                  <a:tcPr/>
-                </a:tc>
-                <a:tc>
-                  <a:txBody>
-                    <a:bodyPr/>
-                    <a:lstStyle/>
-                    <a:p>
-                      <a:endParaRPr lang="en-US" dirty="0"/>
-                    </a:p>
-                  </a:txBody>
-                  <a:tcPr/>
-                </a:tc>
-                <a:tc>
-                  <a:txBody>
-                    <a:bodyPr/>
-                    <a:lstStyle/>
-                    <a:p>
-                      <a:endParaRPr lang="en-US" dirty="0"/>
-                    </a:p>
-                    <a:p>
-                      <a:pPr algn="r"/>
-                      <a:r>
-                        <a:rPr lang="en-US" sz="2000" b="1" u="sng" dirty="0"/>
-                        <a:t>$33,342,244</a:t>
-                      </a:r>
-                    </a:p>
-                  </a:txBody>
-                  <a:tcPr/>
-                </a:tc>
-                <a:extLst>
-                  <a:ext uri="{0D108BD9-81ED-4DB2-BD59-A6C34878D82A}">
-                    <a16:rowId xmlns:a16="http://schemas.microsoft.com/office/drawing/2014/main" val="333270449"/>
-                  </a:ext>
-                </a:extLst>
-              </a:tr>
-            </a:tbl>
-          </a:graphicData>
-        </a:graphic>
-      </p:graphicFrame>
-      <p:sp>
-        <p:nvSpPr>
-          <p:cNvPr id="10" name="Oval 9">
-            <a:extLst>
-              <a:ext uri="{FF2B5EF4-FFF2-40B4-BE49-F238E27FC236}">
-                <a16:creationId xmlns:a16="http://schemas.microsoft.com/office/drawing/2014/main" id="{0FA39828-BF15-470C-991C-CF7D74E7631F}"/>
-              </a:ext>
-            </a:extLst>
-          </p:cNvPr>
-          <p:cNvSpPr/>
-          <p:nvPr/>
-        </p:nvSpPr>
-        <p:spPr>
-          <a:xfrm>
-            <a:off x="9562012" y="2142308"/>
-            <a:ext cx="627017" cy="953589"/>
-          </a:xfrm>
-          <a:prstGeom prst="ellipse">
             <a:avLst/>
           </a:prstGeom>
           <a:noFill/>
           <a:ln>
             <a:solidFill>
-              <a:schemeClr val="tx1"/>
+              <a:srgbClr val="FF0000"/>
             </a:solidFill>
           </a:ln>
         </p:spPr>
-        <p:style>
-          <a:lnRef idx="2">
-            <a:schemeClr val="accent1">
-              <a:shade val="50000"/>
-            </a:schemeClr>
-          </a:lnRef>
-          <a:fillRef idx="1">
-            <a:schemeClr val="accent1"/>
-          </a:fillRef>
-          <a:effectRef idx="0">
-            <a:schemeClr val="accent1"/>
-          </a:effectRef>
-          <a:fontRef idx="minor">
-            <a:schemeClr val="lt1"/>
-          </a:fontRef>
-        </p:style>
-        <p:txBody>
-          <a:bodyPr rtlCol="0" anchor="ctr"/>
+        <p:txBody>
+          <a:bodyPr wrap="square" rtlCol="0">
+            <a:spAutoFit/>
+          </a:bodyPr>
           <a:lstStyle/>
           <a:p>
-            <a:pPr algn="ctr"/>
-            <a:endParaRPr lang="en-US"/>
-          </a:p>
-        </p:txBody>
-      </p:sp>
-      <p:sp>
-        <p:nvSpPr>
-          <p:cNvPr id="11" name="Oval 10">
-            <a:extLst>
-              <a:ext uri="{FF2B5EF4-FFF2-40B4-BE49-F238E27FC236}">
-                <a16:creationId xmlns:a16="http://schemas.microsoft.com/office/drawing/2014/main" id="{55ED2BCF-7CD1-4CDA-A1CA-6392A31D0741}"/>
-              </a:ext>
-            </a:extLst>
-          </p:cNvPr>
-          <p:cNvSpPr/>
-          <p:nvPr/>
-        </p:nvSpPr>
-        <p:spPr>
-          <a:xfrm>
-            <a:off x="9418320" y="1972491"/>
-            <a:ext cx="923109" cy="1275806"/>
-          </a:xfrm>
-          <a:prstGeom prst="ellipse">
-            <a:avLst/>
-          </a:prstGeom>
-          <a:noFill/>
-          <a:ln>
-            <a:solidFill>
-              <a:schemeClr val="tx1"/>
-            </a:solidFill>
-          </a:ln>
-        </p:spPr>
-        <p:style>
-          <a:lnRef idx="2">
-            <a:schemeClr val="accent1">
-              <a:shade val="50000"/>
-            </a:schemeClr>
-          </a:lnRef>
-          <a:fillRef idx="1">
-            <a:schemeClr val="accent1"/>
-          </a:fillRef>
-          <a:effectRef idx="0">
-            <a:schemeClr val="accent1"/>
-          </a:effectRef>
-          <a:fontRef idx="minor">
-            <a:schemeClr val="lt1"/>
-          </a:fontRef>
-        </p:style>
-        <p:txBody>
-          <a:bodyPr rtlCol="0" anchor="ctr"/>
-          <a:lstStyle/>
-          <a:p>
-            <a:pPr algn="ctr"/>
-            <a:endParaRPr lang="en-US"/>
+            <a:r>
+              <a:rPr lang="en-US" sz="3200" b="1" dirty="0">
+                <a:solidFill>
+                  <a:srgbClr val="FF0000"/>
+                </a:solidFill>
+              </a:rPr>
+              <a:t>Initial Solution</a:t>
+            </a:r>
           </a:p>
         </p:txBody>
       </p:sp>
       <p:cxnSp>
         <p:nvCxnSpPr>
-          <p:cNvPr id="13" name="Straight Connector 12">
-            <a:extLst>
-              <a:ext uri="{FF2B5EF4-FFF2-40B4-BE49-F238E27FC236}">
-                <a16:creationId xmlns:a16="http://schemas.microsoft.com/office/drawing/2014/main" id="{71B7DB92-0E58-4740-B20B-96DC4505F9D6}"/>
+          <p:cNvPr id="10" name="Straight Arrow Connector 9">
+            <a:extLst>
+              <a:ext uri="{FF2B5EF4-FFF2-40B4-BE49-F238E27FC236}">
+                <a16:creationId xmlns:a16="http://schemas.microsoft.com/office/drawing/2014/main" id="{63F7030F-EC63-E242-94DA-03CDF43AC2C7}"/>
               </a:ext>
             </a:extLst>
           </p:cNvPr>
           <p:cNvCxnSpPr>
-            <a:stCxn id="11" idx="0"/>
+            <a:cxnSpLocks/>
+            <a:stCxn id="8" idx="0"/>
           </p:cNvCxnSpPr>
           <p:nvPr/>
         </p:nvCxnSpPr>
         <p:spPr>
           <a:xfrm flipH="1" flipV="1">
-            <a:off x="8112034" y="1606883"/>
-            <a:ext cx="1767841" cy="365608"/>
-          </a:xfrm>
-          <a:prstGeom prst="line">
+            <a:off x="2496415" y="3602990"/>
+            <a:ext cx="1" cy="721874"/>
+          </a:xfrm>
+          <a:prstGeom prst="straightConnector1">
             <a:avLst/>
           </a:prstGeom>
-          <a:ln>
+          <a:ln w="76200">
             <a:solidFill>
-              <a:schemeClr val="tx1"/>
+              <a:srgbClr val="FF0000"/>
             </a:solidFill>
+            <a:tailEnd type="triangle"/>
           </a:ln>
         </p:spPr>
         <p:style>
@@ -8124,30 +9083,79 @@
           </a:fontRef>
         </p:style>
       </p:cxnSp>
+      <p:sp>
+        <p:nvSpPr>
+          <p:cNvPr id="11" name="TextBox 10">
+            <a:extLst>
+              <a:ext uri="{FF2B5EF4-FFF2-40B4-BE49-F238E27FC236}">
+                <a16:creationId xmlns:a16="http://schemas.microsoft.com/office/drawing/2014/main" id="{1DB60264-D809-A443-AC43-7C8FAB07A15F}"/>
+              </a:ext>
+            </a:extLst>
+          </p:cNvPr>
+          <p:cNvSpPr txBox="1"/>
+          <p:nvPr/>
+        </p:nvSpPr>
+        <p:spPr>
+          <a:xfrm>
+            <a:off x="2529601" y="5827775"/>
+            <a:ext cx="938411" cy="584775"/>
+          </a:xfrm>
+          <a:prstGeom prst="rect">
+            <a:avLst/>
+          </a:prstGeom>
+          <a:noFill/>
+          <a:ln>
+            <a:solidFill>
+              <a:srgbClr val="FF0000"/>
+            </a:solidFill>
+          </a:ln>
+        </p:spPr>
+        <p:txBody>
+          <a:bodyPr wrap="square" rtlCol="0">
+            <a:spAutoFit/>
+          </a:bodyPr>
+          <a:lstStyle/>
+          <a:p>
+            <a:pPr algn="ctr"/>
+            <a:r>
+              <a:rPr lang="en-US" sz="3200" b="1" dirty="0">
+                <a:solidFill>
+                  <a:srgbClr val="FF0000"/>
+                </a:solidFill>
+              </a:rPr>
+              <a:t>ZBE</a:t>
+            </a:r>
+          </a:p>
+        </p:txBody>
+      </p:sp>
       <p:cxnSp>
         <p:nvCxnSpPr>
-          <p:cNvPr id="14" name="Straight Connector 13">
-            <a:extLst>
-              <a:ext uri="{FF2B5EF4-FFF2-40B4-BE49-F238E27FC236}">
-                <a16:creationId xmlns:a16="http://schemas.microsoft.com/office/drawing/2014/main" id="{C0E3E0ED-5154-49C5-8844-14518C396B6C}"/>
-              </a:ext>
-            </a:extLst>
-          </p:cNvPr>
-          <p:cNvCxnSpPr/>
+          <p:cNvPr id="12" name="Straight Arrow Connector 11">
+            <a:extLst>
+              <a:ext uri="{FF2B5EF4-FFF2-40B4-BE49-F238E27FC236}">
+                <a16:creationId xmlns:a16="http://schemas.microsoft.com/office/drawing/2014/main" id="{6B74E267-A04E-6841-A61D-2AF67186C1AD}"/>
+              </a:ext>
+            </a:extLst>
+          </p:cNvPr>
+          <p:cNvCxnSpPr>
+            <a:cxnSpLocks/>
+            <a:stCxn id="11" idx="3"/>
+          </p:cNvCxnSpPr>
           <p:nvPr/>
         </p:nvCxnSpPr>
         <p:spPr>
-          <a:xfrm flipH="1" flipV="1">
-            <a:off x="8020595" y="2882689"/>
-            <a:ext cx="1767841" cy="365608"/>
-          </a:xfrm>
-          <a:prstGeom prst="line">
+          <a:xfrm>
+            <a:off x="3468012" y="6120163"/>
+            <a:ext cx="1931890" cy="0"/>
+          </a:xfrm>
+          <a:prstGeom prst="straightConnector1">
             <a:avLst/>
           </a:prstGeom>
-          <a:ln>
+          <a:ln w="76200">
             <a:solidFill>
-              <a:schemeClr val="tx1"/>
+              <a:srgbClr val="FF0000"/>
             </a:solidFill>
+            <a:tailEnd type="triangle"/>
           </a:ln>
         </p:spPr>
         <p:style>
@@ -8165,281 +9173,12 @@
           </a:fontRef>
         </p:style>
       </p:cxnSp>
-      <p:cxnSp>
-        <p:nvCxnSpPr>
-          <p:cNvPr id="16" name="Straight Arrow Connector 15">
-            <a:extLst>
-              <a:ext uri="{FF2B5EF4-FFF2-40B4-BE49-F238E27FC236}">
-                <a16:creationId xmlns:a16="http://schemas.microsoft.com/office/drawing/2014/main" id="{8B4BCEB9-0004-4640-9A7C-A67EB496D90A}"/>
-              </a:ext>
-            </a:extLst>
-          </p:cNvPr>
-          <p:cNvCxnSpPr/>
-          <p:nvPr/>
-        </p:nvCxnSpPr>
-        <p:spPr>
-          <a:xfrm>
-            <a:off x="9875520" y="2610394"/>
-            <a:ext cx="1306286" cy="272295"/>
-          </a:xfrm>
-          <a:prstGeom prst="straightConnector1">
-            <a:avLst/>
-          </a:prstGeom>
-          <a:ln w="76200">
-            <a:tailEnd type="triangle"/>
-          </a:ln>
-        </p:spPr>
-        <p:style>
-          <a:lnRef idx="1">
-            <a:schemeClr val="accent1"/>
-          </a:lnRef>
-          <a:fillRef idx="0">
-            <a:schemeClr val="accent1"/>
-          </a:fillRef>
-          <a:effectRef idx="0">
-            <a:schemeClr val="accent1"/>
-          </a:effectRef>
-          <a:fontRef idx="minor">
-            <a:schemeClr val="tx1"/>
-          </a:fontRef>
-        </p:style>
-      </p:cxnSp>
-      <p:sp>
-        <p:nvSpPr>
-          <p:cNvPr id="17" name="Oval 16">
-            <a:extLst>
-              <a:ext uri="{FF2B5EF4-FFF2-40B4-BE49-F238E27FC236}">
-                <a16:creationId xmlns:a16="http://schemas.microsoft.com/office/drawing/2014/main" id="{9CCA9F8C-512B-45CF-9B80-0D138F612EE5}"/>
-              </a:ext>
-            </a:extLst>
-          </p:cNvPr>
-          <p:cNvSpPr/>
-          <p:nvPr/>
-        </p:nvSpPr>
-        <p:spPr>
-          <a:xfrm>
-            <a:off x="9599025" y="4976600"/>
-            <a:ext cx="418503" cy="501092"/>
-          </a:xfrm>
-          <a:prstGeom prst="ellipse">
-            <a:avLst/>
-          </a:prstGeom>
-          <a:noFill/>
-          <a:ln>
-            <a:solidFill>
-              <a:schemeClr val="tx1"/>
-            </a:solidFill>
-          </a:ln>
-        </p:spPr>
-        <p:style>
-          <a:lnRef idx="2">
-            <a:schemeClr val="accent1">
-              <a:shade val="50000"/>
-            </a:schemeClr>
-          </a:lnRef>
-          <a:fillRef idx="1">
-            <a:schemeClr val="accent1"/>
-          </a:fillRef>
-          <a:effectRef idx="0">
-            <a:schemeClr val="accent1"/>
-          </a:effectRef>
-          <a:fontRef idx="minor">
-            <a:schemeClr val="lt1"/>
-          </a:fontRef>
-        </p:style>
-        <p:txBody>
-          <a:bodyPr rtlCol="0" anchor="ctr"/>
-          <a:lstStyle/>
-          <a:p>
-            <a:pPr algn="ctr"/>
-            <a:endParaRPr lang="en-US"/>
-          </a:p>
-        </p:txBody>
-      </p:sp>
-      <p:sp>
-        <p:nvSpPr>
-          <p:cNvPr id="18" name="Oval 17">
-            <a:extLst>
-              <a:ext uri="{FF2B5EF4-FFF2-40B4-BE49-F238E27FC236}">
-                <a16:creationId xmlns:a16="http://schemas.microsoft.com/office/drawing/2014/main" id="{30A255D9-F3EC-46B0-A77E-B842D2C931C5}"/>
-              </a:ext>
-            </a:extLst>
-          </p:cNvPr>
-          <p:cNvSpPr/>
-          <p:nvPr/>
-        </p:nvSpPr>
-        <p:spPr>
-          <a:xfrm>
-            <a:off x="9480371" y="4898876"/>
-            <a:ext cx="616130" cy="670410"/>
-          </a:xfrm>
-          <a:prstGeom prst="ellipse">
-            <a:avLst/>
-          </a:prstGeom>
-          <a:noFill/>
-          <a:ln>
-            <a:solidFill>
-              <a:schemeClr val="tx1"/>
-            </a:solidFill>
-          </a:ln>
-        </p:spPr>
-        <p:style>
-          <a:lnRef idx="2">
-            <a:schemeClr val="accent1">
-              <a:shade val="50000"/>
-            </a:schemeClr>
-          </a:lnRef>
-          <a:fillRef idx="1">
-            <a:schemeClr val="accent1"/>
-          </a:fillRef>
-          <a:effectRef idx="0">
-            <a:schemeClr val="accent1"/>
-          </a:effectRef>
-          <a:fontRef idx="minor">
-            <a:schemeClr val="lt1"/>
-          </a:fontRef>
-        </p:style>
-        <p:txBody>
-          <a:bodyPr rtlCol="0" anchor="ctr"/>
-          <a:lstStyle/>
-          <a:p>
-            <a:pPr algn="ctr"/>
-            <a:endParaRPr lang="en-US"/>
-          </a:p>
-        </p:txBody>
-      </p:sp>
-      <p:cxnSp>
-        <p:nvCxnSpPr>
-          <p:cNvPr id="19" name="Straight Connector 18">
-            <a:extLst>
-              <a:ext uri="{FF2B5EF4-FFF2-40B4-BE49-F238E27FC236}">
-                <a16:creationId xmlns:a16="http://schemas.microsoft.com/office/drawing/2014/main" id="{CDBA8F9F-5217-4232-958E-46E3EFCEE4BB}"/>
-              </a:ext>
-            </a:extLst>
-          </p:cNvPr>
-          <p:cNvCxnSpPr>
-            <a:cxnSpLocks/>
-            <a:stCxn id="18" idx="0"/>
-          </p:cNvCxnSpPr>
-          <p:nvPr/>
-        </p:nvCxnSpPr>
-        <p:spPr>
-          <a:xfrm flipH="1" flipV="1">
-            <a:off x="7961815" y="4452236"/>
-            <a:ext cx="1826621" cy="446640"/>
-          </a:xfrm>
-          <a:prstGeom prst="line">
-            <a:avLst/>
-          </a:prstGeom>
-          <a:ln>
-            <a:solidFill>
-              <a:schemeClr val="tx1"/>
-            </a:solidFill>
-          </a:ln>
-        </p:spPr>
-        <p:style>
-          <a:lnRef idx="1">
-            <a:schemeClr val="accent1"/>
-          </a:lnRef>
-          <a:fillRef idx="0">
-            <a:schemeClr val="accent1"/>
-          </a:fillRef>
-          <a:effectRef idx="0">
-            <a:schemeClr val="accent1"/>
-          </a:effectRef>
-          <a:fontRef idx="minor">
-            <a:schemeClr val="tx1"/>
-          </a:fontRef>
-        </p:style>
-      </p:cxnSp>
-      <p:cxnSp>
-        <p:nvCxnSpPr>
-          <p:cNvPr id="20" name="Straight Connector 19">
-            <a:extLst>
-              <a:ext uri="{FF2B5EF4-FFF2-40B4-BE49-F238E27FC236}">
-                <a16:creationId xmlns:a16="http://schemas.microsoft.com/office/drawing/2014/main" id="{D599C2B7-0000-483F-8A94-166BBE32D30B}"/>
-              </a:ext>
-            </a:extLst>
-          </p:cNvPr>
-          <p:cNvCxnSpPr>
-            <a:cxnSpLocks/>
-          </p:cNvCxnSpPr>
-          <p:nvPr/>
-        </p:nvCxnSpPr>
-        <p:spPr>
-          <a:xfrm flipH="1" flipV="1">
-            <a:off x="7837173" y="5112082"/>
-            <a:ext cx="1921873" cy="443334"/>
-          </a:xfrm>
-          <a:prstGeom prst="line">
-            <a:avLst/>
-          </a:prstGeom>
-          <a:ln>
-            <a:solidFill>
-              <a:schemeClr val="tx1"/>
-            </a:solidFill>
-          </a:ln>
-        </p:spPr>
-        <p:style>
-          <a:lnRef idx="1">
-            <a:schemeClr val="accent1"/>
-          </a:lnRef>
-          <a:fillRef idx="0">
-            <a:schemeClr val="accent1"/>
-          </a:fillRef>
-          <a:effectRef idx="0">
-            <a:schemeClr val="accent1"/>
-          </a:effectRef>
-          <a:fontRef idx="minor">
-            <a:schemeClr val="tx1"/>
-          </a:fontRef>
-        </p:style>
-      </p:cxnSp>
-      <p:cxnSp>
-        <p:nvCxnSpPr>
-          <p:cNvPr id="24" name="Straight Arrow Connector 23">
-            <a:extLst>
-              <a:ext uri="{FF2B5EF4-FFF2-40B4-BE49-F238E27FC236}">
-                <a16:creationId xmlns:a16="http://schemas.microsoft.com/office/drawing/2014/main" id="{714ACDE2-4102-4FBA-AB89-BD37F16CAF80}"/>
-              </a:ext>
-            </a:extLst>
-          </p:cNvPr>
-          <p:cNvCxnSpPr/>
-          <p:nvPr/>
-        </p:nvCxnSpPr>
-        <p:spPr>
-          <a:xfrm>
-            <a:off x="9816984" y="5251194"/>
-            <a:ext cx="1306286" cy="272295"/>
-          </a:xfrm>
-          <a:prstGeom prst="straightConnector1">
-            <a:avLst/>
-          </a:prstGeom>
-          <a:ln w="76200">
-            <a:tailEnd type="triangle"/>
-          </a:ln>
-        </p:spPr>
-        <p:style>
-          <a:lnRef idx="1">
-            <a:schemeClr val="accent1"/>
-          </a:lnRef>
-          <a:fillRef idx="0">
-            <a:schemeClr val="accent1"/>
-          </a:fillRef>
-          <a:effectRef idx="0">
-            <a:schemeClr val="accent1"/>
-          </a:effectRef>
-          <a:fontRef idx="minor">
-            <a:schemeClr val="tx1"/>
-          </a:fontRef>
-        </p:style>
-      </p:cxnSp>
-      <p:sp>
-        <p:nvSpPr>
-          <p:cNvPr id="25" name="TextBox 24">
-            <a:extLst>
-              <a:ext uri="{FF2B5EF4-FFF2-40B4-BE49-F238E27FC236}">
-                <a16:creationId xmlns:a16="http://schemas.microsoft.com/office/drawing/2014/main" id="{CB9DF602-9EE2-4FCF-A175-368E6068274C}"/>
+      <p:sp>
+        <p:nvSpPr>
+          <p:cNvPr id="18" name="TextBox 17">
+            <a:extLst>
+              <a:ext uri="{FF2B5EF4-FFF2-40B4-BE49-F238E27FC236}">
+                <a16:creationId xmlns:a16="http://schemas.microsoft.com/office/drawing/2014/main" id="{39780F8A-FB0B-A84F-8F06-73536595043C}"/>
               </a:ext>
             </a:extLst>
           </p:cNvPr>
@@ -8448,8 +9187,8 @@
         </p:nvSpPr>
         <p:spPr>
           <a:xfrm>
-            <a:off x="10711543" y="1972491"/>
-            <a:ext cx="1024639" cy="646331"/>
+            <a:off x="7068065" y="481914"/>
+            <a:ext cx="3257302" cy="707886"/>
           </a:xfrm>
           <a:prstGeom prst="rect">
             <a:avLst/>
@@ -8463,31 +9202,18 @@
           <a:lstStyle/>
           <a:p>
             <a:r>
-              <a:rPr lang="en-US" sz="3600" dirty="0"/>
-              <a:t>A</a:t>
-            </a:r>
-            <a:r>
-              <a:rPr lang="en-US" sz="3600" baseline="-25000" dirty="0"/>
-              <a:t>1</a:t>
-            </a:r>
-            <a:r>
-              <a:rPr lang="en-US" sz="3600" dirty="0"/>
-              <a:t>V</a:t>
-            </a:r>
-            <a:r>
-              <a:rPr lang="en-US" sz="3600" baseline="-25000" dirty="0"/>
-              <a:t>1</a:t>
-            </a:r>
-            <a:endParaRPr lang="en-US" sz="3600" dirty="0"/>
-          </a:p>
-        </p:txBody>
-      </p:sp>
-      <p:sp>
-        <p:nvSpPr>
-          <p:cNvPr id="26" name="TextBox 25">
-            <a:extLst>
-              <a:ext uri="{FF2B5EF4-FFF2-40B4-BE49-F238E27FC236}">
-                <a16:creationId xmlns:a16="http://schemas.microsoft.com/office/drawing/2014/main" id="{6B272907-DFE0-4D26-AAC0-86DCA1C5B87C}"/>
+              <a:rPr lang="en-US" sz="4000" b="1" dirty="0"/>
+              <a:t>Cost Summary</a:t>
+            </a:r>
+          </a:p>
+        </p:txBody>
+      </p:sp>
+      <p:sp>
+        <p:nvSpPr>
+          <p:cNvPr id="20" name="TextBox 19">
+            <a:extLst>
+              <a:ext uri="{FF2B5EF4-FFF2-40B4-BE49-F238E27FC236}">
+                <a16:creationId xmlns:a16="http://schemas.microsoft.com/office/drawing/2014/main" id="{B36012CD-C7CD-2B49-9C8D-C32EBBE77908}"/>
               </a:ext>
             </a:extLst>
           </p:cNvPr>
@@ -8496,91 +9222,8 @@
         </p:nvSpPr>
         <p:spPr>
           <a:xfrm>
-            <a:off x="10668888" y="4651748"/>
-            <a:ext cx="1024639" cy="646331"/>
-          </a:xfrm>
-          <a:prstGeom prst="rect">
-            <a:avLst/>
-          </a:prstGeom>
-          <a:noFill/>
-        </p:spPr>
-        <p:txBody>
-          <a:bodyPr wrap="none" rtlCol="0">
-            <a:spAutoFit/>
-          </a:bodyPr>
-          <a:lstStyle/>
-          <a:p>
-            <a:r>
-              <a:rPr lang="en-US" sz="3600" dirty="0"/>
-              <a:t>A</a:t>
-            </a:r>
-            <a:r>
-              <a:rPr lang="en-US" sz="3600" baseline="-25000" dirty="0"/>
-              <a:t>2</a:t>
-            </a:r>
-            <a:r>
-              <a:rPr lang="en-US" sz="3600" dirty="0"/>
-              <a:t>V</a:t>
-            </a:r>
-            <a:r>
-              <a:rPr lang="en-US" sz="3600" baseline="-25000" dirty="0"/>
-              <a:t>2</a:t>
-            </a:r>
-            <a:endParaRPr lang="en-US" sz="3600" dirty="0"/>
-          </a:p>
-        </p:txBody>
-      </p:sp>
-      <p:sp>
-        <p:nvSpPr>
-          <p:cNvPr id="27" name="TextBox 26">
-            <a:extLst>
-              <a:ext uri="{FF2B5EF4-FFF2-40B4-BE49-F238E27FC236}">
-                <a16:creationId xmlns:a16="http://schemas.microsoft.com/office/drawing/2014/main" id="{BF335F71-2BFB-4CCF-96F4-5BB0CCF9BCE8}"/>
-              </a:ext>
-            </a:extLst>
-          </p:cNvPr>
-          <p:cNvSpPr txBox="1"/>
-          <p:nvPr/>
-        </p:nvSpPr>
-        <p:spPr>
-          <a:xfrm>
-            <a:off x="9106711" y="3265714"/>
-            <a:ext cx="747320" cy="1446550"/>
-          </a:xfrm>
-          <a:prstGeom prst="rect">
-            <a:avLst/>
-          </a:prstGeom>
-          <a:noFill/>
-        </p:spPr>
-        <p:txBody>
-          <a:bodyPr wrap="none" rtlCol="0">
-            <a:spAutoFit/>
-          </a:bodyPr>
-          <a:lstStyle/>
-          <a:p>
-            <a:r>
-              <a:rPr lang="en-US" sz="8800" dirty="0"/>
-              <a:t>=</a:t>
-            </a:r>
-          </a:p>
-        </p:txBody>
-      </p:sp>
-      <p:sp>
-        <p:nvSpPr>
-          <p:cNvPr id="28" name="TextBox 27">
-            <a:extLst>
-              <a:ext uri="{FF2B5EF4-FFF2-40B4-BE49-F238E27FC236}">
-                <a16:creationId xmlns:a16="http://schemas.microsoft.com/office/drawing/2014/main" id="{42AA6EE1-AC36-4502-A1D6-3435207643D2}"/>
-              </a:ext>
-            </a:extLst>
-          </p:cNvPr>
-          <p:cNvSpPr txBox="1"/>
-          <p:nvPr/>
-        </p:nvSpPr>
-        <p:spPr>
-          <a:xfrm>
-            <a:off x="1593906" y="5852864"/>
-            <a:ext cx="8747523" cy="584775"/>
+            <a:off x="7261540" y="1663174"/>
+            <a:ext cx="4477379" cy="1077218"/>
           </a:xfrm>
           <a:prstGeom prst="rect">
             <a:avLst/>
@@ -8593,7 +9236,7 @@
           </a:ln>
         </p:spPr>
         <p:txBody>
-          <a:bodyPr wrap="none" rtlCol="0">
+          <a:bodyPr wrap="square" rtlCol="0">
             <a:spAutoFit/>
           </a:bodyPr>
           <a:lstStyle/>
@@ -8620,7 +9263,7 @@
     </p:spTree>
     <p:extLst>
       <p:ext uri="{BB962C8B-B14F-4D97-AF65-F5344CB8AC3E}">
-        <p14:creationId xmlns:p14="http://schemas.microsoft.com/office/powerpoint/2010/main" val="2064180662"/>
+        <p14:creationId xmlns:p14="http://schemas.microsoft.com/office/powerpoint/2010/main" val="2848671031"/>
       </p:ext>
     </p:extLst>
   </p:cSld>
@@ -8661,7 +9304,7 @@
                                           </p:stCondLst>
                                         </p:cTn>
                                         <p:tgtEl>
-                                          <p:spTgt spid="28"/>
+                                          <p:spTgt spid="20"/>
                                         </p:tgtEl>
                                         <p:attrNameLst>
                                           <p:attrName>style.visibility</p:attrName>
@@ -8702,13 +9345,13 @@
       </p:par>
     </p:tnLst>
     <p:bldLst>
-      <p:bldP spid="28" grpId="0" animBg="1"/>
+      <p:bldP spid="20" grpId="0" animBg="1"/>
     </p:bldLst>
   </p:timing>
 </p:sld>
 </file>
 
-<file path=ppt/slides/slide5.xml><?xml version="1.0" encoding="utf-8"?>
+<file path=ppt/slides/slide8.xml><?xml version="1.0" encoding="utf-8"?>
 <p:sld xmlns:a="http://schemas.openxmlformats.org/drawingml/2006/main" xmlns:r="http://schemas.openxmlformats.org/officeDocument/2006/relationships" xmlns:p="http://schemas.openxmlformats.org/presentationml/2006/main">
   <p:cSld>
     <p:spTree>
@@ -8725,46 +9368,113 @@
           <a:chExt cx="0" cy="0"/>
         </a:xfrm>
       </p:grpSpPr>
-      <p:pic>
-        <p:nvPicPr>
-          <p:cNvPr id="4" name="Picture 3">
-            <a:extLst>
-              <a:ext uri="{FF2B5EF4-FFF2-40B4-BE49-F238E27FC236}">
-                <a16:creationId xmlns:a16="http://schemas.microsoft.com/office/drawing/2014/main" id="{6DB30E48-36D0-443B-8041-D45CDBD7C38E}"/>
-              </a:ext>
-            </a:extLst>
-          </p:cNvPr>
-          <p:cNvPicPr>
-            <a:picLocks noChangeAspect="1"/>
-          </p:cNvPicPr>
-          <p:nvPr/>
-        </p:nvPicPr>
-        <p:blipFill>
-          <a:blip r:embed="rId2">
-            <a:extLst>
-              <a:ext uri="{28A0092B-C50C-407E-A947-70E740481C1C}">
-                <a14:useLocalDpi xmlns:a14="http://schemas.microsoft.com/office/drawing/2010/main" val="0"/>
-              </a:ext>
-            </a:extLst>
-          </a:blip>
-          <a:stretch>
-            <a:fillRect/>
-          </a:stretch>
-        </p:blipFill>
+      <p:sp>
+        <p:nvSpPr>
+          <p:cNvPr id="2" name="Title 1">
+            <a:extLst>
+              <a:ext uri="{FF2B5EF4-FFF2-40B4-BE49-F238E27FC236}">
+                <a16:creationId xmlns:a16="http://schemas.microsoft.com/office/drawing/2014/main" id="{492325B8-8001-FE4E-B13C-B76521F9165A}"/>
+              </a:ext>
+            </a:extLst>
+          </p:cNvPr>
+          <p:cNvSpPr>
+            <a:spLocks noGrp="1"/>
+          </p:cNvSpPr>
+          <p:nvPr>
+            <p:ph type="title"/>
+          </p:nvPr>
+        </p:nvSpPr>
+        <p:spPr/>
+        <p:txBody>
+          <a:bodyPr/>
+          <a:lstStyle/>
+          <a:p>
+            <a:pPr algn="ctr"/>
+            <a:r>
+              <a:rPr lang="en-US" dirty="0"/>
+              <a:t>Risk Assessment </a:t>
+            </a:r>
+          </a:p>
+        </p:txBody>
+      </p:sp>
+      <p:sp>
+        <p:nvSpPr>
+          <p:cNvPr id="3" name="Content Placeholder 2">
+            <a:extLst>
+              <a:ext uri="{FF2B5EF4-FFF2-40B4-BE49-F238E27FC236}">
+                <a16:creationId xmlns:a16="http://schemas.microsoft.com/office/drawing/2014/main" id="{531E0832-104D-9C42-83DB-45DD65208156}"/>
+              </a:ext>
+            </a:extLst>
+          </p:cNvPr>
+          <p:cNvSpPr>
+            <a:spLocks noGrp="1"/>
+          </p:cNvSpPr>
+          <p:nvPr>
+            <p:ph idx="1"/>
+          </p:nvPr>
+        </p:nvSpPr>
         <p:spPr>
           <a:xfrm>
-            <a:off x="-59941" y="1084217"/>
-            <a:ext cx="12311881" cy="4689566"/>
-          </a:xfrm>
-          <a:prstGeom prst="rect">
-            <a:avLst/>
-          </a:prstGeom>
-        </p:spPr>
-      </p:pic>
+            <a:off x="2901778" y="1973197"/>
+            <a:ext cx="6388444" cy="2911605"/>
+          </a:xfrm>
+        </p:spPr>
+        <p:txBody>
+          <a:bodyPr>
+            <a:normAutofit/>
+          </a:bodyPr>
+          <a:lstStyle/>
+          <a:p>
+            <a:pPr marL="571500" indent="-571500">
+              <a:buAutoNum type="romanUcPeriod"/>
+            </a:pPr>
+            <a:r>
+              <a:rPr lang="en-US" sz="3200" dirty="0"/>
+              <a:t>Combination of pipe thickness</a:t>
+            </a:r>
+          </a:p>
+          <a:p>
+            <a:pPr marL="571500" indent="-571500">
+              <a:buAutoNum type="romanUcPeriod"/>
+            </a:pPr>
+            <a:r>
+              <a:rPr lang="en-US" sz="3200" dirty="0"/>
+              <a:t>Pump placement </a:t>
+            </a:r>
+          </a:p>
+          <a:p>
+            <a:pPr marL="571500" indent="-571500">
+              <a:buAutoNum type="romanUcPeriod"/>
+            </a:pPr>
+            <a:r>
+              <a:rPr lang="en-US" sz="3200" dirty="0"/>
+              <a:t>Pump site leveling </a:t>
+            </a:r>
+          </a:p>
+          <a:p>
+            <a:pPr marL="571500" indent="-571500">
+              <a:buAutoNum type="romanUcPeriod"/>
+            </a:pPr>
+            <a:r>
+              <a:rPr lang="en-US" sz="3200" dirty="0"/>
+              <a:t>Time</a:t>
+            </a:r>
+          </a:p>
+          <a:p>
+            <a:pPr marL="571500" indent="-571500">
+              <a:buAutoNum type="romanUcPeriod"/>
+            </a:pPr>
+            <a:r>
+              <a:rPr lang="en-US" sz="3200" dirty="0"/>
+              <a:t>Calculation of work truck quantity </a:t>
+            </a:r>
+          </a:p>
+        </p:txBody>
+      </p:sp>
     </p:spTree>
     <p:extLst>
       <p:ext uri="{BB962C8B-B14F-4D97-AF65-F5344CB8AC3E}">
-        <p14:creationId xmlns:p14="http://schemas.microsoft.com/office/powerpoint/2010/main" val="1367030958"/>
+        <p14:creationId xmlns:p14="http://schemas.microsoft.com/office/powerpoint/2010/main" val="660917957"/>
       </p:ext>
     </p:extLst>
   </p:cSld>
@@ -8774,7 +9484,7 @@
 </p:sld>
 </file>
 
-<file path=ppt/slides/slide6.xml><?xml version="1.0" encoding="utf-8"?>
+<file path=ppt/slides/slide9.xml><?xml version="1.0" encoding="utf-8"?>
 <p:sld xmlns:a="http://schemas.openxmlformats.org/drawingml/2006/main" xmlns:r="http://schemas.openxmlformats.org/officeDocument/2006/relationships" xmlns:p="http://schemas.openxmlformats.org/presentationml/2006/main">
   <p:cSld>
     <p:spTree>
@@ -8796,7 +9506,7 @@
           <p:cNvPr id="2" name="Title 1">
             <a:extLst>
               <a:ext uri="{FF2B5EF4-FFF2-40B4-BE49-F238E27FC236}">
-                <a16:creationId xmlns:a16="http://schemas.microsoft.com/office/drawing/2014/main" id="{B5A84D1F-120D-1F44-8907-5AD5A4F0ED55}"/>
+                <a16:creationId xmlns:a16="http://schemas.microsoft.com/office/drawing/2014/main" id="{4D18C295-152E-9144-850D-C09E6899CB86}"/>
               </a:ext>
             </a:extLst>
           </p:cNvPr>
@@ -8807,124 +9517,6 @@
             <p:ph type="title"/>
           </p:nvPr>
         </p:nvSpPr>
-        <p:spPr/>
-        <p:txBody>
-          <a:bodyPr/>
-          <a:lstStyle/>
-          <a:p>
-            <a:pPr algn="ctr"/>
-            <a:r>
-              <a:rPr lang="en-US" dirty="0"/>
-              <a:t>Modularization</a:t>
-            </a:r>
-          </a:p>
-        </p:txBody>
-      </p:sp>
-      <p:sp>
-        <p:nvSpPr>
-          <p:cNvPr id="3" name="Content Placeholder 2">
-            <a:extLst>
-              <a:ext uri="{FF2B5EF4-FFF2-40B4-BE49-F238E27FC236}">
-                <a16:creationId xmlns:a16="http://schemas.microsoft.com/office/drawing/2014/main" id="{7CB5C8AD-2517-984B-82E9-785FA47419CF}"/>
-              </a:ext>
-            </a:extLst>
-          </p:cNvPr>
-          <p:cNvSpPr>
-            <a:spLocks noGrp="1"/>
-          </p:cNvSpPr>
-          <p:nvPr>
-            <p:ph idx="1"/>
-          </p:nvPr>
-        </p:nvSpPr>
-        <p:spPr/>
-        <p:txBody>
-          <a:bodyPr/>
-          <a:lstStyle/>
-          <a:p>
-            <a:r>
-              <a:rPr lang="en-US" dirty="0"/>
-              <a:t>Modularization seems to reduce costs at the expense of increased risks</a:t>
-            </a:r>
-          </a:p>
-          <a:p>
-            <a:r>
-              <a:rPr lang="en-US" dirty="0"/>
-              <a:t>Modularized components can be built/repaired more easily in-field</a:t>
-            </a:r>
-          </a:p>
-          <a:p>
-            <a:r>
-              <a:rPr lang="en-US" dirty="0"/>
-              <a:t>This in-field maintenance introduces the risks of foreign object damage in sensitive areas</a:t>
-            </a:r>
-          </a:p>
-          <a:p>
-            <a:pPr lvl="1"/>
-            <a:r>
-              <a:rPr lang="en-US" dirty="0"/>
-              <a:t>This risk is compounded in very sandy areas, such as the project location</a:t>
-            </a:r>
-          </a:p>
-          <a:p>
-            <a:endParaRPr lang="en-US" dirty="0"/>
-          </a:p>
-          <a:p>
-            <a:pPr marL="0" indent="0">
-              <a:buNone/>
-            </a:pPr>
-            <a:r>
-              <a:rPr lang="en-US" b="1" dirty="0"/>
-              <a:t>Key Takeaway: risk/reward must be quantified before making a final decision on the benefits of modularization—not enough info on risk!</a:t>
-            </a:r>
-          </a:p>
-        </p:txBody>
-      </p:sp>
-    </p:spTree>
-    <p:extLst>
-      <p:ext uri="{BB962C8B-B14F-4D97-AF65-F5344CB8AC3E}">
-        <p14:creationId xmlns:p14="http://schemas.microsoft.com/office/powerpoint/2010/main" val="488885204"/>
-      </p:ext>
-    </p:extLst>
-  </p:cSld>
-  <p:clrMapOvr>
-    <a:masterClrMapping/>
-  </p:clrMapOvr>
-</p:sld>
-</file>
-
-<file path=ppt/slides/slide7.xml><?xml version="1.0" encoding="utf-8"?>
-<p:sld xmlns:a="http://schemas.openxmlformats.org/drawingml/2006/main" xmlns:r="http://schemas.openxmlformats.org/officeDocument/2006/relationships" xmlns:p="http://schemas.openxmlformats.org/presentationml/2006/main">
-  <p:cSld>
-    <p:spTree>
-      <p:nvGrpSpPr>
-        <p:cNvPr id="1" name=""/>
-        <p:cNvGrpSpPr/>
-        <p:nvPr/>
-      </p:nvGrpSpPr>
-      <p:grpSpPr>
-        <a:xfrm>
-          <a:off x="0" y="0"/>
-          <a:ext cx="0" cy="0"/>
-          <a:chOff x="0" y="0"/>
-          <a:chExt cx="0" cy="0"/>
-        </a:xfrm>
-      </p:grpSpPr>
-      <p:sp>
-        <p:nvSpPr>
-          <p:cNvPr id="2" name="Title 1">
-            <a:extLst>
-              <a:ext uri="{FF2B5EF4-FFF2-40B4-BE49-F238E27FC236}">
-                <a16:creationId xmlns:a16="http://schemas.microsoft.com/office/drawing/2014/main" id="{4D18C295-152E-9144-850D-C09E6899CB86}"/>
-              </a:ext>
-            </a:extLst>
-          </p:cNvPr>
-          <p:cNvSpPr>
-            <a:spLocks noGrp="1"/>
-          </p:cNvSpPr>
-          <p:nvPr>
-            <p:ph type="title"/>
-          </p:nvPr>
-        </p:nvSpPr>
         <p:spPr>
           <a:xfrm>
             <a:off x="838200" y="365126"/>
@@ -8937,7 +9529,7 @@
           <a:p>
             <a:pPr algn="ctr"/>
             <a:r>
-              <a:rPr lang="en-US" dirty="0"/>
+              <a:rPr lang="en-US" b="1" dirty="0"/>
               <a:t>Proposed Innovation Concept</a:t>
             </a:r>
           </a:p>
@@ -10596,145 +11188,6 @@
     <p:extLst>
       <p:ext uri="{BB962C8B-B14F-4D97-AF65-F5344CB8AC3E}">
         <p14:creationId xmlns:p14="http://schemas.microsoft.com/office/powerpoint/2010/main" val="3482469565"/>
-      </p:ext>
-    </p:extLst>
-  </p:cSld>
-  <p:clrMapOvr>
-    <a:masterClrMapping/>
-  </p:clrMapOvr>
-</p:sld>
-</file>
-
-<file path=ppt/slides/slide8.xml><?xml version="1.0" encoding="utf-8"?>
-<p:sld xmlns:a="http://schemas.openxmlformats.org/drawingml/2006/main" xmlns:r="http://schemas.openxmlformats.org/officeDocument/2006/relationships" xmlns:p="http://schemas.openxmlformats.org/presentationml/2006/main">
-  <p:cSld>
-    <p:spTree>
-      <p:nvGrpSpPr>
-        <p:cNvPr id="1" name=""/>
-        <p:cNvGrpSpPr/>
-        <p:nvPr/>
-      </p:nvGrpSpPr>
-      <p:grpSpPr>
-        <a:xfrm>
-          <a:off x="0" y="0"/>
-          <a:ext cx="0" cy="0"/>
-          <a:chOff x="0" y="0"/>
-          <a:chExt cx="0" cy="0"/>
-        </a:xfrm>
-      </p:grpSpPr>
-      <p:sp>
-        <p:nvSpPr>
-          <p:cNvPr id="2" name="Title 1">
-            <a:extLst>
-              <a:ext uri="{FF2B5EF4-FFF2-40B4-BE49-F238E27FC236}">
-                <a16:creationId xmlns:a16="http://schemas.microsoft.com/office/drawing/2014/main" id="{EAE224F5-7B45-F145-9CC5-F38D9D49C32A}"/>
-              </a:ext>
-            </a:extLst>
-          </p:cNvPr>
-          <p:cNvSpPr>
-            <a:spLocks noGrp="1"/>
-          </p:cNvSpPr>
-          <p:nvPr>
-            <p:ph type="title"/>
-          </p:nvPr>
-        </p:nvSpPr>
-        <p:spPr/>
-        <p:txBody>
-          <a:bodyPr/>
-          <a:lstStyle/>
-          <a:p>
-            <a:endParaRPr lang="en-US"/>
-          </a:p>
-        </p:txBody>
-      </p:sp>
-      <p:sp>
-        <p:nvSpPr>
-          <p:cNvPr id="3" name="Content Placeholder 2">
-            <a:extLst>
-              <a:ext uri="{FF2B5EF4-FFF2-40B4-BE49-F238E27FC236}">
-                <a16:creationId xmlns:a16="http://schemas.microsoft.com/office/drawing/2014/main" id="{BCB64847-6D84-1E41-B7E2-C51F07969D1D}"/>
-              </a:ext>
-            </a:extLst>
-          </p:cNvPr>
-          <p:cNvSpPr>
-            <a:spLocks noGrp="1"/>
-          </p:cNvSpPr>
-          <p:nvPr>
-            <p:ph idx="1"/>
-          </p:nvPr>
-        </p:nvSpPr>
-        <p:spPr/>
-        <p:txBody>
-          <a:bodyPr/>
-          <a:lstStyle/>
-          <a:p>
-            <a:endParaRPr lang="en-US"/>
-          </a:p>
-        </p:txBody>
-      </p:sp>
-    </p:spTree>
-    <p:extLst>
-      <p:ext uri="{BB962C8B-B14F-4D97-AF65-F5344CB8AC3E}">
-        <p14:creationId xmlns:p14="http://schemas.microsoft.com/office/powerpoint/2010/main" val="2848671031"/>
-      </p:ext>
-    </p:extLst>
-  </p:cSld>
-  <p:clrMapOvr>
-    <a:masterClrMapping/>
-  </p:clrMapOvr>
-</p:sld>
-</file>
-
-<file path=ppt/slides/slide9.xml><?xml version="1.0" encoding="utf-8"?>
-<p:sld xmlns:a="http://schemas.openxmlformats.org/drawingml/2006/main" xmlns:r="http://schemas.openxmlformats.org/officeDocument/2006/relationships" xmlns:p="http://schemas.openxmlformats.org/presentationml/2006/main">
-  <p:cSld>
-    <p:spTree>
-      <p:nvGrpSpPr>
-        <p:cNvPr id="1" name=""/>
-        <p:cNvGrpSpPr/>
-        <p:nvPr/>
-      </p:nvGrpSpPr>
-      <p:grpSpPr>
-        <a:xfrm>
-          <a:off x="0" y="0"/>
-          <a:ext cx="0" cy="0"/>
-          <a:chOff x="0" y="0"/>
-          <a:chExt cx="0" cy="0"/>
-        </a:xfrm>
-      </p:grpSpPr>
-      <p:sp>
-        <p:nvSpPr>
-          <p:cNvPr id="2" name="Title 1">
-            <a:extLst>
-              <a:ext uri="{FF2B5EF4-FFF2-40B4-BE49-F238E27FC236}">
-                <a16:creationId xmlns:a16="http://schemas.microsoft.com/office/drawing/2014/main" id="{A6A8ED33-335E-F04F-8005-06EB5DEEB604}"/>
-              </a:ext>
-            </a:extLst>
-          </p:cNvPr>
-          <p:cNvSpPr>
-            <a:spLocks noGrp="1"/>
-          </p:cNvSpPr>
-          <p:nvPr>
-            <p:ph type="title"/>
-          </p:nvPr>
-        </p:nvSpPr>
-        <p:spPr/>
-        <p:txBody>
-          <a:bodyPr/>
-          <a:lstStyle/>
-          <a:p>
-            <a:pPr algn="ctr"/>
-            <a:r>
-              <a:rPr lang="en-US" dirty="0"/>
-              <a:t>Backup Slides</a:t>
-            </a:r>
-          </a:p>
-        </p:txBody>
-      </p:sp>
-    </p:spTree>
-    <p:extLst>
-      <p:ext uri="{BB962C8B-B14F-4D97-AF65-F5344CB8AC3E}">
-        <p14:creationId xmlns:p14="http://schemas.microsoft.com/office/powerpoint/2010/main" val="459446304"/>
       </p:ext>
     </p:extLst>
   </p:cSld>

</xml_diff>

<commit_message>
minor changes, updates; still need conclusion slide and risks
</commit_message>
<xml_diff>
--- a/dev/fluor/The AquaDucks/The AquaDucks Presentation.pptx
+++ b/dev/fluor/The AquaDucks/The AquaDucks Presentation.pptx
@@ -215,7 +215,7 @@
           <a:p>
             <a:fld id="{573A1935-CFF3-4744-B5A7-358890B8B075}" type="datetimeFigureOut">
               <a:rPr lang="en-US" smtClean="0"/>
-              <a:t>10/28/2019</a:t>
+              <a:t>10/30/19</a:t>
             </a:fld>
             <a:endParaRPr lang="en-US"/>
           </a:p>
@@ -975,6 +975,93 @@
 </p:notes>
 </file>
 
+<file path=ppt/notesSlides/notesSlide6.xml><?xml version="1.0" encoding="utf-8"?>
+<p:notes xmlns:a="http://schemas.openxmlformats.org/drawingml/2006/main" xmlns:r="http://schemas.openxmlformats.org/officeDocument/2006/relationships" xmlns:p="http://schemas.openxmlformats.org/presentationml/2006/main">
+  <p:cSld>
+    <p:spTree>
+      <p:nvGrpSpPr>
+        <p:cNvPr id="1" name=""/>
+        <p:cNvGrpSpPr/>
+        <p:nvPr/>
+      </p:nvGrpSpPr>
+      <p:grpSpPr>
+        <a:xfrm>
+          <a:off x="0" y="0"/>
+          <a:ext cx="0" cy="0"/>
+          <a:chOff x="0" y="0"/>
+          <a:chExt cx="0" cy="0"/>
+        </a:xfrm>
+      </p:grpSpPr>
+      <p:sp>
+        <p:nvSpPr>
+          <p:cNvPr id="2" name="Slide Image Placeholder 1"/>
+          <p:cNvSpPr>
+            <a:spLocks noGrp="1" noRot="1" noChangeAspect="1"/>
+          </p:cNvSpPr>
+          <p:nvPr>
+            <p:ph type="sldImg"/>
+          </p:nvPr>
+        </p:nvSpPr>
+        <p:spPr/>
+      </p:sp>
+      <p:sp>
+        <p:nvSpPr>
+          <p:cNvPr id="3" name="Notes Placeholder 2"/>
+          <p:cNvSpPr>
+            <a:spLocks noGrp="1"/>
+          </p:cNvSpPr>
+          <p:nvPr>
+            <p:ph type="body" idx="1"/>
+          </p:nvPr>
+        </p:nvSpPr>
+        <p:spPr/>
+        <p:txBody>
+          <a:bodyPr/>
+          <a:lstStyle/>
+          <a:p>
+            <a:r>
+              <a:rPr lang="en-US" dirty="0"/>
+              <a:t>This gives a more favorable tradeoff leading to a cheaper total cost</a:t>
+            </a:r>
+          </a:p>
+        </p:txBody>
+      </p:sp>
+      <p:sp>
+        <p:nvSpPr>
+          <p:cNvPr id="4" name="Slide Number Placeholder 3"/>
+          <p:cNvSpPr>
+            <a:spLocks noGrp="1"/>
+          </p:cNvSpPr>
+          <p:nvPr>
+            <p:ph type="sldNum" sz="quarter" idx="5"/>
+          </p:nvPr>
+        </p:nvSpPr>
+        <p:spPr/>
+        <p:txBody>
+          <a:bodyPr/>
+          <a:lstStyle/>
+          <a:p>
+            <a:fld id="{A7B072B7-FC31-4FD7-B929-F7282CCB0C55}" type="slidenum">
+              <a:rPr lang="en-US" smtClean="0"/>
+              <a:t>14</a:t>
+            </a:fld>
+            <a:endParaRPr lang="en-US"/>
+          </a:p>
+        </p:txBody>
+      </p:sp>
+    </p:spTree>
+    <p:extLst>
+      <p:ext uri="{BB962C8B-B14F-4D97-AF65-F5344CB8AC3E}">
+        <p14:creationId xmlns:p14="http://schemas.microsoft.com/office/powerpoint/2010/main" val="2415866470"/>
+      </p:ext>
+    </p:extLst>
+  </p:cSld>
+  <p:clrMapOvr>
+    <a:masterClrMapping/>
+  </p:clrMapOvr>
+</p:notes>
+</file>
+
 <file path=ppt/slideLayouts/slideLayout1.xml><?xml version="1.0" encoding="utf-8"?>
 <p:sldLayout xmlns:a="http://schemas.openxmlformats.org/drawingml/2006/main" xmlns:r="http://schemas.openxmlformats.org/officeDocument/2006/relationships" xmlns:p="http://schemas.openxmlformats.org/presentationml/2006/main" type="title" preserve="1">
   <p:cSld name="Title Slide">
@@ -1122,7 +1209,7 @@
           <a:p>
             <a:fld id="{6A1BF488-617C-45ED-ACF4-41A8189FD430}" type="datetimeFigureOut">
               <a:rPr lang="en-US" smtClean="0"/>
-              <a:t>10/28/2019</a:t>
+              <a:t>10/30/19</a:t>
             </a:fld>
             <a:endParaRPr lang="en-US"/>
           </a:p>
@@ -1320,7 +1407,7 @@
           <a:p>
             <a:fld id="{6A1BF488-617C-45ED-ACF4-41A8189FD430}" type="datetimeFigureOut">
               <a:rPr lang="en-US" smtClean="0"/>
-              <a:t>10/28/2019</a:t>
+              <a:t>10/30/19</a:t>
             </a:fld>
             <a:endParaRPr lang="en-US"/>
           </a:p>
@@ -1528,7 +1615,7 @@
           <a:p>
             <a:fld id="{6A1BF488-617C-45ED-ACF4-41A8189FD430}" type="datetimeFigureOut">
               <a:rPr lang="en-US" smtClean="0"/>
-              <a:t>10/28/2019</a:t>
+              <a:t>10/30/19</a:t>
             </a:fld>
             <a:endParaRPr lang="en-US"/>
           </a:p>
@@ -1726,7 +1813,7 @@
           <a:p>
             <a:fld id="{6A1BF488-617C-45ED-ACF4-41A8189FD430}" type="datetimeFigureOut">
               <a:rPr lang="en-US" smtClean="0"/>
-              <a:t>10/28/2019</a:t>
+              <a:t>10/30/19</a:t>
             </a:fld>
             <a:endParaRPr lang="en-US"/>
           </a:p>
@@ -2001,7 +2088,7 @@
           <a:p>
             <a:fld id="{6A1BF488-617C-45ED-ACF4-41A8189FD430}" type="datetimeFigureOut">
               <a:rPr lang="en-US" smtClean="0"/>
-              <a:t>10/28/2019</a:t>
+              <a:t>10/30/19</a:t>
             </a:fld>
             <a:endParaRPr lang="en-US"/>
           </a:p>
@@ -2266,7 +2353,7 @@
           <a:p>
             <a:fld id="{6A1BF488-617C-45ED-ACF4-41A8189FD430}" type="datetimeFigureOut">
               <a:rPr lang="en-US" smtClean="0"/>
-              <a:t>10/28/2019</a:t>
+              <a:t>10/30/19</a:t>
             </a:fld>
             <a:endParaRPr lang="en-US"/>
           </a:p>
@@ -2678,7 +2765,7 @@
           <a:p>
             <a:fld id="{6A1BF488-617C-45ED-ACF4-41A8189FD430}" type="datetimeFigureOut">
               <a:rPr lang="en-US" smtClean="0"/>
-              <a:t>10/28/2019</a:t>
+              <a:t>10/30/19</a:t>
             </a:fld>
             <a:endParaRPr lang="en-US"/>
           </a:p>
@@ -2819,7 +2906,7 @@
           <a:p>
             <a:fld id="{6A1BF488-617C-45ED-ACF4-41A8189FD430}" type="datetimeFigureOut">
               <a:rPr lang="en-US" smtClean="0"/>
-              <a:t>10/28/2019</a:t>
+              <a:t>10/30/19</a:t>
             </a:fld>
             <a:endParaRPr lang="en-US"/>
           </a:p>
@@ -2932,7 +3019,7 @@
           <a:p>
             <a:fld id="{6A1BF488-617C-45ED-ACF4-41A8189FD430}" type="datetimeFigureOut">
               <a:rPr lang="en-US" smtClean="0"/>
-              <a:t>10/28/2019</a:t>
+              <a:t>10/30/19</a:t>
             </a:fld>
             <a:endParaRPr lang="en-US"/>
           </a:p>
@@ -3243,7 +3330,7 @@
           <a:p>
             <a:fld id="{6A1BF488-617C-45ED-ACF4-41A8189FD430}" type="datetimeFigureOut">
               <a:rPr lang="en-US" smtClean="0"/>
-              <a:t>10/28/2019</a:t>
+              <a:t>10/30/19</a:t>
             </a:fld>
             <a:endParaRPr lang="en-US"/>
           </a:p>
@@ -3531,7 +3618,7 @@
           <a:p>
             <a:fld id="{6A1BF488-617C-45ED-ACF4-41A8189FD430}" type="datetimeFigureOut">
               <a:rPr lang="en-US" smtClean="0"/>
-              <a:t>10/28/2019</a:t>
+              <a:t>10/30/19</a:t>
             </a:fld>
             <a:endParaRPr lang="en-US"/>
           </a:p>
@@ -3772,7 +3859,7 @@
           <a:p>
             <a:fld id="{6A1BF488-617C-45ED-ACF4-41A8189FD430}" type="datetimeFigureOut">
               <a:rPr lang="en-US" smtClean="0"/>
-              <a:t>10/28/2019</a:t>
+              <a:t>10/30/19</a:t>
             </a:fld>
             <a:endParaRPr lang="en-US"/>
           </a:p>
@@ -5133,7 +5220,7 @@
         </p:nvCxnSpPr>
         <p:spPr>
           <a:xfrm flipV="1">
-            <a:off x="3610855" y="5147754"/>
+            <a:off x="2560531" y="5085970"/>
             <a:ext cx="5253244" cy="698629"/>
           </a:xfrm>
           <a:prstGeom prst="line">
@@ -5175,7 +5262,7 @@
         </p:nvSpPr>
         <p:spPr>
           <a:xfrm>
-            <a:off x="3852704" y="2318687"/>
+            <a:off x="2802380" y="2256903"/>
             <a:ext cx="5863904" cy="2930430"/>
           </a:xfrm>
           <a:custGeom>
@@ -5232,7 +5319,7 @@
           <a:noFill/>
           <a:ln w="28575">
             <a:solidFill>
-              <a:srgbClr val="7030A0"/>
+              <a:srgbClr val="FFC000"/>
             </a:solidFill>
             <a:prstDash val="lgDash"/>
           </a:ln>
@@ -5276,7 +5363,7 @@
         </p:nvSpPr>
         <p:spPr>
           <a:xfrm>
-            <a:off x="8864099" y="4072855"/>
+            <a:off x="7813775" y="4011071"/>
             <a:ext cx="914240" cy="1431482"/>
           </a:xfrm>
           <a:prstGeom prst="rect">
@@ -5328,10 +5415,10 @@
         </p:nvGrpSpPr>
         <p:grpSpPr>
           <a:xfrm>
-            <a:off x="2312693" y="-1154084"/>
-            <a:ext cx="11681173" cy="7952611"/>
-            <a:chOff x="1949602" y="-1133111"/>
-            <a:chExt cx="7168247" cy="5030774"/>
+            <a:off x="1378629" y="-1215868"/>
+            <a:ext cx="11564913" cy="7952611"/>
+            <a:chOff x="2020946" y="-1133111"/>
+            <a:chExt cx="7096903" cy="5030774"/>
           </a:xfrm>
         </p:grpSpPr>
         <p:sp>
@@ -5395,7 +5482,7 @@
             <a:noFill/>
             <a:ln w="28575">
               <a:solidFill>
-                <a:srgbClr val="7030A0"/>
+                <a:srgbClr val="FFC000"/>
               </a:solidFill>
             </a:ln>
           </p:spPr>
@@ -5426,10 +5513,10 @@
         </p:sp>
         <p:grpSp>
           <p:nvGrpSpPr>
-            <p:cNvPr id="35" name="Group 34">
+            <p:cNvPr id="18" name="Group 17">
               <a:extLst>
                 <a:ext uri="{FF2B5EF4-FFF2-40B4-BE49-F238E27FC236}">
-                  <a16:creationId xmlns:a16="http://schemas.microsoft.com/office/drawing/2014/main" id="{D40BCF79-6366-4D98-8260-EBE24EF10E10}"/>
+                  <a16:creationId xmlns:a16="http://schemas.microsoft.com/office/drawing/2014/main" id="{F57A2183-EE36-4695-B5E8-7FD37F138102}"/>
                 </a:ext>
               </a:extLst>
             </p:cNvPr>
@@ -5438,18 +5525,18 @@
           </p:nvGrpSpPr>
           <p:grpSpPr>
             <a:xfrm>
-              <a:off x="1949602" y="-1133111"/>
-              <a:ext cx="7168247" cy="5030774"/>
-              <a:chOff x="1949602" y="-1133111"/>
-              <a:chExt cx="7168247" cy="5030774"/>
+              <a:off x="2020946" y="-1133111"/>
+              <a:ext cx="7096903" cy="5030774"/>
+              <a:chOff x="3791025" y="-1137779"/>
+              <a:chExt cx="7096903" cy="5030774"/>
             </a:xfrm>
           </p:grpSpPr>
           <p:grpSp>
             <p:nvGrpSpPr>
-              <p:cNvPr id="18" name="Group 17">
+              <p:cNvPr id="14" name="Group 13">
                 <a:extLst>
                   <a:ext uri="{FF2B5EF4-FFF2-40B4-BE49-F238E27FC236}">
-                    <a16:creationId xmlns:a16="http://schemas.microsoft.com/office/drawing/2014/main" id="{F57A2183-EE36-4695-B5E8-7FD37F138102}"/>
+                    <a16:creationId xmlns:a16="http://schemas.microsoft.com/office/drawing/2014/main" id="{717FA820-6C58-4803-AB24-2E0EAE0CD523}"/>
                   </a:ext>
                 </a:extLst>
               </p:cNvPr>
@@ -5458,366 +5545,191 @@
             </p:nvGrpSpPr>
             <p:grpSpPr>
               <a:xfrm>
-                <a:off x="1949602" y="-1133111"/>
-                <a:ext cx="7168247" cy="5030774"/>
-                <a:chOff x="3719681" y="-1137779"/>
-                <a:chExt cx="7168247" cy="5030774"/>
+                <a:off x="3993159" y="-1137779"/>
+                <a:ext cx="6894769" cy="4669544"/>
+                <a:chOff x="3993159" y="-1137779"/>
+                <a:chExt cx="6894769" cy="4669544"/>
               </a:xfrm>
             </p:grpSpPr>
-            <p:grpSp>
-              <p:nvGrpSpPr>
-                <p:cNvPr id="14" name="Group 13">
+            <p:sp>
+              <p:nvSpPr>
+                <p:cNvPr id="4" name="Arc 3">
                   <a:extLst>
                     <a:ext uri="{FF2B5EF4-FFF2-40B4-BE49-F238E27FC236}">
-                      <a16:creationId xmlns:a16="http://schemas.microsoft.com/office/drawing/2014/main" id="{717FA820-6C58-4803-AB24-2E0EAE0CD523}"/>
+                      <a16:creationId xmlns:a16="http://schemas.microsoft.com/office/drawing/2014/main" id="{31C54786-8885-442C-B6D8-228A6BB52BF3}"/>
                     </a:ext>
                   </a:extLst>
                 </p:cNvPr>
-                <p:cNvGrpSpPr/>
+                <p:cNvSpPr/>
                 <p:nvPr/>
-              </p:nvGrpSpPr>
-              <p:grpSpPr>
-                <a:xfrm>
-                  <a:off x="3993159" y="-1137779"/>
-                  <a:ext cx="6894769" cy="4669544"/>
-                  <a:chOff x="3993159" y="-1137779"/>
-                  <a:chExt cx="6894769" cy="4669544"/>
+              </p:nvSpPr>
+              <p:spPr>
+                <a:xfrm rot="10800000">
+                  <a:off x="4516311" y="-1137779"/>
+                  <a:ext cx="6371617" cy="4212076"/>
                 </a:xfrm>
-              </p:grpSpPr>
-              <p:sp>
-                <p:nvSpPr>
-                  <p:cNvPr id="4" name="Arc 3">
-                    <a:extLst>
-                      <a:ext uri="{FF2B5EF4-FFF2-40B4-BE49-F238E27FC236}">
-                        <a16:creationId xmlns:a16="http://schemas.microsoft.com/office/drawing/2014/main" id="{31C54786-8885-442C-B6D8-228A6BB52BF3}"/>
-                      </a:ext>
-                    </a:extLst>
-                  </p:cNvPr>
-                  <p:cNvSpPr/>
-                  <p:nvPr/>
-                </p:nvSpPr>
-                <p:spPr>
-                  <a:xfrm rot="10800000">
-                    <a:off x="4516311" y="-1137779"/>
-                    <a:ext cx="6371617" cy="4212076"/>
-                  </a:xfrm>
-                  <a:prstGeom prst="arc">
-                    <a:avLst/>
-                  </a:prstGeom>
-                  <a:ln w="28575"/>
-                </p:spPr>
-                <p:style>
-                  <a:lnRef idx="1">
-                    <a:schemeClr val="accent1"/>
-                  </a:lnRef>
-                  <a:fillRef idx="0">
-                    <a:schemeClr val="accent1"/>
-                  </a:fillRef>
-                  <a:effectRef idx="0">
-                    <a:schemeClr val="accent1"/>
-                  </a:effectRef>
-                  <a:fontRef idx="minor">
-                    <a:schemeClr val="tx1"/>
-                  </a:fontRef>
-                </p:style>
-                <p:txBody>
-                  <a:bodyPr rtlCol="0" anchor="ctr"/>
-                  <a:lstStyle/>
-                  <a:p>
-                    <a:pPr algn="ctr"/>
-                    <a:endParaRPr lang="en-US"/>
-                  </a:p>
-                </p:txBody>
-              </p:sp>
-              <p:cxnSp>
-                <p:nvCxnSpPr>
-                  <p:cNvPr id="6" name="Straight Connector 5">
-                    <a:extLst>
-                      <a:ext uri="{FF2B5EF4-FFF2-40B4-BE49-F238E27FC236}">
-                        <a16:creationId xmlns:a16="http://schemas.microsoft.com/office/drawing/2014/main" id="{D18E2C87-3229-4236-9368-8EBC50F8F279}"/>
-                      </a:ext>
-                    </a:extLst>
-                  </p:cNvPr>
-                  <p:cNvCxnSpPr>
-                    <a:cxnSpLocks/>
-                  </p:cNvCxnSpPr>
-                  <p:nvPr/>
-                </p:nvCxnSpPr>
-                <p:spPr>
-                  <a:xfrm flipV="1">
-                    <a:off x="4516311" y="2214694"/>
-                    <a:ext cx="3185808" cy="1073790"/>
-                  </a:xfrm>
-                  <a:prstGeom prst="line">
-                    <a:avLst/>
-                  </a:prstGeom>
-                  <a:ln w="28575">
-                    <a:solidFill>
-                      <a:srgbClr val="FF0000"/>
-                    </a:solidFill>
-                  </a:ln>
-                </p:spPr>
-                <p:style>
-                  <a:lnRef idx="1">
-                    <a:schemeClr val="accent1"/>
-                  </a:lnRef>
-                  <a:fillRef idx="0">
-                    <a:schemeClr val="accent1"/>
-                  </a:fillRef>
-                  <a:effectRef idx="0">
-                    <a:schemeClr val="accent1"/>
-                  </a:effectRef>
-                  <a:fontRef idx="minor">
-                    <a:schemeClr val="tx1"/>
-                  </a:fontRef>
-                </p:style>
-              </p:cxnSp>
-              <p:cxnSp>
-                <p:nvCxnSpPr>
-                  <p:cNvPr id="9" name="Straight Connector 8">
-                    <a:extLst>
-                      <a:ext uri="{FF2B5EF4-FFF2-40B4-BE49-F238E27FC236}">
-                        <a16:creationId xmlns:a16="http://schemas.microsoft.com/office/drawing/2014/main" id="{B156C398-F0A0-488F-A911-01C38AA75E02}"/>
-                      </a:ext>
-                    </a:extLst>
-                  </p:cNvPr>
-                  <p:cNvCxnSpPr/>
-                  <p:nvPr/>
-                </p:nvCxnSpPr>
-                <p:spPr>
-                  <a:xfrm>
-                    <a:off x="3993159" y="553673"/>
-                    <a:ext cx="0" cy="2978092"/>
-                  </a:xfrm>
-                  <a:prstGeom prst="line">
-                    <a:avLst/>
-                  </a:prstGeom>
-                  <a:ln w="19050">
-                    <a:solidFill>
-                      <a:srgbClr val="FF0000"/>
-                    </a:solidFill>
-                  </a:ln>
-                </p:spPr>
-                <p:style>
-                  <a:lnRef idx="1">
-                    <a:schemeClr val="accent1"/>
-                  </a:lnRef>
-                  <a:fillRef idx="0">
-                    <a:schemeClr val="accent1"/>
-                  </a:fillRef>
-                  <a:effectRef idx="0">
-                    <a:schemeClr val="accent1"/>
-                  </a:effectRef>
-                  <a:fontRef idx="minor">
-                    <a:schemeClr val="tx1"/>
-                  </a:fontRef>
-                </p:style>
-              </p:cxnSp>
-              <p:cxnSp>
-                <p:nvCxnSpPr>
-                  <p:cNvPr id="10" name="Straight Connector 9">
-                    <a:extLst>
-                      <a:ext uri="{FF2B5EF4-FFF2-40B4-BE49-F238E27FC236}">
-                        <a16:creationId xmlns:a16="http://schemas.microsoft.com/office/drawing/2014/main" id="{B771D13C-B5F9-457C-B8A4-135B56A26C82}"/>
-                      </a:ext>
-                    </a:extLst>
-                  </p:cNvPr>
-                  <p:cNvCxnSpPr>
-                    <a:cxnSpLocks/>
-                  </p:cNvCxnSpPr>
-                  <p:nvPr/>
-                </p:nvCxnSpPr>
-                <p:spPr>
-                  <a:xfrm flipH="1">
-                    <a:off x="3993159" y="3531765"/>
-                    <a:ext cx="4269997" cy="0"/>
-                  </a:xfrm>
-                  <a:prstGeom prst="line">
-                    <a:avLst/>
-                  </a:prstGeom>
-                  <a:ln w="19050">
-                    <a:solidFill>
-                      <a:schemeClr val="tx1"/>
-                    </a:solidFill>
-                  </a:ln>
-                </p:spPr>
-                <p:style>
-                  <a:lnRef idx="1">
-                    <a:schemeClr val="accent1"/>
-                  </a:lnRef>
-                  <a:fillRef idx="0">
-                    <a:schemeClr val="accent1"/>
-                  </a:fillRef>
-                  <a:effectRef idx="0">
-                    <a:schemeClr val="accent1"/>
-                  </a:effectRef>
-                  <a:fontRef idx="minor">
-                    <a:schemeClr val="tx1"/>
-                  </a:fontRef>
-                </p:style>
-              </p:cxnSp>
-              <p:cxnSp>
-                <p:nvCxnSpPr>
-                  <p:cNvPr id="13" name="Straight Connector 12">
-                    <a:extLst>
-                      <a:ext uri="{FF2B5EF4-FFF2-40B4-BE49-F238E27FC236}">
-                        <a16:creationId xmlns:a16="http://schemas.microsoft.com/office/drawing/2014/main" id="{C90628A5-75D8-4816-9C1F-F6725EA902DA}"/>
-                      </a:ext>
-                    </a:extLst>
-                  </p:cNvPr>
-                  <p:cNvCxnSpPr/>
-                  <p:nvPr/>
-                </p:nvCxnSpPr>
-                <p:spPr>
-                  <a:xfrm>
-                    <a:off x="8263156" y="553673"/>
-                    <a:ext cx="0" cy="2978092"/>
-                  </a:xfrm>
-                  <a:prstGeom prst="line">
-                    <a:avLst/>
-                  </a:prstGeom>
-                  <a:ln w="19050">
-                    <a:solidFill>
-                      <a:schemeClr val="accent1"/>
-                    </a:solidFill>
-                  </a:ln>
-                </p:spPr>
-                <p:style>
-                  <a:lnRef idx="1">
-                    <a:schemeClr val="accent1"/>
-                  </a:lnRef>
-                  <a:fillRef idx="0">
-                    <a:schemeClr val="accent1"/>
-                  </a:fillRef>
-                  <a:effectRef idx="0">
-                    <a:schemeClr val="accent1"/>
-                  </a:effectRef>
-                  <a:fontRef idx="minor">
-                    <a:schemeClr val="tx1"/>
-                  </a:fontRef>
-                </p:style>
-              </p:cxnSp>
-            </p:grpSp>
-            <p:sp>
-              <p:nvSpPr>
-                <p:cNvPr id="15" name="TextBox 14">
+                <a:prstGeom prst="arc">
+                  <a:avLst/>
+                </a:prstGeom>
+                <a:ln w="28575"/>
+              </p:spPr>
+              <p:style>
+                <a:lnRef idx="1">
+                  <a:schemeClr val="accent1"/>
+                </a:lnRef>
+                <a:fillRef idx="0">
+                  <a:schemeClr val="accent1"/>
+                </a:fillRef>
+                <a:effectRef idx="0">
+                  <a:schemeClr val="accent1"/>
+                </a:effectRef>
+                <a:fontRef idx="minor">
+                  <a:schemeClr val="tx1"/>
+                </a:fontRef>
+              </p:style>
+              <p:txBody>
+                <a:bodyPr rtlCol="0" anchor="ctr"/>
+                <a:lstStyle/>
+                <a:p>
+                  <a:pPr algn="ctr"/>
+                  <a:endParaRPr lang="en-US"/>
+                </a:p>
+              </p:txBody>
+            </p:sp>
+            <p:cxnSp>
+              <p:nvCxnSpPr>
+                <p:cNvPr id="6" name="Straight Connector 5">
                   <a:extLst>
                     <a:ext uri="{FF2B5EF4-FFF2-40B4-BE49-F238E27FC236}">
-                      <a16:creationId xmlns:a16="http://schemas.microsoft.com/office/drawing/2014/main" id="{0C93B6E0-7A62-4D2F-AE66-0D9DBF18ACE6}"/>
+                      <a16:creationId xmlns:a16="http://schemas.microsoft.com/office/drawing/2014/main" id="{D18E2C87-3229-4236-9368-8EBC50F8F279}"/>
                     </a:ext>
                   </a:extLst>
                 </p:cNvPr>
-                <p:cNvSpPr txBox="1"/>
+                <p:cNvCxnSpPr>
+                  <a:cxnSpLocks/>
+                </p:cNvCxnSpPr>
                 <p:nvPr/>
-              </p:nvSpPr>
+              </p:nvCxnSpPr>
               <p:spPr>
-                <a:xfrm rot="16200000">
-                  <a:off x="7953732" y="2492072"/>
-                  <a:ext cx="879790" cy="226644"/>
+                <a:xfrm flipV="1">
+                  <a:off x="4516311" y="2214694"/>
+                  <a:ext cx="3185808" cy="1073790"/>
                 </a:xfrm>
-                <a:prstGeom prst="rect">
+                <a:prstGeom prst="line">
                   <a:avLst/>
                 </a:prstGeom>
-                <a:noFill/>
+                <a:ln w="28575">
+                  <a:solidFill>
+                    <a:srgbClr val="FF0000"/>
+                  </a:solidFill>
+                </a:ln>
               </p:spPr>
-              <p:txBody>
-                <a:bodyPr wrap="none" rtlCol="0">
-                  <a:spAutoFit/>
-                </a:bodyPr>
-                <a:lstStyle/>
-                <a:p>
-                  <a:r>
-                    <a:rPr lang="en-US" dirty="0">
-                      <a:solidFill>
-                        <a:srgbClr val="0070C0"/>
-                      </a:solidFill>
-                    </a:rPr>
-                    <a:t>Cost of Pipes</a:t>
-                  </a:r>
-                </a:p>
-              </p:txBody>
-            </p:sp>
-            <p:sp>
-              <p:nvSpPr>
-                <p:cNvPr id="16" name="TextBox 15">
+              <p:style>
+                <a:lnRef idx="1">
+                  <a:schemeClr val="accent1"/>
+                </a:lnRef>
+                <a:fillRef idx="0">
+                  <a:schemeClr val="accent1"/>
+                </a:fillRef>
+                <a:effectRef idx="0">
+                  <a:schemeClr val="accent1"/>
+                </a:effectRef>
+                <a:fontRef idx="minor">
+                  <a:schemeClr val="tx1"/>
+                </a:fontRef>
+              </p:style>
+            </p:cxnSp>
+            <p:cxnSp>
+              <p:nvCxnSpPr>
+                <p:cNvPr id="9" name="Straight Connector 8">
                   <a:extLst>
                     <a:ext uri="{FF2B5EF4-FFF2-40B4-BE49-F238E27FC236}">
-                      <a16:creationId xmlns:a16="http://schemas.microsoft.com/office/drawing/2014/main" id="{C7316363-98E8-47B9-8D10-37A81625269E}"/>
+                      <a16:creationId xmlns:a16="http://schemas.microsoft.com/office/drawing/2014/main" id="{B156C398-F0A0-488F-A911-01C38AA75E02}"/>
                     </a:ext>
                   </a:extLst>
                 </p:cNvPr>
-                <p:cNvSpPr txBox="1"/>
+                <p:cNvCxnSpPr/>
                 <p:nvPr/>
-              </p:nvSpPr>
+              </p:nvCxnSpPr>
               <p:spPr>
-                <a:xfrm rot="16200000">
-                  <a:off x="3140612" y="2096889"/>
-                  <a:ext cx="1527469" cy="369332"/>
+                <a:xfrm>
+                  <a:off x="3993159" y="553673"/>
+                  <a:ext cx="0" cy="2978092"/>
                 </a:xfrm>
-                <a:prstGeom prst="rect">
+                <a:prstGeom prst="line">
                   <a:avLst/>
                 </a:prstGeom>
-                <a:noFill/>
+                <a:ln w="19050">
+                  <a:solidFill>
+                    <a:schemeClr val="tx1"/>
+                  </a:solidFill>
+                </a:ln>
               </p:spPr>
-              <p:txBody>
-                <a:bodyPr wrap="none" rtlCol="0">
-                  <a:spAutoFit/>
-                </a:bodyPr>
-                <a:lstStyle/>
-                <a:p>
-                  <a:r>
-                    <a:rPr lang="en-US" dirty="0">
-                      <a:solidFill>
-                        <a:srgbClr val="FF0000"/>
-                      </a:solidFill>
-                    </a:rPr>
-                    <a:t>Cost of Pumps</a:t>
-                  </a:r>
-                </a:p>
-              </p:txBody>
-            </p:sp>
-            <p:sp>
-              <p:nvSpPr>
-                <p:cNvPr id="17" name="TextBox 16">
+              <p:style>
+                <a:lnRef idx="1">
+                  <a:schemeClr val="accent1"/>
+                </a:lnRef>
+                <a:fillRef idx="0">
+                  <a:schemeClr val="accent1"/>
+                </a:fillRef>
+                <a:effectRef idx="0">
+                  <a:schemeClr val="accent1"/>
+                </a:effectRef>
+                <a:fontRef idx="minor">
+                  <a:schemeClr val="tx1"/>
+                </a:fontRef>
+              </p:style>
+            </p:cxnSp>
+            <p:cxnSp>
+              <p:nvCxnSpPr>
+                <p:cNvPr id="10" name="Straight Connector 9">
                   <a:extLst>
                     <a:ext uri="{FF2B5EF4-FFF2-40B4-BE49-F238E27FC236}">
-                      <a16:creationId xmlns:a16="http://schemas.microsoft.com/office/drawing/2014/main" id="{423B0F39-B126-4F33-B43E-516EC1E859B0}"/>
+                      <a16:creationId xmlns:a16="http://schemas.microsoft.com/office/drawing/2014/main" id="{B771D13C-B5F9-457C-B8A4-135B56A26C82}"/>
                     </a:ext>
                   </a:extLst>
                 </p:cNvPr>
-                <p:cNvSpPr txBox="1"/>
+                <p:cNvCxnSpPr>
+                  <a:cxnSpLocks/>
+                </p:cNvCxnSpPr>
                 <p:nvPr/>
-              </p:nvSpPr>
+              </p:nvCxnSpPr>
               <p:spPr>
-                <a:xfrm>
-                  <a:off x="5518582" y="3523663"/>
-                  <a:ext cx="1890710" cy="369332"/>
+                <a:xfrm flipH="1">
+                  <a:off x="3993159" y="3531765"/>
+                  <a:ext cx="4269997" cy="0"/>
                 </a:xfrm>
-                <a:prstGeom prst="rect">
+                <a:prstGeom prst="line">
                   <a:avLst/>
                 </a:prstGeom>
-                <a:noFill/>
+                <a:ln w="19050">
+                  <a:solidFill>
+                    <a:schemeClr val="tx1"/>
+                  </a:solidFill>
+                </a:ln>
               </p:spPr>
-              <p:txBody>
-                <a:bodyPr wrap="none" rtlCol="0">
-                  <a:spAutoFit/>
-                </a:bodyPr>
-                <a:lstStyle/>
-                <a:p>
-                  <a:r>
-                    <a:rPr lang="en-US" dirty="0"/>
-                    <a:t>Number of Pumps</a:t>
-                  </a:r>
-                </a:p>
-              </p:txBody>
-            </p:sp>
+              <p:style>
+                <a:lnRef idx="1">
+                  <a:schemeClr val="accent1"/>
+                </a:lnRef>
+                <a:fillRef idx="0">
+                  <a:schemeClr val="accent1"/>
+                </a:fillRef>
+                <a:effectRef idx="0">
+                  <a:schemeClr val="accent1"/>
+                </a:effectRef>
+                <a:fontRef idx="minor">
+                  <a:schemeClr val="tx1"/>
+                </a:fontRef>
+              </p:style>
+            </p:cxnSp>
           </p:grpSp>
           <p:sp>
             <p:nvSpPr>
-              <p:cNvPr id="34" name="TextBox 33">
+              <p:cNvPr id="16" name="TextBox 15">
                 <a:extLst>
                   <a:ext uri="{FF2B5EF4-FFF2-40B4-BE49-F238E27FC236}">
-                    <a16:creationId xmlns:a16="http://schemas.microsoft.com/office/drawing/2014/main" id="{A405420D-775C-4CCC-93BE-F19871CC797D}"/>
+                    <a16:creationId xmlns:a16="http://schemas.microsoft.com/office/drawing/2014/main" id="{C7316363-98E8-47B9-8D10-37A81625269E}"/>
                   </a:ext>
                 </a:extLst>
               </p:cNvPr>
@@ -5825,9 +5737,9 @@
               <p:nvPr/>
             </p:nvSpPr>
             <p:spPr>
-              <a:xfrm>
-                <a:off x="3497993" y="1455625"/>
-                <a:ext cx="1451778" cy="330986"/>
+              <a:xfrm rot="16200000">
+                <a:off x="3618080" y="2168233"/>
+                <a:ext cx="572533" cy="226644"/>
               </a:xfrm>
               <a:prstGeom prst="rect">
                 <a:avLst/>
@@ -5841,12 +5753,43 @@
               <a:lstStyle/>
               <a:p>
                 <a:r>
-                  <a:rPr lang="en-US" sz="2800" b="1" dirty="0">
-                    <a:solidFill>
-                      <a:srgbClr val="7030A0"/>
-                    </a:solidFill>
-                  </a:rPr>
-                  <a:t>Cost of System</a:t>
+                  <a:rPr lang="en-US" dirty="0"/>
+                  <a:t>Cost [$]</a:t>
+                </a:r>
+              </a:p>
+            </p:txBody>
+          </p:sp>
+          <p:sp>
+            <p:nvSpPr>
+              <p:cNvPr id="17" name="TextBox 16">
+                <a:extLst>
+                  <a:ext uri="{FF2B5EF4-FFF2-40B4-BE49-F238E27FC236}">
+                    <a16:creationId xmlns:a16="http://schemas.microsoft.com/office/drawing/2014/main" id="{423B0F39-B126-4F33-B43E-516EC1E859B0}"/>
+                  </a:ext>
+                </a:extLst>
+              </p:cNvPr>
+              <p:cNvSpPr txBox="1"/>
+              <p:nvPr/>
+            </p:nvSpPr>
+            <p:spPr>
+              <a:xfrm>
+                <a:off x="5518582" y="3523663"/>
+                <a:ext cx="1890710" cy="369332"/>
+              </a:xfrm>
+              <a:prstGeom prst="rect">
+                <a:avLst/>
+              </a:prstGeom>
+              <a:noFill/>
+            </p:spPr>
+            <p:txBody>
+              <a:bodyPr wrap="none" rtlCol="0">
+                <a:spAutoFit/>
+              </a:bodyPr>
+              <a:lstStyle/>
+              <a:p>
+                <a:r>
+                  <a:rPr lang="en-US" dirty="0"/>
+                  <a:t>Number of Pumps</a:t>
                 </a:r>
               </a:p>
             </p:txBody>
@@ -5867,7 +5810,7 @@
         </p:nvGrpSpPr>
         <p:grpSpPr>
           <a:xfrm>
-            <a:off x="1321530" y="620255"/>
+            <a:off x="1111466" y="536143"/>
             <a:ext cx="9788705" cy="464358"/>
             <a:chOff x="1321530" y="620255"/>
             <a:chExt cx="9788705" cy="464358"/>
@@ -5876,7 +5819,7 @@
         <p:pic>
           <p:nvPicPr>
             <p:cNvPr id="1026" name="Picture 2" descr="Image result for symbol for proportional">
-              <a:hlinkClick r:id="rId2"/>
+              <a:hlinkClick r:id="rId3"/>
               <a:extLst>
                 <a:ext uri="{FF2B5EF4-FFF2-40B4-BE49-F238E27FC236}">
                   <a16:creationId xmlns:a16="http://schemas.microsoft.com/office/drawing/2014/main" id="{AF600655-BD38-4C61-9F74-89118BA35AC1}"/>
@@ -5889,7 +5832,7 @@
             <p:nvPr/>
           </p:nvPicPr>
           <p:blipFill rotWithShape="1">
-            <a:blip r:embed="rId3">
+            <a:blip r:embed="rId4">
               <a:extLst>
                 <a:ext uri="{28A0092B-C50C-407E-A947-70E740481C1C}">
                   <a14:useLocalDpi xmlns:a14="http://schemas.microsoft.com/office/drawing/2010/main" val="0"/>
@@ -6066,7 +6009,7 @@
         <p:pic>
           <p:nvPicPr>
             <p:cNvPr id="52" name="Picture 2" descr="Image result for symbol for proportional">
-              <a:hlinkClick r:id="rId2"/>
+              <a:hlinkClick r:id="rId3"/>
               <a:extLst>
                 <a:ext uri="{FF2B5EF4-FFF2-40B4-BE49-F238E27FC236}">
                   <a16:creationId xmlns:a16="http://schemas.microsoft.com/office/drawing/2014/main" id="{C67CE72A-13B8-4865-A02B-5841D5E61483}"/>
@@ -6079,7 +6022,7 @@
             <p:nvPr/>
           </p:nvPicPr>
           <p:blipFill rotWithShape="1">
-            <a:blip r:embed="rId3">
+            <a:blip r:embed="rId4">
               <a:extLst>
                 <a:ext uri="{28A0092B-C50C-407E-A947-70E740481C1C}">
                   <a14:useLocalDpi xmlns:a14="http://schemas.microsoft.com/office/drawing/2010/main" val="0"/>
@@ -6112,7 +6055,7 @@
         <p:pic>
           <p:nvPicPr>
             <p:cNvPr id="53" name="Picture 2" descr="Image result for symbol for proportional">
-              <a:hlinkClick r:id="rId2"/>
+              <a:hlinkClick r:id="rId3"/>
               <a:extLst>
                 <a:ext uri="{FF2B5EF4-FFF2-40B4-BE49-F238E27FC236}">
                   <a16:creationId xmlns:a16="http://schemas.microsoft.com/office/drawing/2014/main" id="{86FFCD4B-C0D0-415E-B689-2D8481A49E61}"/>
@@ -6125,7 +6068,7 @@
             <p:nvPr/>
           </p:nvPicPr>
           <p:blipFill rotWithShape="1">
-            <a:blip r:embed="rId3">
+            <a:blip r:embed="rId4">
               <a:extLst>
                 <a:ext uri="{28A0092B-C50C-407E-A947-70E740481C1C}">
                   <a14:useLocalDpi xmlns:a14="http://schemas.microsoft.com/office/drawing/2010/main" val="0"/>
@@ -6156,6 +6099,267 @@
           </p:spPr>
         </p:pic>
       </p:grpSp>
+      <p:sp>
+        <p:nvSpPr>
+          <p:cNvPr id="2" name="Rectangle 1">
+            <a:extLst>
+              <a:ext uri="{FF2B5EF4-FFF2-40B4-BE49-F238E27FC236}">
+                <a16:creationId xmlns:a16="http://schemas.microsoft.com/office/drawing/2014/main" id="{5E0C07AF-B422-7949-A799-9B0A04541EB8}"/>
+              </a:ext>
+            </a:extLst>
+          </p:cNvPr>
+          <p:cNvSpPr/>
+          <p:nvPr/>
+        </p:nvSpPr>
+        <p:spPr>
+          <a:xfrm>
+            <a:off x="8930029" y="1505915"/>
+            <a:ext cx="247135" cy="247135"/>
+          </a:xfrm>
+          <a:prstGeom prst="rect">
+            <a:avLst/>
+          </a:prstGeom>
+          <a:solidFill>
+            <a:srgbClr val="C00000"/>
+          </a:solidFill>
+          <a:ln>
+            <a:noFill/>
+          </a:ln>
+        </p:spPr>
+        <p:style>
+          <a:lnRef idx="2">
+            <a:schemeClr val="accent1">
+              <a:shade val="50000"/>
+            </a:schemeClr>
+          </a:lnRef>
+          <a:fillRef idx="1">
+            <a:schemeClr val="accent1"/>
+          </a:fillRef>
+          <a:effectRef idx="0">
+            <a:schemeClr val="accent1"/>
+          </a:effectRef>
+          <a:fontRef idx="minor">
+            <a:schemeClr val="lt1"/>
+          </a:fontRef>
+        </p:style>
+        <p:txBody>
+          <a:bodyPr rtlCol="0" anchor="ctr"/>
+          <a:lstStyle/>
+          <a:p>
+            <a:pPr algn="ctr"/>
+            <a:endParaRPr lang="en-US"/>
+          </a:p>
+        </p:txBody>
+      </p:sp>
+      <p:sp>
+        <p:nvSpPr>
+          <p:cNvPr id="28" name="Rectangle 27">
+            <a:extLst>
+              <a:ext uri="{FF2B5EF4-FFF2-40B4-BE49-F238E27FC236}">
+                <a16:creationId xmlns:a16="http://schemas.microsoft.com/office/drawing/2014/main" id="{0CBE20C1-48C0-F640-9924-34C0E427F845}"/>
+              </a:ext>
+            </a:extLst>
+          </p:cNvPr>
+          <p:cNvSpPr/>
+          <p:nvPr/>
+        </p:nvSpPr>
+        <p:spPr>
+          <a:xfrm>
+            <a:off x="8930029" y="1886152"/>
+            <a:ext cx="247135" cy="247135"/>
+          </a:xfrm>
+          <a:prstGeom prst="rect">
+            <a:avLst/>
+          </a:prstGeom>
+          <a:solidFill>
+            <a:srgbClr val="0070C0"/>
+          </a:solidFill>
+          <a:ln>
+            <a:noFill/>
+          </a:ln>
+        </p:spPr>
+        <p:style>
+          <a:lnRef idx="2">
+            <a:schemeClr val="accent1">
+              <a:shade val="50000"/>
+            </a:schemeClr>
+          </a:lnRef>
+          <a:fillRef idx="1">
+            <a:schemeClr val="accent1"/>
+          </a:fillRef>
+          <a:effectRef idx="0">
+            <a:schemeClr val="accent1"/>
+          </a:effectRef>
+          <a:fontRef idx="minor">
+            <a:schemeClr val="lt1"/>
+          </a:fontRef>
+        </p:style>
+        <p:txBody>
+          <a:bodyPr rtlCol="0" anchor="ctr"/>
+          <a:lstStyle/>
+          <a:p>
+            <a:pPr algn="ctr"/>
+            <a:endParaRPr lang="en-US"/>
+          </a:p>
+        </p:txBody>
+      </p:sp>
+      <p:sp>
+        <p:nvSpPr>
+          <p:cNvPr id="29" name="Rectangle 28">
+            <a:extLst>
+              <a:ext uri="{FF2B5EF4-FFF2-40B4-BE49-F238E27FC236}">
+                <a16:creationId xmlns:a16="http://schemas.microsoft.com/office/drawing/2014/main" id="{E5BEEA73-4AFE-C444-9464-BD4B36CCB83B}"/>
+              </a:ext>
+            </a:extLst>
+          </p:cNvPr>
+          <p:cNvSpPr/>
+          <p:nvPr/>
+        </p:nvSpPr>
+        <p:spPr>
+          <a:xfrm>
+            <a:off x="8930029" y="2266389"/>
+            <a:ext cx="247135" cy="247135"/>
+          </a:xfrm>
+          <a:prstGeom prst="rect">
+            <a:avLst/>
+          </a:prstGeom>
+          <a:solidFill>
+            <a:srgbClr val="FFC000"/>
+          </a:solidFill>
+          <a:ln>
+            <a:noFill/>
+          </a:ln>
+        </p:spPr>
+        <p:style>
+          <a:lnRef idx="2">
+            <a:schemeClr val="accent1">
+              <a:shade val="50000"/>
+            </a:schemeClr>
+          </a:lnRef>
+          <a:fillRef idx="1">
+            <a:schemeClr val="accent1"/>
+          </a:fillRef>
+          <a:effectRef idx="0">
+            <a:schemeClr val="accent1"/>
+          </a:effectRef>
+          <a:fontRef idx="minor">
+            <a:schemeClr val="lt1"/>
+          </a:fontRef>
+        </p:style>
+        <p:txBody>
+          <a:bodyPr rtlCol="0" anchor="ctr"/>
+          <a:lstStyle/>
+          <a:p>
+            <a:pPr algn="ctr"/>
+            <a:endParaRPr lang="en-US"/>
+          </a:p>
+        </p:txBody>
+      </p:sp>
+      <p:sp>
+        <p:nvSpPr>
+          <p:cNvPr id="3" name="TextBox 2">
+            <a:extLst>
+              <a:ext uri="{FF2B5EF4-FFF2-40B4-BE49-F238E27FC236}">
+                <a16:creationId xmlns:a16="http://schemas.microsoft.com/office/drawing/2014/main" id="{1C280EAE-DEBF-634E-B7D2-456247750E42}"/>
+              </a:ext>
+            </a:extLst>
+          </p:cNvPr>
+          <p:cNvSpPr txBox="1"/>
+          <p:nvPr/>
+        </p:nvSpPr>
+        <p:spPr>
+          <a:xfrm>
+            <a:off x="9287015" y="1415448"/>
+            <a:ext cx="819904" cy="369332"/>
+          </a:xfrm>
+          <a:prstGeom prst="rect">
+            <a:avLst/>
+          </a:prstGeom>
+          <a:noFill/>
+        </p:spPr>
+        <p:txBody>
+          <a:bodyPr wrap="none" rtlCol="0">
+            <a:spAutoFit/>
+          </a:bodyPr>
+          <a:lstStyle/>
+          <a:p>
+            <a:r>
+              <a:rPr lang="en-US" dirty="0"/>
+              <a:t>Pumps</a:t>
+            </a:r>
+          </a:p>
+        </p:txBody>
+      </p:sp>
+      <p:sp>
+        <p:nvSpPr>
+          <p:cNvPr id="31" name="TextBox 30">
+            <a:extLst>
+              <a:ext uri="{FF2B5EF4-FFF2-40B4-BE49-F238E27FC236}">
+                <a16:creationId xmlns:a16="http://schemas.microsoft.com/office/drawing/2014/main" id="{C282E4F8-9893-814E-ADC7-0AA2A8D72DA2}"/>
+              </a:ext>
+            </a:extLst>
+          </p:cNvPr>
+          <p:cNvSpPr txBox="1"/>
+          <p:nvPr/>
+        </p:nvSpPr>
+        <p:spPr>
+          <a:xfrm>
+            <a:off x="9287015" y="1807118"/>
+            <a:ext cx="683200" cy="369332"/>
+          </a:xfrm>
+          <a:prstGeom prst="rect">
+            <a:avLst/>
+          </a:prstGeom>
+          <a:noFill/>
+        </p:spPr>
+        <p:txBody>
+          <a:bodyPr wrap="none" rtlCol="0">
+            <a:spAutoFit/>
+          </a:bodyPr>
+          <a:lstStyle/>
+          <a:p>
+            <a:r>
+              <a:rPr lang="en-US" dirty="0"/>
+              <a:t>Pipes</a:t>
+            </a:r>
+          </a:p>
+        </p:txBody>
+      </p:sp>
+      <p:sp>
+        <p:nvSpPr>
+          <p:cNvPr id="32" name="TextBox 31">
+            <a:extLst>
+              <a:ext uri="{FF2B5EF4-FFF2-40B4-BE49-F238E27FC236}">
+                <a16:creationId xmlns:a16="http://schemas.microsoft.com/office/drawing/2014/main" id="{B0FF3AEB-A9CE-014C-A2F6-9BE8C990FDD9}"/>
+              </a:ext>
+            </a:extLst>
+          </p:cNvPr>
+          <p:cNvSpPr txBox="1"/>
+          <p:nvPr/>
+        </p:nvSpPr>
+        <p:spPr>
+          <a:xfrm>
+            <a:off x="9295449" y="2205290"/>
+            <a:ext cx="1355179" cy="369332"/>
+          </a:xfrm>
+          <a:prstGeom prst="rect">
+            <a:avLst/>
+          </a:prstGeom>
+          <a:noFill/>
+        </p:spPr>
+        <p:txBody>
+          <a:bodyPr wrap="none" rtlCol="0">
+            <a:spAutoFit/>
+          </a:bodyPr>
+          <a:lstStyle/>
+          <a:p>
+            <a:r>
+              <a:rPr lang="en-US" dirty="0"/>
+              <a:t>Total System</a:t>
+            </a:r>
+          </a:p>
+        </p:txBody>
+      </p:sp>
     </p:spTree>
     <p:extLst>
       <p:ext uri="{BB962C8B-B14F-4D97-AF65-F5344CB8AC3E}">

</xml_diff>